<commit_message>
Updated PowerPoint with deceased format description. Added deceasedSheet.pdf to public folder. Link in deceased form now links to the deceasedSheet
</commit_message>
<xml_diff>
--- a/docs/Structured Phrase Format Descriptions.pptx
+++ b/docs/Structured Phrase Format Descriptions.pptx
@@ -119,6 +119,10 @@
 </p:presentation>
 </file>
 
+<file path=ppt/revisionInfo.xml><?xml version="1.0" encoding="utf-8"?>
+<p1510:revInfo xmlns:a="http://schemas.openxmlformats.org/drawingml/2006/main" xmlns:r="http://schemas.openxmlformats.org/officeDocument/2006/relationships" xmlns:p1510="http://schemas.microsoft.com/office/powerpoint/2015/10/main"/>
+</file>
+
 <file path=ppt/notesMasters/notesMaster1.xml><?xml version="1.0" encoding="utf-8"?>
 <p:notesMaster xmlns:a="http://schemas.openxmlformats.org/drawingml/2006/main" xmlns:r="http://schemas.openxmlformats.org/officeDocument/2006/relationships" xmlns:p="http://schemas.openxmlformats.org/presentationml/2006/main">
   <p:cSld>
@@ -201,7 +205,7 @@
           <a:p>
             <a:fld id="{21E832DA-B4D8-4D11-8E14-97F9DC272DA8}" type="datetimeFigureOut">
               <a:rPr lang="en-US" smtClean="0"/>
-              <a:t>10/9/17</a:t>
+              <a:t>10/6/2017</a:t>
             </a:fld>
             <a:endParaRPr lang="en-US"/>
           </a:p>
@@ -794,7 +798,7 @@
     </p:spTree>
     <p:extLst>
       <p:ext uri="{BB962C8B-B14F-4D97-AF65-F5344CB8AC3E}">
-        <p14:creationId xmlns:p14="http://schemas.microsoft.com/office/powerpoint/2010/main" val="557011105"/>
+        <p14:creationId xmlns:p14="http://schemas.microsoft.com/office/powerpoint/2010/main" val="1411472107"/>
       </p:ext>
     </p:extLst>
   </p:cSld>
@@ -933,7 +937,7 @@
           <a:p>
             <a:fld id="{0EB9FD00-C173-4304-AF07-4E0E5F6E2284}" type="datetimeFigureOut">
               <a:rPr lang="en-US" smtClean="0"/>
-              <a:t>10/9/17</a:t>
+              <a:t>10/6/2017</a:t>
             </a:fld>
             <a:endParaRPr lang="en-US"/>
           </a:p>
@@ -1101,7 +1105,7 @@
           <a:p>
             <a:fld id="{0EB9FD00-C173-4304-AF07-4E0E5F6E2284}" type="datetimeFigureOut">
               <a:rPr lang="en-US" smtClean="0"/>
-              <a:t>10/9/17</a:t>
+              <a:t>10/6/2017</a:t>
             </a:fld>
             <a:endParaRPr lang="en-US"/>
           </a:p>
@@ -1279,7 +1283,7 @@
           <a:p>
             <a:fld id="{0EB9FD00-C173-4304-AF07-4E0E5F6E2284}" type="datetimeFigureOut">
               <a:rPr lang="en-US" smtClean="0"/>
-              <a:t>10/9/17</a:t>
+              <a:t>10/6/2017</a:t>
             </a:fld>
             <a:endParaRPr lang="en-US"/>
           </a:p>
@@ -1447,7 +1451,7 @@
           <a:p>
             <a:fld id="{0EB9FD00-C173-4304-AF07-4E0E5F6E2284}" type="datetimeFigureOut">
               <a:rPr lang="en-US" smtClean="0"/>
-              <a:t>10/9/17</a:t>
+              <a:t>10/6/2017</a:t>
             </a:fld>
             <a:endParaRPr lang="en-US"/>
           </a:p>
@@ -1692,7 +1696,7 @@
           <a:p>
             <a:fld id="{0EB9FD00-C173-4304-AF07-4E0E5F6E2284}" type="datetimeFigureOut">
               <a:rPr lang="en-US" smtClean="0"/>
-              <a:t>10/9/17</a:t>
+              <a:t>10/6/2017</a:t>
             </a:fld>
             <a:endParaRPr lang="en-US"/>
           </a:p>
@@ -1921,7 +1925,7 @@
           <a:p>
             <a:fld id="{0EB9FD00-C173-4304-AF07-4E0E5F6E2284}" type="datetimeFigureOut">
               <a:rPr lang="en-US" smtClean="0"/>
-              <a:t>10/9/17</a:t>
+              <a:t>10/6/2017</a:t>
             </a:fld>
             <a:endParaRPr lang="en-US"/>
           </a:p>
@@ -2285,7 +2289,7 @@
           <a:p>
             <a:fld id="{0EB9FD00-C173-4304-AF07-4E0E5F6E2284}" type="datetimeFigureOut">
               <a:rPr lang="en-US" smtClean="0"/>
-              <a:t>10/9/17</a:t>
+              <a:t>10/6/2017</a:t>
             </a:fld>
             <a:endParaRPr lang="en-US"/>
           </a:p>
@@ -2402,7 +2406,7 @@
           <a:p>
             <a:fld id="{0EB9FD00-C173-4304-AF07-4E0E5F6E2284}" type="datetimeFigureOut">
               <a:rPr lang="en-US" smtClean="0"/>
-              <a:t>10/9/17</a:t>
+              <a:t>10/6/2017</a:t>
             </a:fld>
             <a:endParaRPr lang="en-US"/>
           </a:p>
@@ -2497,7 +2501,7 @@
           <a:p>
             <a:fld id="{0EB9FD00-C173-4304-AF07-4E0E5F6E2284}" type="datetimeFigureOut">
               <a:rPr lang="en-US" smtClean="0"/>
-              <a:t>10/9/17</a:t>
+              <a:t>10/6/2017</a:t>
             </a:fld>
             <a:endParaRPr lang="en-US"/>
           </a:p>
@@ -2772,7 +2776,7 @@
           <a:p>
             <a:fld id="{0EB9FD00-C173-4304-AF07-4E0E5F6E2284}" type="datetimeFigureOut">
               <a:rPr lang="en-US" smtClean="0"/>
-              <a:t>10/9/17</a:t>
+              <a:t>10/6/2017</a:t>
             </a:fld>
             <a:endParaRPr lang="en-US"/>
           </a:p>
@@ -3024,7 +3028,7 @@
           <a:p>
             <a:fld id="{0EB9FD00-C173-4304-AF07-4E0E5F6E2284}" type="datetimeFigureOut">
               <a:rPr lang="en-US" smtClean="0"/>
-              <a:t>10/9/17</a:t>
+              <a:t>10/6/2017</a:t>
             </a:fld>
             <a:endParaRPr lang="en-US"/>
           </a:p>
@@ -3235,7 +3239,7 @@
           <a:p>
             <a:fld id="{0EB9FD00-C173-4304-AF07-4E0E5F6E2284}" type="datetimeFigureOut">
               <a:rPr lang="en-US" smtClean="0"/>
-              <a:t>10/9/17</a:t>
+              <a:t>10/6/2017</a:t>
             </a:fld>
             <a:endParaRPr lang="en-US"/>
           </a:p>
@@ -5621,10 +5625,6 @@
             <a:br>
               <a:rPr lang="en-US" sz="1100" dirty="0"/>
             </a:br>
-            <a:r>
-              <a:rPr lang="en-US" sz="1100" dirty="0"/>
-              <a:t/>
-            </a:r>
             <a:br>
               <a:rPr lang="en-US" sz="1100" dirty="0"/>
             </a:br>
@@ -8755,10 +8755,6 @@
             <a:br>
               <a:rPr lang="en-US" sz="1100" dirty="0"/>
             </a:br>
-            <a:r>
-              <a:rPr lang="en-US" sz="1100" dirty="0"/>
-              <a:t/>
-            </a:r>
             <a:br>
               <a:rPr lang="en-US" sz="1100" dirty="0"/>
             </a:br>
@@ -11789,14 +11785,6 @@
             <a:br>
               <a:rPr lang="en-US" sz="1100" dirty="0"/>
             </a:br>
-            <a:r>
-              <a:rPr lang="en-US" sz="1100" dirty="0">
-                <a:highlight>
-                  <a:srgbClr val="CCECFF"/>
-                </a:highlight>
-              </a:rPr>
-              <a:t/>
-            </a:r>
             <a:br>
               <a:rPr lang="en-US" sz="1100" dirty="0">
                 <a:highlight>
@@ -13159,13 +13147,13 @@
         </p:nvSpPr>
         <p:spPr>
           <a:xfrm>
-            <a:off x="853848" y="192367"/>
-            <a:ext cx="2273666" cy="518746"/>
+            <a:off x="520999" y="192367"/>
+            <a:ext cx="1646304" cy="518746"/>
           </a:xfrm>
         </p:spPr>
         <p:txBody>
           <a:bodyPr>
-            <a:normAutofit/>
+            <a:noAutofit/>
           </a:bodyPr>
           <a:lstStyle/>
           <a:p>
@@ -13173,10 +13161,9 @@
               <a:buNone/>
             </a:pPr>
             <a:r>
-              <a:rPr lang="en-US" dirty="0" smtClean="0"/>
-              <a:t>Clinical Trial:</a:t>
-            </a:r>
-            <a:endParaRPr lang="en-US" dirty="0"/>
+              <a:rPr lang="en-US" sz="2600" dirty="0"/>
+              <a:t>Deceased:</a:t>
+            </a:r>
           </a:p>
         </p:txBody>
       </p:sp>
@@ -13190,8 +13177,8 @@
         </p:nvSpPr>
         <p:spPr>
           <a:xfrm>
-            <a:off x="2888974" y="192367"/>
-            <a:ext cx="8984371" cy="518746"/>
+            <a:off x="2119745" y="192367"/>
+            <a:ext cx="9753600" cy="518746"/>
           </a:xfrm>
           <a:prstGeom prst="rect">
             <a:avLst/>
@@ -13370,10 +13357,9 @@
               <a:buNone/>
             </a:pPr>
             <a:r>
-              <a:rPr lang="en-US" sz="1100" dirty="0" smtClean="0"/>
-              <a:t>Enrollment in a clinical trial.</a:t>
-            </a:r>
-            <a:endParaRPr lang="en-US" sz="1100" dirty="0"/>
+              <a:rPr lang="en-US" sz="1100" dirty="0"/>
+              <a:t>An indication that the person is no longer living, given by a date, time of death, or a Boolean value which, when true, indicates the person is deceased.</a:t>
+            </a:r>
           </a:p>
         </p:txBody>
       </p:sp>
@@ -13387,8 +13373,8 @@
         </p:nvSpPr>
         <p:spPr>
           <a:xfrm>
-            <a:off x="2122809" y="913335"/>
-            <a:ext cx="9750536" cy="529770"/>
+            <a:off x="2122809" y="803185"/>
+            <a:ext cx="9844710" cy="628896"/>
           </a:xfrm>
           <a:prstGeom prst="rect">
             <a:avLst/>
@@ -13396,7 +13382,7 @@
         </p:spPr>
         <p:txBody>
           <a:bodyPr vert="horz" lIns="91440" tIns="45720" rIns="91440" bIns="45720" rtlCol="0">
-            <a:normAutofit fontScale="92500"/>
+            <a:noAutofit/>
           </a:bodyPr>
           <a:lstStyle>
             <a:lvl1pPr marL="228600" indent="-228600" algn="l" defTabSz="914400" rtl="0" eaLnBrk="1" latinLnBrk="0" hangingPunct="1">
@@ -13567,82 +13553,33 @@
               <a:buNone/>
             </a:pPr>
             <a:r>
-              <a:rPr lang="en-US" sz="2000" dirty="0" smtClean="0"/>
-              <a:t>Patient in </a:t>
-            </a:r>
-            <a:r>
-              <a:rPr lang="en-US" sz="2000" dirty="0" smtClean="0">
+              <a:rPr lang="en-US" sz="2000" dirty="0"/>
+              <a:t>Patient </a:t>
+            </a:r>
+            <a:r>
+              <a:rPr lang="en-US" sz="2000" dirty="0">
                 <a:highlight>
                   <a:srgbClr val="CCECFF"/>
                 </a:highlight>
               </a:rPr>
-              <a:t>#clinical trial</a:t>
-            </a:r>
-            <a:r>
-              <a:rPr lang="en-US" sz="2000" dirty="0" smtClean="0"/>
+              <a:t>#deceased</a:t>
+            </a:r>
+            <a:r>
+              <a:rPr lang="en-US" sz="2000" dirty="0"/>
               <a:t> </a:t>
             </a:r>
             <a:r>
-              <a:rPr lang="en-US" sz="2000" dirty="0" smtClean="0">
+              <a:rPr lang="en-US" sz="2000" dirty="0">
                 <a:highlight>
                   <a:srgbClr val="CCECFF"/>
                 </a:highlight>
               </a:rPr>
-              <a:t>#&lt;trial name&gt;</a:t>
-            </a:r>
-            <a:r>
-              <a:rPr lang="en-US" sz="2000" dirty="0" smtClean="0"/>
-              <a:t> </a:t>
-            </a:r>
-            <a:r>
-              <a:rPr lang="en-US" sz="2000" dirty="0" smtClean="0">
-                <a:highlight>
-                  <a:srgbClr val="CCECFF"/>
-                </a:highlight>
-              </a:rPr>
-              <a:t>#enrolled on</a:t>
-            </a:r>
-            <a:r>
-              <a:rPr lang="en-US" sz="2000" dirty="0" smtClean="0"/>
-              <a:t> </a:t>
-            </a:r>
-            <a:r>
-              <a:rPr lang="en-US" sz="2000" dirty="0" smtClean="0">
-                <a:highlight>
-                  <a:srgbClr val="CCECFF"/>
-                </a:highlight>
-              </a:rPr>
-              <a:t>#01/01/2017</a:t>
-            </a:r>
-            <a:r>
-              <a:rPr lang="en-US" sz="2000" dirty="0" smtClean="0"/>
-              <a:t> and </a:t>
-            </a:r>
-            <a:r>
-              <a:rPr lang="en-US" sz="2000" dirty="0" smtClean="0">
-                <a:highlight>
-                  <a:srgbClr val="CCECFF"/>
-                </a:highlight>
-              </a:rPr>
-              <a:t>#ended on</a:t>
-            </a:r>
-            <a:r>
-              <a:rPr lang="en-US" sz="2000" dirty="0" smtClean="0"/>
-              <a:t> </a:t>
-            </a:r>
-            <a:r>
-              <a:rPr lang="en-US" sz="2000" dirty="0" smtClean="0">
-                <a:highlight>
-                  <a:srgbClr val="CCECFF"/>
-                </a:highlight>
-              </a:rPr>
-              <a:t>#10/10/2017</a:t>
-            </a:r>
-            <a:endParaRPr lang="en-US" sz="2000" dirty="0">
-              <a:highlight>
-                <a:srgbClr val="CCECFF"/>
-              </a:highlight>
-            </a:endParaRPr>
+              <a:t>#06/06/2016 </a:t>
+            </a:r>
+            <a:r>
+              <a:rPr lang="en-US" sz="2000" dirty="0"/>
+              <a:t>.</a:t>
+            </a:r>
           </a:p>
         </p:txBody>
       </p:sp>
@@ -13656,8 +13593,8 @@
         </p:nvSpPr>
         <p:spPr>
           <a:xfrm>
-            <a:off x="2166487" y="5401367"/>
-            <a:ext cx="1444974" cy="787061"/>
+            <a:off x="2197399" y="5063206"/>
+            <a:ext cx="1444974" cy="490931"/>
           </a:xfrm>
           <a:prstGeom prst="rect">
             <a:avLst/>
@@ -13665,7 +13602,7 @@
         </p:spPr>
         <p:txBody>
           <a:bodyPr vert="horz" lIns="91440" tIns="45720" rIns="91440" bIns="45720" rtlCol="0">
-            <a:normAutofit/>
+            <a:normAutofit fontScale="40000" lnSpcReduction="20000"/>
           </a:bodyPr>
           <a:lstStyle>
             <a:lvl1pPr marL="228600" indent="-228600" algn="l" defTabSz="914400" rtl="0" eaLnBrk="1" latinLnBrk="0" hangingPunct="1">
@@ -13836,30 +13773,21 @@
               <a:buNone/>
             </a:pPr>
             <a:r>
-              <a:rPr lang="en-US" sz="1100" dirty="0"/>
+              <a:rPr lang="en-US" dirty="0"/>
               <a:t>Case of the </a:t>
             </a:r>
             <a:r>
-              <a:rPr lang="en-US" sz="1100" dirty="0" smtClean="0">
+              <a:rPr lang="en-US" dirty="0">
                 <a:highlight>
                   <a:srgbClr val="CCECFF"/>
                 </a:highlight>
               </a:rPr>
-              <a:t>#clinical trial</a:t>
-            </a:r>
-            <a:r>
-              <a:rPr lang="en-US" sz="1100" dirty="0" smtClean="0"/>
-              <a:t> tag </a:t>
-            </a:r>
-            <a:r>
-              <a:rPr lang="en-US" sz="1100" dirty="0"/>
-              <a:t>can vary</a:t>
-            </a:r>
-            <a:r>
-              <a:rPr lang="en-US" sz="1100" dirty="0" smtClean="0"/>
-              <a:t>.</a:t>
-            </a:r>
-            <a:endParaRPr lang="en-US" sz="1100" dirty="0"/>
+              <a:t>#deceased</a:t>
+            </a:r>
+            <a:r>
+              <a:rPr lang="en-US" dirty="0"/>
+              <a:t> tag can vary.</a:t>
+            </a:r>
           </a:p>
         </p:txBody>
       </p:sp>
@@ -13873,8 +13801,8 @@
         </p:nvSpPr>
         <p:spPr>
           <a:xfrm>
-            <a:off x="842254" y="844058"/>
-            <a:ext cx="1260389" cy="439457"/>
+            <a:off x="843115" y="843991"/>
+            <a:ext cx="1260389" cy="450553"/>
           </a:xfrm>
           <a:prstGeom prst="rect">
             <a:avLst/>
@@ -14086,7 +14014,7 @@
         </p:nvSpPr>
         <p:spPr>
           <a:xfrm>
-            <a:off x="888651" y="1692198"/>
+            <a:off x="891760" y="1691894"/>
             <a:ext cx="1280746" cy="518746"/>
           </a:xfrm>
           <a:prstGeom prst="rect">
@@ -14502,7 +14430,7 @@
         </p:nvSpPr>
         <p:spPr>
           <a:xfrm>
-            <a:off x="3350717" y="1735798"/>
+            <a:off x="2118265" y="1735798"/>
             <a:ext cx="1398288" cy="518746"/>
           </a:xfrm>
           <a:prstGeom prst="rect">
@@ -14683,7 +14611,7 @@
             </a:pPr>
             <a:r>
               <a:rPr lang="en-US" sz="1100" dirty="0"/>
-              <a:t>1. Must start with the </a:t>
+              <a:t>1. Start with the </a:t>
             </a:r>
             <a:r>
               <a:rPr lang="en-US" sz="1100" dirty="0">
@@ -14691,655 +14619,12 @@
                   <a:srgbClr val="CCECFF"/>
                 </a:highlight>
               </a:rPr>
-              <a:t>#clinical trial</a:t>
+              <a:t>#deceased</a:t>
             </a:r>
             <a:r>
               <a:rPr lang="en-US" sz="1100" dirty="0"/>
               <a:t> tag.</a:t>
             </a:r>
-          </a:p>
-        </p:txBody>
-      </p:sp>
-      <p:sp>
-        <p:nvSpPr>
-          <p:cNvPr id="12" name="Content Placeholder 2"/>
-          <p:cNvSpPr txBox="1">
-            <a:spLocks/>
-          </p:cNvSpPr>
-          <p:nvPr/>
-        </p:nvSpPr>
-        <p:spPr>
-          <a:xfrm>
-            <a:off x="4738579" y="1713815"/>
-            <a:ext cx="1280746" cy="481445"/>
-          </a:xfrm>
-          <a:prstGeom prst="rect">
-            <a:avLst/>
-          </a:prstGeom>
-        </p:spPr>
-        <p:txBody>
-          <a:bodyPr vert="horz" lIns="91440" tIns="45720" rIns="91440" bIns="45720" rtlCol="0">
-            <a:noAutofit/>
-          </a:bodyPr>
-          <a:lstStyle>
-            <a:lvl1pPr marL="228600" indent="-228600" algn="l" defTabSz="914400" rtl="0" eaLnBrk="1" latinLnBrk="0" hangingPunct="1">
-              <a:lnSpc>
-                <a:spcPct val="90000"/>
-              </a:lnSpc>
-              <a:spcBef>
-                <a:spcPts val="1000"/>
-              </a:spcBef>
-              <a:buFont typeface="Arial" panose="020B0604020202020204" pitchFamily="34" charset="0"/>
-              <a:buChar char="•"/>
-              <a:defRPr sz="2800" kern="1200">
-                <a:solidFill>
-                  <a:schemeClr val="tx1"/>
-                </a:solidFill>
-                <a:latin typeface="+mn-lt"/>
-                <a:ea typeface="+mn-ea"/>
-                <a:cs typeface="+mn-cs"/>
-              </a:defRPr>
-            </a:lvl1pPr>
-            <a:lvl2pPr marL="685800" indent="-228600" algn="l" defTabSz="914400" rtl="0" eaLnBrk="1" latinLnBrk="0" hangingPunct="1">
-              <a:lnSpc>
-                <a:spcPct val="90000"/>
-              </a:lnSpc>
-              <a:spcBef>
-                <a:spcPts val="500"/>
-              </a:spcBef>
-              <a:buFont typeface="Arial" panose="020B0604020202020204" pitchFamily="34" charset="0"/>
-              <a:buChar char="•"/>
-              <a:defRPr sz="2400" kern="1200">
-                <a:solidFill>
-                  <a:schemeClr val="tx1"/>
-                </a:solidFill>
-                <a:latin typeface="+mn-lt"/>
-                <a:ea typeface="+mn-ea"/>
-                <a:cs typeface="+mn-cs"/>
-              </a:defRPr>
-            </a:lvl2pPr>
-            <a:lvl3pPr marL="1143000" indent="-228600" algn="l" defTabSz="914400" rtl="0" eaLnBrk="1" latinLnBrk="0" hangingPunct="1">
-              <a:lnSpc>
-                <a:spcPct val="90000"/>
-              </a:lnSpc>
-              <a:spcBef>
-                <a:spcPts val="500"/>
-              </a:spcBef>
-              <a:buFont typeface="Arial" panose="020B0604020202020204" pitchFamily="34" charset="0"/>
-              <a:buChar char="•"/>
-              <a:defRPr sz="2000" kern="1200">
-                <a:solidFill>
-                  <a:schemeClr val="tx1"/>
-                </a:solidFill>
-                <a:latin typeface="+mn-lt"/>
-                <a:ea typeface="+mn-ea"/>
-                <a:cs typeface="+mn-cs"/>
-              </a:defRPr>
-            </a:lvl3pPr>
-            <a:lvl4pPr marL="1600200" indent="-228600" algn="l" defTabSz="914400" rtl="0" eaLnBrk="1" latinLnBrk="0" hangingPunct="1">
-              <a:lnSpc>
-                <a:spcPct val="90000"/>
-              </a:lnSpc>
-              <a:spcBef>
-                <a:spcPts val="500"/>
-              </a:spcBef>
-              <a:buFont typeface="Arial" panose="020B0604020202020204" pitchFamily="34" charset="0"/>
-              <a:buChar char="•"/>
-              <a:defRPr sz="1800" kern="1200">
-                <a:solidFill>
-                  <a:schemeClr val="tx1"/>
-                </a:solidFill>
-                <a:latin typeface="+mn-lt"/>
-                <a:ea typeface="+mn-ea"/>
-                <a:cs typeface="+mn-cs"/>
-              </a:defRPr>
-            </a:lvl4pPr>
-            <a:lvl5pPr marL="2057400" indent="-228600" algn="l" defTabSz="914400" rtl="0" eaLnBrk="1" latinLnBrk="0" hangingPunct="1">
-              <a:lnSpc>
-                <a:spcPct val="90000"/>
-              </a:lnSpc>
-              <a:spcBef>
-                <a:spcPts val="500"/>
-              </a:spcBef>
-              <a:buFont typeface="Arial" panose="020B0604020202020204" pitchFamily="34" charset="0"/>
-              <a:buChar char="•"/>
-              <a:defRPr sz="1800" kern="1200">
-                <a:solidFill>
-                  <a:schemeClr val="tx1"/>
-                </a:solidFill>
-                <a:latin typeface="+mn-lt"/>
-                <a:ea typeface="+mn-ea"/>
-                <a:cs typeface="+mn-cs"/>
-              </a:defRPr>
-            </a:lvl5pPr>
-            <a:lvl6pPr marL="2514600" indent="-228600" algn="l" defTabSz="914400" rtl="0" eaLnBrk="1" latinLnBrk="0" hangingPunct="1">
-              <a:lnSpc>
-                <a:spcPct val="90000"/>
-              </a:lnSpc>
-              <a:spcBef>
-                <a:spcPts val="500"/>
-              </a:spcBef>
-              <a:buFont typeface="Arial" panose="020B0604020202020204" pitchFamily="34" charset="0"/>
-              <a:buChar char="•"/>
-              <a:defRPr sz="1800" kern="1200">
-                <a:solidFill>
-                  <a:schemeClr val="tx1"/>
-                </a:solidFill>
-                <a:latin typeface="+mn-lt"/>
-                <a:ea typeface="+mn-ea"/>
-                <a:cs typeface="+mn-cs"/>
-              </a:defRPr>
-            </a:lvl6pPr>
-            <a:lvl7pPr marL="2971800" indent="-228600" algn="l" defTabSz="914400" rtl="0" eaLnBrk="1" latinLnBrk="0" hangingPunct="1">
-              <a:lnSpc>
-                <a:spcPct val="90000"/>
-              </a:lnSpc>
-              <a:spcBef>
-                <a:spcPts val="500"/>
-              </a:spcBef>
-              <a:buFont typeface="Arial" panose="020B0604020202020204" pitchFamily="34" charset="0"/>
-              <a:buChar char="•"/>
-              <a:defRPr sz="1800" kern="1200">
-                <a:solidFill>
-                  <a:schemeClr val="tx1"/>
-                </a:solidFill>
-                <a:latin typeface="+mn-lt"/>
-                <a:ea typeface="+mn-ea"/>
-                <a:cs typeface="+mn-cs"/>
-              </a:defRPr>
-            </a:lvl7pPr>
-            <a:lvl8pPr marL="3429000" indent="-228600" algn="l" defTabSz="914400" rtl="0" eaLnBrk="1" latinLnBrk="0" hangingPunct="1">
-              <a:lnSpc>
-                <a:spcPct val="90000"/>
-              </a:lnSpc>
-              <a:spcBef>
-                <a:spcPts val="500"/>
-              </a:spcBef>
-              <a:buFont typeface="Arial" panose="020B0604020202020204" pitchFamily="34" charset="0"/>
-              <a:buChar char="•"/>
-              <a:defRPr sz="1800" kern="1200">
-                <a:solidFill>
-                  <a:schemeClr val="tx1"/>
-                </a:solidFill>
-                <a:latin typeface="+mn-lt"/>
-                <a:ea typeface="+mn-ea"/>
-                <a:cs typeface="+mn-cs"/>
-              </a:defRPr>
-            </a:lvl8pPr>
-            <a:lvl9pPr marL="3886200" indent="-228600" algn="l" defTabSz="914400" rtl="0" eaLnBrk="1" latinLnBrk="0" hangingPunct="1">
-              <a:lnSpc>
-                <a:spcPct val="90000"/>
-              </a:lnSpc>
-              <a:spcBef>
-                <a:spcPts val="500"/>
-              </a:spcBef>
-              <a:buFont typeface="Arial" panose="020B0604020202020204" pitchFamily="34" charset="0"/>
-              <a:buChar char="•"/>
-              <a:defRPr sz="1800" kern="1200">
-                <a:solidFill>
-                  <a:schemeClr val="tx1"/>
-                </a:solidFill>
-                <a:latin typeface="+mn-lt"/>
-                <a:ea typeface="+mn-ea"/>
-                <a:cs typeface="+mn-cs"/>
-              </a:defRPr>
-            </a:lvl9pPr>
-          </a:lstStyle>
-          <a:p>
-            <a:pPr marL="0" indent="0">
-              <a:buNone/>
-            </a:pPr>
-            <a:r>
-              <a:rPr lang="en-US" sz="1100" dirty="0"/>
-              <a:t>2. Specify </a:t>
-            </a:r>
-            <a:r>
-              <a:rPr lang="en-US" sz="1100" dirty="0" smtClean="0"/>
-              <a:t>one clinical trial name</a:t>
-            </a:r>
-            <a:endParaRPr lang="en-US" sz="1100" dirty="0">
-              <a:highlight>
-                <a:srgbClr val="CCECFF"/>
-              </a:highlight>
-            </a:endParaRPr>
-          </a:p>
-        </p:txBody>
-      </p:sp>
-      <p:sp>
-        <p:nvSpPr>
-          <p:cNvPr id="13" name="Content Placeholder 2"/>
-          <p:cNvSpPr txBox="1">
-            <a:spLocks/>
-          </p:cNvSpPr>
-          <p:nvPr/>
-        </p:nvSpPr>
-        <p:spPr>
-          <a:xfrm>
-            <a:off x="6098837" y="1677395"/>
-            <a:ext cx="1280746" cy="1827272"/>
-          </a:xfrm>
-          <a:prstGeom prst="rect">
-            <a:avLst/>
-          </a:prstGeom>
-        </p:spPr>
-        <p:txBody>
-          <a:bodyPr vert="horz" lIns="91440" tIns="45720" rIns="91440" bIns="45720" rtlCol="0">
-            <a:noAutofit/>
-          </a:bodyPr>
-          <a:lstStyle>
-            <a:lvl1pPr marL="228600" indent="-228600" algn="l" defTabSz="914400" rtl="0" eaLnBrk="1" latinLnBrk="0" hangingPunct="1">
-              <a:lnSpc>
-                <a:spcPct val="90000"/>
-              </a:lnSpc>
-              <a:spcBef>
-                <a:spcPts val="1000"/>
-              </a:spcBef>
-              <a:buFont typeface="Arial" panose="020B0604020202020204" pitchFamily="34" charset="0"/>
-              <a:buChar char="•"/>
-              <a:defRPr sz="2800" kern="1200">
-                <a:solidFill>
-                  <a:schemeClr val="tx1"/>
-                </a:solidFill>
-                <a:latin typeface="+mn-lt"/>
-                <a:ea typeface="+mn-ea"/>
-                <a:cs typeface="+mn-cs"/>
-              </a:defRPr>
-            </a:lvl1pPr>
-            <a:lvl2pPr marL="685800" indent="-228600" algn="l" defTabSz="914400" rtl="0" eaLnBrk="1" latinLnBrk="0" hangingPunct="1">
-              <a:lnSpc>
-                <a:spcPct val="90000"/>
-              </a:lnSpc>
-              <a:spcBef>
-                <a:spcPts val="500"/>
-              </a:spcBef>
-              <a:buFont typeface="Arial" panose="020B0604020202020204" pitchFamily="34" charset="0"/>
-              <a:buChar char="•"/>
-              <a:defRPr sz="2400" kern="1200">
-                <a:solidFill>
-                  <a:schemeClr val="tx1"/>
-                </a:solidFill>
-                <a:latin typeface="+mn-lt"/>
-                <a:ea typeface="+mn-ea"/>
-                <a:cs typeface="+mn-cs"/>
-              </a:defRPr>
-            </a:lvl2pPr>
-            <a:lvl3pPr marL="1143000" indent="-228600" algn="l" defTabSz="914400" rtl="0" eaLnBrk="1" latinLnBrk="0" hangingPunct="1">
-              <a:lnSpc>
-                <a:spcPct val="90000"/>
-              </a:lnSpc>
-              <a:spcBef>
-                <a:spcPts val="500"/>
-              </a:spcBef>
-              <a:buFont typeface="Arial" panose="020B0604020202020204" pitchFamily="34" charset="0"/>
-              <a:buChar char="•"/>
-              <a:defRPr sz="2000" kern="1200">
-                <a:solidFill>
-                  <a:schemeClr val="tx1"/>
-                </a:solidFill>
-                <a:latin typeface="+mn-lt"/>
-                <a:ea typeface="+mn-ea"/>
-                <a:cs typeface="+mn-cs"/>
-              </a:defRPr>
-            </a:lvl3pPr>
-            <a:lvl4pPr marL="1600200" indent="-228600" algn="l" defTabSz="914400" rtl="0" eaLnBrk="1" latinLnBrk="0" hangingPunct="1">
-              <a:lnSpc>
-                <a:spcPct val="90000"/>
-              </a:lnSpc>
-              <a:spcBef>
-                <a:spcPts val="500"/>
-              </a:spcBef>
-              <a:buFont typeface="Arial" panose="020B0604020202020204" pitchFamily="34" charset="0"/>
-              <a:buChar char="•"/>
-              <a:defRPr sz="1800" kern="1200">
-                <a:solidFill>
-                  <a:schemeClr val="tx1"/>
-                </a:solidFill>
-                <a:latin typeface="+mn-lt"/>
-                <a:ea typeface="+mn-ea"/>
-                <a:cs typeface="+mn-cs"/>
-              </a:defRPr>
-            </a:lvl4pPr>
-            <a:lvl5pPr marL="2057400" indent="-228600" algn="l" defTabSz="914400" rtl="0" eaLnBrk="1" latinLnBrk="0" hangingPunct="1">
-              <a:lnSpc>
-                <a:spcPct val="90000"/>
-              </a:lnSpc>
-              <a:spcBef>
-                <a:spcPts val="500"/>
-              </a:spcBef>
-              <a:buFont typeface="Arial" panose="020B0604020202020204" pitchFamily="34" charset="0"/>
-              <a:buChar char="•"/>
-              <a:defRPr sz="1800" kern="1200">
-                <a:solidFill>
-                  <a:schemeClr val="tx1"/>
-                </a:solidFill>
-                <a:latin typeface="+mn-lt"/>
-                <a:ea typeface="+mn-ea"/>
-                <a:cs typeface="+mn-cs"/>
-              </a:defRPr>
-            </a:lvl5pPr>
-            <a:lvl6pPr marL="2514600" indent="-228600" algn="l" defTabSz="914400" rtl="0" eaLnBrk="1" latinLnBrk="0" hangingPunct="1">
-              <a:lnSpc>
-                <a:spcPct val="90000"/>
-              </a:lnSpc>
-              <a:spcBef>
-                <a:spcPts val="500"/>
-              </a:spcBef>
-              <a:buFont typeface="Arial" panose="020B0604020202020204" pitchFamily="34" charset="0"/>
-              <a:buChar char="•"/>
-              <a:defRPr sz="1800" kern="1200">
-                <a:solidFill>
-                  <a:schemeClr val="tx1"/>
-                </a:solidFill>
-                <a:latin typeface="+mn-lt"/>
-                <a:ea typeface="+mn-ea"/>
-                <a:cs typeface="+mn-cs"/>
-              </a:defRPr>
-            </a:lvl6pPr>
-            <a:lvl7pPr marL="2971800" indent="-228600" algn="l" defTabSz="914400" rtl="0" eaLnBrk="1" latinLnBrk="0" hangingPunct="1">
-              <a:lnSpc>
-                <a:spcPct val="90000"/>
-              </a:lnSpc>
-              <a:spcBef>
-                <a:spcPts val="500"/>
-              </a:spcBef>
-              <a:buFont typeface="Arial" panose="020B0604020202020204" pitchFamily="34" charset="0"/>
-              <a:buChar char="•"/>
-              <a:defRPr sz="1800" kern="1200">
-                <a:solidFill>
-                  <a:schemeClr val="tx1"/>
-                </a:solidFill>
-                <a:latin typeface="+mn-lt"/>
-                <a:ea typeface="+mn-ea"/>
-                <a:cs typeface="+mn-cs"/>
-              </a:defRPr>
-            </a:lvl7pPr>
-            <a:lvl8pPr marL="3429000" indent="-228600" algn="l" defTabSz="914400" rtl="0" eaLnBrk="1" latinLnBrk="0" hangingPunct="1">
-              <a:lnSpc>
-                <a:spcPct val="90000"/>
-              </a:lnSpc>
-              <a:spcBef>
-                <a:spcPts val="500"/>
-              </a:spcBef>
-              <a:buFont typeface="Arial" panose="020B0604020202020204" pitchFamily="34" charset="0"/>
-              <a:buChar char="•"/>
-              <a:defRPr sz="1800" kern="1200">
-                <a:solidFill>
-                  <a:schemeClr val="tx1"/>
-                </a:solidFill>
-                <a:latin typeface="+mn-lt"/>
-                <a:ea typeface="+mn-ea"/>
-                <a:cs typeface="+mn-cs"/>
-              </a:defRPr>
-            </a:lvl8pPr>
-            <a:lvl9pPr marL="3886200" indent="-228600" algn="l" defTabSz="914400" rtl="0" eaLnBrk="1" latinLnBrk="0" hangingPunct="1">
-              <a:lnSpc>
-                <a:spcPct val="90000"/>
-              </a:lnSpc>
-              <a:spcBef>
-                <a:spcPts val="500"/>
-              </a:spcBef>
-              <a:buFont typeface="Arial" panose="020B0604020202020204" pitchFamily="34" charset="0"/>
-              <a:buChar char="•"/>
-              <a:defRPr sz="1800" kern="1200">
-                <a:solidFill>
-                  <a:schemeClr val="tx1"/>
-                </a:solidFill>
-                <a:latin typeface="+mn-lt"/>
-                <a:ea typeface="+mn-ea"/>
-                <a:cs typeface="+mn-cs"/>
-              </a:defRPr>
-            </a:lvl9pPr>
-          </a:lstStyle>
-          <a:p>
-            <a:pPr marL="0" indent="0">
-              <a:buNone/>
-            </a:pPr>
-            <a:r>
-              <a:rPr lang="en-US" sz="1100" dirty="0"/>
-              <a:t>3. </a:t>
-            </a:r>
-            <a:r>
-              <a:rPr lang="en-US" sz="1100" dirty="0" smtClean="0"/>
-              <a:t>The </a:t>
-            </a:r>
-            <a:r>
-              <a:rPr lang="en-US" sz="1100" dirty="0">
-                <a:highlight>
-                  <a:srgbClr val="CCECFF"/>
-                </a:highlight>
-              </a:rPr>
-              <a:t>#enrolled on</a:t>
-            </a:r>
-            <a:r>
-              <a:rPr lang="en-US" sz="1100" dirty="0"/>
-              <a:t> </a:t>
-            </a:r>
-            <a:r>
-              <a:rPr lang="en-US" sz="1100" dirty="0" smtClean="0"/>
-              <a:t>date is the date the patient was enrolled in the specified clinical trial.</a:t>
-            </a:r>
-            <a:endParaRPr lang="pt-BR" sz="1100" dirty="0">
-              <a:highlight>
-                <a:srgbClr val="CCECFF"/>
-              </a:highlight>
-            </a:endParaRPr>
-          </a:p>
-        </p:txBody>
-      </p:sp>
-      <p:sp>
-        <p:nvSpPr>
-          <p:cNvPr id="14" name="Content Placeholder 2"/>
-          <p:cNvSpPr txBox="1">
-            <a:spLocks/>
-          </p:cNvSpPr>
-          <p:nvPr/>
-        </p:nvSpPr>
-        <p:spPr>
-          <a:xfrm>
-            <a:off x="9129522" y="1675869"/>
-            <a:ext cx="1280746" cy="1919885"/>
-          </a:xfrm>
-          <a:prstGeom prst="rect">
-            <a:avLst/>
-          </a:prstGeom>
-        </p:spPr>
-        <p:txBody>
-          <a:bodyPr vert="horz" lIns="91440" tIns="45720" rIns="91440" bIns="45720" rtlCol="0">
-            <a:normAutofit/>
-          </a:bodyPr>
-          <a:lstStyle>
-            <a:lvl1pPr marL="228600" indent="-228600" algn="l" defTabSz="914400" rtl="0" eaLnBrk="1" latinLnBrk="0" hangingPunct="1">
-              <a:lnSpc>
-                <a:spcPct val="90000"/>
-              </a:lnSpc>
-              <a:spcBef>
-                <a:spcPts val="1000"/>
-              </a:spcBef>
-              <a:buFont typeface="Arial" panose="020B0604020202020204" pitchFamily="34" charset="0"/>
-              <a:buChar char="•"/>
-              <a:defRPr sz="2800" kern="1200">
-                <a:solidFill>
-                  <a:schemeClr val="tx1"/>
-                </a:solidFill>
-                <a:latin typeface="+mn-lt"/>
-                <a:ea typeface="+mn-ea"/>
-                <a:cs typeface="+mn-cs"/>
-              </a:defRPr>
-            </a:lvl1pPr>
-            <a:lvl2pPr marL="685800" indent="-228600" algn="l" defTabSz="914400" rtl="0" eaLnBrk="1" latinLnBrk="0" hangingPunct="1">
-              <a:lnSpc>
-                <a:spcPct val="90000"/>
-              </a:lnSpc>
-              <a:spcBef>
-                <a:spcPts val="500"/>
-              </a:spcBef>
-              <a:buFont typeface="Arial" panose="020B0604020202020204" pitchFamily="34" charset="0"/>
-              <a:buChar char="•"/>
-              <a:defRPr sz="2400" kern="1200">
-                <a:solidFill>
-                  <a:schemeClr val="tx1"/>
-                </a:solidFill>
-                <a:latin typeface="+mn-lt"/>
-                <a:ea typeface="+mn-ea"/>
-                <a:cs typeface="+mn-cs"/>
-              </a:defRPr>
-            </a:lvl2pPr>
-            <a:lvl3pPr marL="1143000" indent="-228600" algn="l" defTabSz="914400" rtl="0" eaLnBrk="1" latinLnBrk="0" hangingPunct="1">
-              <a:lnSpc>
-                <a:spcPct val="90000"/>
-              </a:lnSpc>
-              <a:spcBef>
-                <a:spcPts val="500"/>
-              </a:spcBef>
-              <a:buFont typeface="Arial" panose="020B0604020202020204" pitchFamily="34" charset="0"/>
-              <a:buChar char="•"/>
-              <a:defRPr sz="2000" kern="1200">
-                <a:solidFill>
-                  <a:schemeClr val="tx1"/>
-                </a:solidFill>
-                <a:latin typeface="+mn-lt"/>
-                <a:ea typeface="+mn-ea"/>
-                <a:cs typeface="+mn-cs"/>
-              </a:defRPr>
-            </a:lvl3pPr>
-            <a:lvl4pPr marL="1600200" indent="-228600" algn="l" defTabSz="914400" rtl="0" eaLnBrk="1" latinLnBrk="0" hangingPunct="1">
-              <a:lnSpc>
-                <a:spcPct val="90000"/>
-              </a:lnSpc>
-              <a:spcBef>
-                <a:spcPts val="500"/>
-              </a:spcBef>
-              <a:buFont typeface="Arial" panose="020B0604020202020204" pitchFamily="34" charset="0"/>
-              <a:buChar char="•"/>
-              <a:defRPr sz="1800" kern="1200">
-                <a:solidFill>
-                  <a:schemeClr val="tx1"/>
-                </a:solidFill>
-                <a:latin typeface="+mn-lt"/>
-                <a:ea typeface="+mn-ea"/>
-                <a:cs typeface="+mn-cs"/>
-              </a:defRPr>
-            </a:lvl4pPr>
-            <a:lvl5pPr marL="2057400" indent="-228600" algn="l" defTabSz="914400" rtl="0" eaLnBrk="1" latinLnBrk="0" hangingPunct="1">
-              <a:lnSpc>
-                <a:spcPct val="90000"/>
-              </a:lnSpc>
-              <a:spcBef>
-                <a:spcPts val="500"/>
-              </a:spcBef>
-              <a:buFont typeface="Arial" panose="020B0604020202020204" pitchFamily="34" charset="0"/>
-              <a:buChar char="•"/>
-              <a:defRPr sz="1800" kern="1200">
-                <a:solidFill>
-                  <a:schemeClr val="tx1"/>
-                </a:solidFill>
-                <a:latin typeface="+mn-lt"/>
-                <a:ea typeface="+mn-ea"/>
-                <a:cs typeface="+mn-cs"/>
-              </a:defRPr>
-            </a:lvl5pPr>
-            <a:lvl6pPr marL="2514600" indent="-228600" algn="l" defTabSz="914400" rtl="0" eaLnBrk="1" latinLnBrk="0" hangingPunct="1">
-              <a:lnSpc>
-                <a:spcPct val="90000"/>
-              </a:lnSpc>
-              <a:spcBef>
-                <a:spcPts val="500"/>
-              </a:spcBef>
-              <a:buFont typeface="Arial" panose="020B0604020202020204" pitchFamily="34" charset="0"/>
-              <a:buChar char="•"/>
-              <a:defRPr sz="1800" kern="1200">
-                <a:solidFill>
-                  <a:schemeClr val="tx1"/>
-                </a:solidFill>
-                <a:latin typeface="+mn-lt"/>
-                <a:ea typeface="+mn-ea"/>
-                <a:cs typeface="+mn-cs"/>
-              </a:defRPr>
-            </a:lvl6pPr>
-            <a:lvl7pPr marL="2971800" indent="-228600" algn="l" defTabSz="914400" rtl="0" eaLnBrk="1" latinLnBrk="0" hangingPunct="1">
-              <a:lnSpc>
-                <a:spcPct val="90000"/>
-              </a:lnSpc>
-              <a:spcBef>
-                <a:spcPts val="500"/>
-              </a:spcBef>
-              <a:buFont typeface="Arial" panose="020B0604020202020204" pitchFamily="34" charset="0"/>
-              <a:buChar char="•"/>
-              <a:defRPr sz="1800" kern="1200">
-                <a:solidFill>
-                  <a:schemeClr val="tx1"/>
-                </a:solidFill>
-                <a:latin typeface="+mn-lt"/>
-                <a:ea typeface="+mn-ea"/>
-                <a:cs typeface="+mn-cs"/>
-              </a:defRPr>
-            </a:lvl7pPr>
-            <a:lvl8pPr marL="3429000" indent="-228600" algn="l" defTabSz="914400" rtl="0" eaLnBrk="1" latinLnBrk="0" hangingPunct="1">
-              <a:lnSpc>
-                <a:spcPct val="90000"/>
-              </a:lnSpc>
-              <a:spcBef>
-                <a:spcPts val="500"/>
-              </a:spcBef>
-              <a:buFont typeface="Arial" panose="020B0604020202020204" pitchFamily="34" charset="0"/>
-              <a:buChar char="•"/>
-              <a:defRPr sz="1800" kern="1200">
-                <a:solidFill>
-                  <a:schemeClr val="tx1"/>
-                </a:solidFill>
-                <a:latin typeface="+mn-lt"/>
-                <a:ea typeface="+mn-ea"/>
-                <a:cs typeface="+mn-cs"/>
-              </a:defRPr>
-            </a:lvl8pPr>
-            <a:lvl9pPr marL="3886200" indent="-228600" algn="l" defTabSz="914400" rtl="0" eaLnBrk="1" latinLnBrk="0" hangingPunct="1">
-              <a:lnSpc>
-                <a:spcPct val="90000"/>
-              </a:lnSpc>
-              <a:spcBef>
-                <a:spcPts val="500"/>
-              </a:spcBef>
-              <a:buFont typeface="Arial" panose="020B0604020202020204" pitchFamily="34" charset="0"/>
-              <a:buChar char="•"/>
-              <a:defRPr sz="1800" kern="1200">
-                <a:solidFill>
-                  <a:schemeClr val="tx1"/>
-                </a:solidFill>
-                <a:latin typeface="+mn-lt"/>
-                <a:ea typeface="+mn-ea"/>
-                <a:cs typeface="+mn-cs"/>
-              </a:defRPr>
-            </a:lvl9pPr>
-          </a:lstStyle>
-          <a:p>
-            <a:pPr marL="0" indent="0">
-              <a:buNone/>
-            </a:pPr>
-            <a:r>
-              <a:rPr lang="en-US" sz="1100" dirty="0"/>
-              <a:t>4. </a:t>
-            </a:r>
-            <a:r>
-              <a:rPr lang="en-US" sz="1100" dirty="0" smtClean="0"/>
-              <a:t>The </a:t>
-            </a:r>
-            <a:r>
-              <a:rPr lang="en-US" sz="1100" dirty="0">
-                <a:highlight>
-                  <a:srgbClr val="CCECFF"/>
-                </a:highlight>
-              </a:rPr>
-              <a:t>#ended on</a:t>
-            </a:r>
-            <a:r>
-              <a:rPr lang="en-US" sz="1100" dirty="0"/>
-              <a:t> </a:t>
-            </a:r>
-            <a:r>
-              <a:rPr lang="en-US" sz="1100" dirty="0" smtClean="0"/>
-              <a:t> date is the date the patient ended or left the specified clinical trial.</a:t>
-            </a:r>
-            <a:endParaRPr lang="en-US" sz="1100" dirty="0"/>
           </a:p>
         </p:txBody>
       </p:sp>
@@ -15533,40 +14818,8 @@
               <a:buNone/>
             </a:pPr>
             <a:r>
-              <a:rPr lang="de-DE" sz="1600" dirty="0" smtClean="0"/>
-              <a:t>The </a:t>
-            </a:r>
-            <a:r>
-              <a:rPr lang="de-DE" sz="1600" dirty="0" err="1" smtClean="0"/>
-              <a:t>patient</a:t>
-            </a:r>
-            <a:r>
-              <a:rPr lang="de-DE" sz="1600" dirty="0" smtClean="0"/>
-              <a:t> </a:t>
-            </a:r>
-            <a:r>
-              <a:rPr lang="de-DE" sz="1600" dirty="0" err="1" smtClean="0"/>
-              <a:t>is</a:t>
-            </a:r>
-            <a:r>
-              <a:rPr lang="de-DE" sz="1600" dirty="0" smtClean="0"/>
-              <a:t> </a:t>
-            </a:r>
-            <a:r>
-              <a:rPr lang="de-DE" sz="1600" dirty="0" err="1" smtClean="0"/>
-              <a:t>enrolled</a:t>
-            </a:r>
-            <a:r>
-              <a:rPr lang="de-DE" sz="1600" dirty="0" smtClean="0"/>
-              <a:t> in </a:t>
-            </a:r>
-            <a:r>
-              <a:rPr lang="en-US" sz="1600" dirty="0" smtClean="0">
-                <a:highlight>
-                  <a:srgbClr val="CCECFF"/>
-                </a:highlight>
-              </a:rPr>
-              <a:t>#clinical </a:t>
+              <a:rPr lang="en-US" sz="1600" dirty="0"/>
+              <a:t>Patient </a:t>
             </a:r>
             <a:r>
               <a:rPr lang="en-US" sz="1600" dirty="0">
@@ -15574,39 +14827,11 @@
                   <a:srgbClr val="CCECFF"/>
                 </a:highlight>
               </a:rPr>
-              <a:t>trial</a:t>
+              <a:t>#deceased</a:t>
             </a:r>
             <a:r>
               <a:rPr lang="en-US" sz="1600" dirty="0"/>
-              <a:t> </a:t>
-            </a:r>
-            <a:r>
-              <a:rPr lang="en-US" sz="1600" dirty="0" smtClean="0">
-                <a:highlight>
-                  <a:srgbClr val="CCECFF"/>
-                </a:highlight>
-              </a:rPr>
-              <a:t>#PATINA</a:t>
-            </a:r>
-            <a:r>
-              <a:rPr lang="de-DE" sz="1600" dirty="0" smtClean="0"/>
-              <a:t> </a:t>
-            </a:r>
-            <a:r>
-              <a:rPr lang="de-DE" sz="1600" dirty="0" err="1" smtClean="0"/>
-              <a:t>and</a:t>
-            </a:r>
-            <a:r>
-              <a:rPr lang="de-DE" sz="1600" dirty="0" smtClean="0"/>
-              <a:t> </a:t>
-            </a:r>
-            <a:r>
-              <a:rPr lang="en-US" sz="1600" dirty="0" smtClean="0">
-                <a:highlight>
-                  <a:srgbClr val="CCECFF"/>
-                </a:highlight>
-              </a:rPr>
-              <a:t> </a:t>
+              <a:t> on </a:t>
             </a:r>
             <a:r>
               <a:rPr lang="en-US" sz="1600" dirty="0">
@@ -15614,134 +14839,9 @@
                   <a:srgbClr val="CCECFF"/>
                 </a:highlight>
               </a:rPr>
-              <a:t>#enrolled on</a:t>
-            </a:r>
-            <a:r>
-              <a:rPr lang="de-DE" sz="1600" dirty="0" smtClean="0"/>
-              <a:t> </a:t>
-            </a:r>
-            <a:r>
-              <a:rPr lang="en-US" sz="1600" dirty="0">
-                <a:highlight>
-                  <a:srgbClr val="CCECFF"/>
-                </a:highlight>
-              </a:rPr>
-              <a:t>#</a:t>
-            </a:r>
-            <a:r>
-              <a:rPr lang="en-US" sz="1600" dirty="0" smtClean="0">
-                <a:highlight>
-                  <a:srgbClr val="CCECFF"/>
-                </a:highlight>
-              </a:rPr>
-              <a:t>01/01/2017</a:t>
-            </a:r>
-            <a:r>
-              <a:rPr lang="de-DE" sz="1600" dirty="0" smtClean="0"/>
-              <a:t>.</a:t>
-            </a:r>
-          </a:p>
-          <a:p>
-            <a:pPr marL="0" indent="0">
-              <a:buNone/>
-            </a:pPr>
-            <a:r>
-              <a:rPr lang="en-US" sz="1600" dirty="0" smtClean="0">
-                <a:highlight>
-                  <a:srgbClr val="CCECFF"/>
-                </a:highlight>
-              </a:rPr>
-              <a:t>#Clinical trial</a:t>
-            </a:r>
-            <a:r>
-              <a:rPr lang="de-DE" sz="1600" dirty="0" smtClean="0"/>
-              <a:t> </a:t>
-            </a:r>
-            <a:r>
-              <a:rPr lang="de-DE" sz="1600" dirty="0" err="1" smtClean="0"/>
-              <a:t>for</a:t>
-            </a:r>
-            <a:r>
-              <a:rPr lang="de-DE" sz="1600" dirty="0" smtClean="0"/>
-              <a:t> </a:t>
-            </a:r>
-            <a:r>
-              <a:rPr lang="de-DE" sz="1600" dirty="0" err="1" smtClean="0"/>
-              <a:t>the</a:t>
-            </a:r>
-            <a:r>
-              <a:rPr lang="de-DE" sz="1600" dirty="0" smtClean="0"/>
-              <a:t> </a:t>
-            </a:r>
-            <a:r>
-              <a:rPr lang="de-DE" sz="1600" dirty="0" err="1" smtClean="0"/>
-              <a:t>patient</a:t>
-            </a:r>
-            <a:r>
-              <a:rPr lang="de-DE" sz="1600" dirty="0" smtClean="0"/>
-              <a:t> </a:t>
-            </a:r>
-            <a:r>
-              <a:rPr lang="en-US" sz="1600" dirty="0" smtClean="0">
-                <a:highlight>
-                  <a:srgbClr val="CCECFF"/>
-                </a:highlight>
-              </a:rPr>
-              <a:t>#ended on</a:t>
-            </a:r>
-            <a:r>
-              <a:rPr lang="en-US" sz="1600" dirty="0" smtClean="0"/>
-              <a:t> </a:t>
-            </a:r>
-            <a:r>
-              <a:rPr lang="en-US" sz="1600" dirty="0" smtClean="0">
-                <a:highlight>
-                  <a:srgbClr val="CCECFF"/>
-                </a:highlight>
-              </a:rPr>
-              <a:t>#10/10/2017</a:t>
-            </a:r>
-            <a:r>
-              <a:rPr lang="en-US" sz="1600" dirty="0" smtClean="0"/>
-              <a:t> due to surgery. The </a:t>
-            </a:r>
-            <a:r>
-              <a:rPr lang="en-US" sz="1600" dirty="0" smtClean="0">
-                <a:highlight>
-                  <a:srgbClr val="CCECFF"/>
-                </a:highlight>
-              </a:rPr>
-              <a:t>#PATINA</a:t>
-            </a:r>
-            <a:r>
-              <a:rPr lang="en-US" sz="1600" dirty="0" smtClean="0"/>
-              <a:t> clinical trial was </a:t>
-            </a:r>
-            <a:r>
-              <a:rPr lang="en-US" sz="1600" dirty="0" smtClean="0">
-                <a:highlight>
-                  <a:srgbClr val="CCECFF"/>
-                </a:highlight>
-              </a:rPr>
-              <a:t>#enrolled on</a:t>
-            </a:r>
-            <a:r>
-              <a:rPr lang="en-US" sz="1600" dirty="0" smtClean="0"/>
-              <a:t> </a:t>
-            </a:r>
-            <a:r>
-              <a:rPr lang="en-US" sz="1600" dirty="0" smtClean="0">
-                <a:highlight>
-                  <a:srgbClr val="CCECFF"/>
-                </a:highlight>
-              </a:rPr>
-              <a:t>#01/01/2017</a:t>
-            </a:r>
-            <a:r>
-              <a:rPr lang="en-US" sz="1600" dirty="0" smtClean="0"/>
-              <a:t>. </a:t>
-            </a:r>
-            <a:endParaRPr lang="de-DE" sz="1600" dirty="0"/>
+              <a:t>#06/06/2016</a:t>
+            </a:r>
+            <a:endParaRPr lang="en-US" sz="1600" dirty="0"/>
           </a:p>
         </p:txBody>
       </p:sp>
@@ -15755,7 +14855,7 @@
         </p:nvSpPr>
         <p:spPr>
           <a:xfrm>
-            <a:off x="3444963" y="5529013"/>
+            <a:off x="3785620" y="5075908"/>
             <a:ext cx="2049280" cy="720755"/>
           </a:xfrm>
           <a:prstGeom prst="rect">
@@ -15935,8 +15035,8 @@
               <a:buNone/>
             </a:pPr>
             <a:r>
-              <a:rPr lang="en-US" sz="1100" dirty="0" smtClean="0"/>
-              <a:t>Trial name, </a:t>
+              <a:rPr lang="en-US" sz="1100" dirty="0"/>
+              <a:t>Free text can be entered between the </a:t>
             </a:r>
             <a:r>
               <a:rPr lang="en-US" sz="1100" dirty="0">
@@ -15944,188 +15044,27 @@
                   <a:srgbClr val="CCECFF"/>
                 </a:highlight>
               </a:rPr>
-              <a:t>#</a:t>
-            </a:r>
-            <a:r>
-              <a:rPr lang="en-US" sz="1100" dirty="0" smtClean="0">
-                <a:highlight>
-                  <a:srgbClr val="CCECFF"/>
-                </a:highlight>
-              </a:rPr>
-              <a:t>enrolled on</a:t>
-            </a:r>
-            <a:r>
-              <a:rPr lang="en-US" sz="1100" dirty="0" smtClean="0"/>
-              <a:t>, and </a:t>
-            </a:r>
-            <a:r>
-              <a:rPr lang="en-US" sz="1100" dirty="0">
-                <a:highlight>
-                  <a:srgbClr val="CCECFF"/>
-                </a:highlight>
-              </a:rPr>
-              <a:t>#ended on</a:t>
-            </a:r>
-            <a:r>
-              <a:rPr lang="en-US" sz="1100" dirty="0" smtClean="0"/>
-              <a:t> dates can be specified in any order.   </a:t>
-            </a:r>
-            <a:endParaRPr lang="en-US" sz="1100" dirty="0"/>
+              <a:t>#deceased</a:t>
+            </a:r>
+            <a:r>
+              <a:rPr lang="en-US" sz="1100" dirty="0"/>
+              <a:t> and date value.</a:t>
+            </a:r>
           </a:p>
         </p:txBody>
       </p:sp>
       <p:cxnSp>
         <p:nvCxnSpPr>
-          <p:cNvPr id="24" name="Straight Connector 23"/>
-          <p:cNvCxnSpPr/>
+          <p:cNvPr id="30" name="Straight Connector 29"/>
+          <p:cNvCxnSpPr>
+            <a:cxnSpLocks/>
+          </p:cNvCxnSpPr>
           <p:nvPr/>
         </p:nvCxnSpPr>
         <p:spPr>
-          <a:xfrm flipH="1" flipV="1">
-            <a:off x="4853469" y="1277657"/>
-            <a:ext cx="2738" cy="350040"/>
-          </a:xfrm>
-          <a:prstGeom prst="line">
-            <a:avLst/>
-          </a:prstGeom>
-          <a:ln>
-            <a:solidFill>
-              <a:schemeClr val="tx1"/>
-            </a:solidFill>
-          </a:ln>
-        </p:spPr>
-        <p:style>
-          <a:lnRef idx="1">
-            <a:schemeClr val="accent1"/>
-          </a:lnRef>
-          <a:fillRef idx="0">
-            <a:schemeClr val="accent1"/>
-          </a:fillRef>
-          <a:effectRef idx="0">
-            <a:schemeClr val="accent1"/>
-          </a:effectRef>
-          <a:fontRef idx="minor">
-            <a:schemeClr val="tx1"/>
-          </a:fontRef>
-        </p:style>
-      </p:cxnSp>
-      <p:cxnSp>
-        <p:nvCxnSpPr>
-          <p:cNvPr id="27" name="Straight Connector 26"/>
-          <p:cNvCxnSpPr/>
-          <p:nvPr/>
-        </p:nvCxnSpPr>
-        <p:spPr>
-          <a:xfrm flipH="1" flipV="1">
-            <a:off x="6198378" y="1294405"/>
-            <a:ext cx="2738" cy="350040"/>
-          </a:xfrm>
-          <a:prstGeom prst="line">
-            <a:avLst/>
-          </a:prstGeom>
-          <a:ln>
-            <a:solidFill>
-              <a:schemeClr val="bg1">
-                <a:lumMod val="50000"/>
-              </a:schemeClr>
-            </a:solidFill>
-          </a:ln>
-        </p:spPr>
-        <p:style>
-          <a:lnRef idx="1">
-            <a:schemeClr val="accent1"/>
-          </a:lnRef>
-          <a:fillRef idx="0">
-            <a:schemeClr val="accent1"/>
-          </a:fillRef>
-          <a:effectRef idx="0">
-            <a:schemeClr val="accent1"/>
-          </a:effectRef>
-          <a:fontRef idx="minor">
-            <a:schemeClr val="tx1"/>
-          </a:fontRef>
-        </p:style>
-      </p:cxnSp>
-      <p:cxnSp>
-        <p:nvCxnSpPr>
-          <p:cNvPr id="28" name="Straight Connector 27"/>
-          <p:cNvCxnSpPr/>
-          <p:nvPr/>
-        </p:nvCxnSpPr>
-        <p:spPr>
-          <a:xfrm flipH="1" flipV="1">
-            <a:off x="9227903" y="1294401"/>
-            <a:ext cx="2738" cy="350040"/>
-          </a:xfrm>
-          <a:prstGeom prst="line">
-            <a:avLst/>
-          </a:prstGeom>
-          <a:ln>
-            <a:solidFill>
-              <a:schemeClr val="tx1"/>
-            </a:solidFill>
-          </a:ln>
-        </p:spPr>
-        <p:style>
-          <a:lnRef idx="1">
-            <a:schemeClr val="accent1"/>
-          </a:lnRef>
-          <a:fillRef idx="0">
-            <a:schemeClr val="accent1"/>
-          </a:fillRef>
-          <a:effectRef idx="0">
-            <a:schemeClr val="accent1"/>
-          </a:effectRef>
-          <a:fontRef idx="minor">
-            <a:schemeClr val="tx1"/>
-          </a:fontRef>
-        </p:style>
-      </p:cxnSp>
-      <p:cxnSp>
-        <p:nvCxnSpPr>
-          <p:cNvPr id="29" name="Straight Connector 28"/>
-          <p:cNvCxnSpPr/>
-          <p:nvPr/>
-        </p:nvCxnSpPr>
-        <p:spPr>
-          <a:xfrm flipH="1" flipV="1">
-            <a:off x="3440236" y="1308247"/>
-            <a:ext cx="2738" cy="350040"/>
-          </a:xfrm>
-          <a:prstGeom prst="line">
-            <a:avLst/>
-          </a:prstGeom>
-          <a:ln>
-            <a:solidFill>
-              <a:schemeClr val="tx1"/>
-            </a:solidFill>
-          </a:ln>
-        </p:spPr>
-        <p:style>
-          <a:lnRef idx="1">
-            <a:schemeClr val="accent1"/>
-          </a:lnRef>
-          <a:fillRef idx="0">
-            <a:schemeClr val="accent1"/>
-          </a:fillRef>
-          <a:effectRef idx="0">
-            <a:schemeClr val="accent1"/>
-          </a:effectRef>
-          <a:fontRef idx="minor">
-            <a:schemeClr val="tx1"/>
-          </a:fontRef>
-        </p:style>
-      </p:cxnSp>
-      <p:cxnSp>
-        <p:nvCxnSpPr>
-          <p:cNvPr id="30" name="Straight Connector 29"/>
-          <p:cNvCxnSpPr/>
-          <p:nvPr/>
-        </p:nvCxnSpPr>
-        <p:spPr>
-          <a:xfrm flipH="1" flipV="1">
-            <a:off x="2285925" y="4920129"/>
-            <a:ext cx="1369" cy="465593"/>
+          <a:xfrm flipV="1">
+            <a:off x="2840752" y="4439918"/>
+            <a:ext cx="1" cy="466422"/>
           </a:xfrm>
           <a:prstGeom prst="line">
             <a:avLst/>
@@ -16154,13 +15093,266 @@
       <p:cxnSp>
         <p:nvCxnSpPr>
           <p:cNvPr id="51" name="Straight Connector 50"/>
-          <p:cNvCxnSpPr/>
+          <p:cNvCxnSpPr>
+            <a:cxnSpLocks/>
+          </p:cNvCxnSpPr>
           <p:nvPr/>
         </p:nvCxnSpPr>
         <p:spPr>
-          <a:xfrm flipH="1" flipV="1">
-            <a:off x="3563239" y="4993801"/>
-            <a:ext cx="1369" cy="465593"/>
+          <a:xfrm flipV="1">
+            <a:off x="3879941" y="4433464"/>
+            <a:ext cx="1" cy="472876"/>
+          </a:xfrm>
+          <a:prstGeom prst="line">
+            <a:avLst/>
+          </a:prstGeom>
+          <a:ln>
+            <a:solidFill>
+              <a:schemeClr val="tx1"/>
+            </a:solidFill>
+          </a:ln>
+        </p:spPr>
+        <p:style>
+          <a:lnRef idx="1">
+            <a:schemeClr val="accent1"/>
+          </a:lnRef>
+          <a:fillRef idx="0">
+            <a:schemeClr val="accent1"/>
+          </a:fillRef>
+          <a:effectRef idx="0">
+            <a:schemeClr val="accent1"/>
+          </a:effectRef>
+          <a:fontRef idx="minor">
+            <a:schemeClr val="tx1"/>
+          </a:fontRef>
+        </p:style>
+      </p:cxnSp>
+      <p:sp>
+        <p:nvSpPr>
+          <p:cNvPr id="31" name="Content Placeholder 2"/>
+          <p:cNvSpPr txBox="1">
+            <a:spLocks/>
+          </p:cNvSpPr>
+          <p:nvPr/>
+        </p:nvSpPr>
+        <p:spPr>
+          <a:xfrm>
+            <a:off x="4090292" y="1725899"/>
+            <a:ext cx="1885023" cy="528645"/>
+          </a:xfrm>
+          <a:prstGeom prst="rect">
+            <a:avLst/>
+          </a:prstGeom>
+        </p:spPr>
+        <p:txBody>
+          <a:bodyPr vert="horz" lIns="91440" tIns="45720" rIns="91440" bIns="45720" rtlCol="0">
+            <a:normAutofit/>
+          </a:bodyPr>
+          <a:lstStyle>
+            <a:lvl1pPr marL="228600" indent="-228600" algn="l" defTabSz="914400" rtl="0" eaLnBrk="1" latinLnBrk="0" hangingPunct="1">
+              <a:lnSpc>
+                <a:spcPct val="90000"/>
+              </a:lnSpc>
+              <a:spcBef>
+                <a:spcPts val="1000"/>
+              </a:spcBef>
+              <a:buFont typeface="Arial" panose="020B0604020202020204" pitchFamily="34" charset="0"/>
+              <a:buChar char="•"/>
+              <a:defRPr sz="2800" kern="1200">
+                <a:solidFill>
+                  <a:schemeClr val="tx1"/>
+                </a:solidFill>
+                <a:latin typeface="+mn-lt"/>
+                <a:ea typeface="+mn-ea"/>
+                <a:cs typeface="+mn-cs"/>
+              </a:defRPr>
+            </a:lvl1pPr>
+            <a:lvl2pPr marL="685800" indent="-228600" algn="l" defTabSz="914400" rtl="0" eaLnBrk="1" latinLnBrk="0" hangingPunct="1">
+              <a:lnSpc>
+                <a:spcPct val="90000"/>
+              </a:lnSpc>
+              <a:spcBef>
+                <a:spcPts val="500"/>
+              </a:spcBef>
+              <a:buFont typeface="Arial" panose="020B0604020202020204" pitchFamily="34" charset="0"/>
+              <a:buChar char="•"/>
+              <a:defRPr sz="2400" kern="1200">
+                <a:solidFill>
+                  <a:schemeClr val="tx1"/>
+                </a:solidFill>
+                <a:latin typeface="+mn-lt"/>
+                <a:ea typeface="+mn-ea"/>
+                <a:cs typeface="+mn-cs"/>
+              </a:defRPr>
+            </a:lvl2pPr>
+            <a:lvl3pPr marL="1143000" indent="-228600" algn="l" defTabSz="914400" rtl="0" eaLnBrk="1" latinLnBrk="0" hangingPunct="1">
+              <a:lnSpc>
+                <a:spcPct val="90000"/>
+              </a:lnSpc>
+              <a:spcBef>
+                <a:spcPts val="500"/>
+              </a:spcBef>
+              <a:buFont typeface="Arial" panose="020B0604020202020204" pitchFamily="34" charset="0"/>
+              <a:buChar char="•"/>
+              <a:defRPr sz="2000" kern="1200">
+                <a:solidFill>
+                  <a:schemeClr val="tx1"/>
+                </a:solidFill>
+                <a:latin typeface="+mn-lt"/>
+                <a:ea typeface="+mn-ea"/>
+                <a:cs typeface="+mn-cs"/>
+              </a:defRPr>
+            </a:lvl3pPr>
+            <a:lvl4pPr marL="1600200" indent="-228600" algn="l" defTabSz="914400" rtl="0" eaLnBrk="1" latinLnBrk="0" hangingPunct="1">
+              <a:lnSpc>
+                <a:spcPct val="90000"/>
+              </a:lnSpc>
+              <a:spcBef>
+                <a:spcPts val="500"/>
+              </a:spcBef>
+              <a:buFont typeface="Arial" panose="020B0604020202020204" pitchFamily="34" charset="0"/>
+              <a:buChar char="•"/>
+              <a:defRPr sz="1800" kern="1200">
+                <a:solidFill>
+                  <a:schemeClr val="tx1"/>
+                </a:solidFill>
+                <a:latin typeface="+mn-lt"/>
+                <a:ea typeface="+mn-ea"/>
+                <a:cs typeface="+mn-cs"/>
+              </a:defRPr>
+            </a:lvl4pPr>
+            <a:lvl5pPr marL="2057400" indent="-228600" algn="l" defTabSz="914400" rtl="0" eaLnBrk="1" latinLnBrk="0" hangingPunct="1">
+              <a:lnSpc>
+                <a:spcPct val="90000"/>
+              </a:lnSpc>
+              <a:spcBef>
+                <a:spcPts val="500"/>
+              </a:spcBef>
+              <a:buFont typeface="Arial" panose="020B0604020202020204" pitchFamily="34" charset="0"/>
+              <a:buChar char="•"/>
+              <a:defRPr sz="1800" kern="1200">
+                <a:solidFill>
+                  <a:schemeClr val="tx1"/>
+                </a:solidFill>
+                <a:latin typeface="+mn-lt"/>
+                <a:ea typeface="+mn-ea"/>
+                <a:cs typeface="+mn-cs"/>
+              </a:defRPr>
+            </a:lvl5pPr>
+            <a:lvl6pPr marL="2514600" indent="-228600" algn="l" defTabSz="914400" rtl="0" eaLnBrk="1" latinLnBrk="0" hangingPunct="1">
+              <a:lnSpc>
+                <a:spcPct val="90000"/>
+              </a:lnSpc>
+              <a:spcBef>
+                <a:spcPts val="500"/>
+              </a:spcBef>
+              <a:buFont typeface="Arial" panose="020B0604020202020204" pitchFamily="34" charset="0"/>
+              <a:buChar char="•"/>
+              <a:defRPr sz="1800" kern="1200">
+                <a:solidFill>
+                  <a:schemeClr val="tx1"/>
+                </a:solidFill>
+                <a:latin typeface="+mn-lt"/>
+                <a:ea typeface="+mn-ea"/>
+                <a:cs typeface="+mn-cs"/>
+              </a:defRPr>
+            </a:lvl6pPr>
+            <a:lvl7pPr marL="2971800" indent="-228600" algn="l" defTabSz="914400" rtl="0" eaLnBrk="1" latinLnBrk="0" hangingPunct="1">
+              <a:lnSpc>
+                <a:spcPct val="90000"/>
+              </a:lnSpc>
+              <a:spcBef>
+                <a:spcPts val="500"/>
+              </a:spcBef>
+              <a:buFont typeface="Arial" panose="020B0604020202020204" pitchFamily="34" charset="0"/>
+              <a:buChar char="•"/>
+              <a:defRPr sz="1800" kern="1200">
+                <a:solidFill>
+                  <a:schemeClr val="tx1"/>
+                </a:solidFill>
+                <a:latin typeface="+mn-lt"/>
+                <a:ea typeface="+mn-ea"/>
+                <a:cs typeface="+mn-cs"/>
+              </a:defRPr>
+            </a:lvl7pPr>
+            <a:lvl8pPr marL="3429000" indent="-228600" algn="l" defTabSz="914400" rtl="0" eaLnBrk="1" latinLnBrk="0" hangingPunct="1">
+              <a:lnSpc>
+                <a:spcPct val="90000"/>
+              </a:lnSpc>
+              <a:spcBef>
+                <a:spcPts val="500"/>
+              </a:spcBef>
+              <a:buFont typeface="Arial" panose="020B0604020202020204" pitchFamily="34" charset="0"/>
+              <a:buChar char="•"/>
+              <a:defRPr sz="1800" kern="1200">
+                <a:solidFill>
+                  <a:schemeClr val="tx1"/>
+                </a:solidFill>
+                <a:latin typeface="+mn-lt"/>
+                <a:ea typeface="+mn-ea"/>
+                <a:cs typeface="+mn-cs"/>
+              </a:defRPr>
+            </a:lvl8pPr>
+            <a:lvl9pPr marL="3886200" indent="-228600" algn="l" defTabSz="914400" rtl="0" eaLnBrk="1" latinLnBrk="0" hangingPunct="1">
+              <a:lnSpc>
+                <a:spcPct val="90000"/>
+              </a:lnSpc>
+              <a:spcBef>
+                <a:spcPts val="500"/>
+              </a:spcBef>
+              <a:buFont typeface="Arial" panose="020B0604020202020204" pitchFamily="34" charset="0"/>
+              <a:buChar char="•"/>
+              <a:defRPr sz="1800" kern="1200">
+                <a:solidFill>
+                  <a:schemeClr val="tx1"/>
+                </a:solidFill>
+                <a:latin typeface="+mn-lt"/>
+                <a:ea typeface="+mn-ea"/>
+                <a:cs typeface="+mn-cs"/>
+              </a:defRPr>
+            </a:lvl9pPr>
+          </a:lstStyle>
+          <a:p>
+            <a:pPr marL="0" indent="0">
+              <a:buNone/>
+            </a:pPr>
+            <a:r>
+              <a:rPr lang="en-US" sz="1100" dirty="0"/>
+              <a:t>2. The </a:t>
+            </a:r>
+            <a:r>
+              <a:rPr lang="en-US" sz="1100" dirty="0">
+                <a:highlight>
+                  <a:srgbClr val="CCECFF"/>
+                </a:highlight>
+              </a:rPr>
+              <a:t>#date of death</a:t>
+            </a:r>
+            <a:r>
+              <a:rPr lang="en-US" sz="1100" dirty="0"/>
+              <a:t> is the date of the patient’s death</a:t>
+            </a:r>
+          </a:p>
+        </p:txBody>
+      </p:sp>
+      <p:cxnSp>
+        <p:nvCxnSpPr>
+          <p:cNvPr id="27" name="Straight Connector 26">
+            <a:extLst>
+              <a:ext uri="{FF2B5EF4-FFF2-40B4-BE49-F238E27FC236}">
+                <a16:creationId xmlns:a16="http://schemas.microsoft.com/office/drawing/2014/main" id="{F081D646-8E70-4571-833F-95121A6EED88}"/>
+              </a:ext>
+            </a:extLst>
+          </p:cNvPr>
+          <p:cNvCxnSpPr>
+            <a:cxnSpLocks/>
+          </p:cNvCxnSpPr>
+          <p:nvPr/>
+        </p:nvCxnSpPr>
+        <p:spPr>
+          <a:xfrm flipV="1">
+            <a:off x="3027477" y="1139125"/>
+            <a:ext cx="0" cy="516695"/>
           </a:xfrm>
           <a:prstGeom prst="line">
             <a:avLst/>
@@ -16188,14 +15380,22 @@
       </p:cxnSp>
       <p:cxnSp>
         <p:nvCxnSpPr>
-          <p:cNvPr id="21" name="Straight Connector 20"/>
-          <p:cNvCxnSpPr/>
+          <p:cNvPr id="33" name="Straight Connector 32">
+            <a:extLst>
+              <a:ext uri="{FF2B5EF4-FFF2-40B4-BE49-F238E27FC236}">
+                <a16:creationId xmlns:a16="http://schemas.microsoft.com/office/drawing/2014/main" id="{2C709E46-1A75-4F73-9179-2035ABA4163C}"/>
+              </a:ext>
+            </a:extLst>
+          </p:cNvPr>
+          <p:cNvCxnSpPr>
+            <a:cxnSpLocks/>
+          </p:cNvCxnSpPr>
           <p:nvPr/>
         </p:nvCxnSpPr>
         <p:spPr>
-          <a:xfrm flipH="1" flipV="1">
-            <a:off x="8731559" y="4358017"/>
-            <a:ext cx="1368" cy="834663"/>
+          <a:xfrm flipV="1">
+            <a:off x="4141841" y="1139124"/>
+            <a:ext cx="0" cy="516695"/>
           </a:xfrm>
           <a:prstGeom prst="line">
             <a:avLst/>
@@ -16221,227 +15421,10 @@
           </a:fontRef>
         </p:style>
       </p:cxnSp>
-      <p:sp>
-        <p:nvSpPr>
-          <p:cNvPr id="25" name="Content Placeholder 2"/>
-          <p:cNvSpPr txBox="1">
-            <a:spLocks/>
-          </p:cNvSpPr>
-          <p:nvPr/>
-        </p:nvSpPr>
-        <p:spPr>
-          <a:xfrm>
-            <a:off x="8526895" y="5401367"/>
-            <a:ext cx="2049280" cy="720755"/>
-          </a:xfrm>
-          <a:prstGeom prst="rect">
-            <a:avLst/>
-          </a:prstGeom>
-        </p:spPr>
-        <p:txBody>
-          <a:bodyPr vert="horz" lIns="91440" tIns="45720" rIns="91440" bIns="45720" rtlCol="0">
-            <a:noAutofit/>
-          </a:bodyPr>
-          <a:lstStyle>
-            <a:lvl1pPr marL="228600" indent="-228600" algn="l" defTabSz="914400" rtl="0" eaLnBrk="1" latinLnBrk="0" hangingPunct="1">
-              <a:lnSpc>
-                <a:spcPct val="90000"/>
-              </a:lnSpc>
-              <a:spcBef>
-                <a:spcPts val="1000"/>
-              </a:spcBef>
-              <a:buFont typeface="Arial" panose="020B0604020202020204" pitchFamily="34" charset="0"/>
-              <a:buChar char="•"/>
-              <a:defRPr sz="2800" kern="1200">
-                <a:solidFill>
-                  <a:schemeClr val="tx1"/>
-                </a:solidFill>
-                <a:latin typeface="+mn-lt"/>
-                <a:ea typeface="+mn-ea"/>
-                <a:cs typeface="+mn-cs"/>
-              </a:defRPr>
-            </a:lvl1pPr>
-            <a:lvl2pPr marL="685800" indent="-228600" algn="l" defTabSz="914400" rtl="0" eaLnBrk="1" latinLnBrk="0" hangingPunct="1">
-              <a:lnSpc>
-                <a:spcPct val="90000"/>
-              </a:lnSpc>
-              <a:spcBef>
-                <a:spcPts val="500"/>
-              </a:spcBef>
-              <a:buFont typeface="Arial" panose="020B0604020202020204" pitchFamily="34" charset="0"/>
-              <a:buChar char="•"/>
-              <a:defRPr sz="2400" kern="1200">
-                <a:solidFill>
-                  <a:schemeClr val="tx1"/>
-                </a:solidFill>
-                <a:latin typeface="+mn-lt"/>
-                <a:ea typeface="+mn-ea"/>
-                <a:cs typeface="+mn-cs"/>
-              </a:defRPr>
-            </a:lvl2pPr>
-            <a:lvl3pPr marL="1143000" indent="-228600" algn="l" defTabSz="914400" rtl="0" eaLnBrk="1" latinLnBrk="0" hangingPunct="1">
-              <a:lnSpc>
-                <a:spcPct val="90000"/>
-              </a:lnSpc>
-              <a:spcBef>
-                <a:spcPts val="500"/>
-              </a:spcBef>
-              <a:buFont typeface="Arial" panose="020B0604020202020204" pitchFamily="34" charset="0"/>
-              <a:buChar char="•"/>
-              <a:defRPr sz="2000" kern="1200">
-                <a:solidFill>
-                  <a:schemeClr val="tx1"/>
-                </a:solidFill>
-                <a:latin typeface="+mn-lt"/>
-                <a:ea typeface="+mn-ea"/>
-                <a:cs typeface="+mn-cs"/>
-              </a:defRPr>
-            </a:lvl3pPr>
-            <a:lvl4pPr marL="1600200" indent="-228600" algn="l" defTabSz="914400" rtl="0" eaLnBrk="1" latinLnBrk="0" hangingPunct="1">
-              <a:lnSpc>
-                <a:spcPct val="90000"/>
-              </a:lnSpc>
-              <a:spcBef>
-                <a:spcPts val="500"/>
-              </a:spcBef>
-              <a:buFont typeface="Arial" panose="020B0604020202020204" pitchFamily="34" charset="0"/>
-              <a:buChar char="•"/>
-              <a:defRPr sz="1800" kern="1200">
-                <a:solidFill>
-                  <a:schemeClr val="tx1"/>
-                </a:solidFill>
-                <a:latin typeface="+mn-lt"/>
-                <a:ea typeface="+mn-ea"/>
-                <a:cs typeface="+mn-cs"/>
-              </a:defRPr>
-            </a:lvl4pPr>
-            <a:lvl5pPr marL="2057400" indent="-228600" algn="l" defTabSz="914400" rtl="0" eaLnBrk="1" latinLnBrk="0" hangingPunct="1">
-              <a:lnSpc>
-                <a:spcPct val="90000"/>
-              </a:lnSpc>
-              <a:spcBef>
-                <a:spcPts val="500"/>
-              </a:spcBef>
-              <a:buFont typeface="Arial" panose="020B0604020202020204" pitchFamily="34" charset="0"/>
-              <a:buChar char="•"/>
-              <a:defRPr sz="1800" kern="1200">
-                <a:solidFill>
-                  <a:schemeClr val="tx1"/>
-                </a:solidFill>
-                <a:latin typeface="+mn-lt"/>
-                <a:ea typeface="+mn-ea"/>
-                <a:cs typeface="+mn-cs"/>
-              </a:defRPr>
-            </a:lvl5pPr>
-            <a:lvl6pPr marL="2514600" indent="-228600" algn="l" defTabSz="914400" rtl="0" eaLnBrk="1" latinLnBrk="0" hangingPunct="1">
-              <a:lnSpc>
-                <a:spcPct val="90000"/>
-              </a:lnSpc>
-              <a:spcBef>
-                <a:spcPts val="500"/>
-              </a:spcBef>
-              <a:buFont typeface="Arial" panose="020B0604020202020204" pitchFamily="34" charset="0"/>
-              <a:buChar char="•"/>
-              <a:defRPr sz="1800" kern="1200">
-                <a:solidFill>
-                  <a:schemeClr val="tx1"/>
-                </a:solidFill>
-                <a:latin typeface="+mn-lt"/>
-                <a:ea typeface="+mn-ea"/>
-                <a:cs typeface="+mn-cs"/>
-              </a:defRPr>
-            </a:lvl6pPr>
-            <a:lvl7pPr marL="2971800" indent="-228600" algn="l" defTabSz="914400" rtl="0" eaLnBrk="1" latinLnBrk="0" hangingPunct="1">
-              <a:lnSpc>
-                <a:spcPct val="90000"/>
-              </a:lnSpc>
-              <a:spcBef>
-                <a:spcPts val="500"/>
-              </a:spcBef>
-              <a:buFont typeface="Arial" panose="020B0604020202020204" pitchFamily="34" charset="0"/>
-              <a:buChar char="•"/>
-              <a:defRPr sz="1800" kern="1200">
-                <a:solidFill>
-                  <a:schemeClr val="tx1"/>
-                </a:solidFill>
-                <a:latin typeface="+mn-lt"/>
-                <a:ea typeface="+mn-ea"/>
-                <a:cs typeface="+mn-cs"/>
-              </a:defRPr>
-            </a:lvl7pPr>
-            <a:lvl8pPr marL="3429000" indent="-228600" algn="l" defTabSz="914400" rtl="0" eaLnBrk="1" latinLnBrk="0" hangingPunct="1">
-              <a:lnSpc>
-                <a:spcPct val="90000"/>
-              </a:lnSpc>
-              <a:spcBef>
-                <a:spcPts val="500"/>
-              </a:spcBef>
-              <a:buFont typeface="Arial" panose="020B0604020202020204" pitchFamily="34" charset="0"/>
-              <a:buChar char="•"/>
-              <a:defRPr sz="1800" kern="1200">
-                <a:solidFill>
-                  <a:schemeClr val="tx1"/>
-                </a:solidFill>
-                <a:latin typeface="+mn-lt"/>
-                <a:ea typeface="+mn-ea"/>
-                <a:cs typeface="+mn-cs"/>
-              </a:defRPr>
-            </a:lvl8pPr>
-            <a:lvl9pPr marL="3886200" indent="-228600" algn="l" defTabSz="914400" rtl="0" eaLnBrk="1" latinLnBrk="0" hangingPunct="1">
-              <a:lnSpc>
-                <a:spcPct val="90000"/>
-              </a:lnSpc>
-              <a:spcBef>
-                <a:spcPts val="500"/>
-              </a:spcBef>
-              <a:buFont typeface="Arial" panose="020B0604020202020204" pitchFamily="34" charset="0"/>
-              <a:buChar char="•"/>
-              <a:defRPr sz="1800" kern="1200">
-                <a:solidFill>
-                  <a:schemeClr val="tx1"/>
-                </a:solidFill>
-                <a:latin typeface="+mn-lt"/>
-                <a:ea typeface="+mn-ea"/>
-                <a:cs typeface="+mn-cs"/>
-              </a:defRPr>
-            </a:lvl9pPr>
-          </a:lstStyle>
-          <a:p>
-            <a:pPr marL="0" indent="0">
-              <a:buNone/>
-            </a:pPr>
-            <a:r>
-              <a:rPr lang="en-US" sz="1100" dirty="0" smtClean="0"/>
-              <a:t>The </a:t>
-            </a:r>
-            <a:r>
-              <a:rPr lang="en-US" sz="1100" dirty="0">
-                <a:highlight>
-                  <a:srgbClr val="CCECFF"/>
-                </a:highlight>
-              </a:rPr>
-              <a:t>#ended </a:t>
-            </a:r>
-            <a:r>
-              <a:rPr lang="en-US" sz="1100" dirty="0" smtClean="0">
-                <a:highlight>
-                  <a:srgbClr val="CCECFF"/>
-                </a:highlight>
-              </a:rPr>
-              <a:t>on</a:t>
-            </a:r>
-            <a:r>
-              <a:rPr lang="en-US" sz="1100" dirty="0" smtClean="0"/>
-              <a:t> date does not need to be specified if a patient is still enrolled in the clinical trial.</a:t>
-            </a:r>
-            <a:endParaRPr lang="en-US" sz="1100" dirty="0"/>
-          </a:p>
-        </p:txBody>
-      </p:sp>
     </p:spTree>
     <p:extLst>
       <p:ext uri="{BB962C8B-B14F-4D97-AF65-F5344CB8AC3E}">
-        <p14:creationId xmlns:p14="http://schemas.microsoft.com/office/powerpoint/2010/main" val="979414480"/>
+        <p14:creationId xmlns:p14="http://schemas.microsoft.com/office/powerpoint/2010/main" val="1491333532"/>
       </p:ext>
     </p:extLst>
   </p:cSld>

</xml_diff>

<commit_message>
Add cheatsheet for clinical trial
</commit_message>
<xml_diff>
--- a/docs/Structured Phrase Format Descriptions.pptx
+++ b/docs/Structured Phrase Format Descriptions.pptx
@@ -5,13 +5,14 @@
     <p:sldMasterId id="2147483648" r:id="rId1"/>
   </p:sldMasterIdLst>
   <p:notesMasterIdLst>
-    <p:notesMasterId r:id="rId6"/>
+    <p:notesMasterId r:id="rId7"/>
   </p:notesMasterIdLst>
   <p:sldIdLst>
     <p:sldId id="256" r:id="rId2"/>
     <p:sldId id="257" r:id="rId3"/>
     <p:sldId id="258" r:id="rId4"/>
     <p:sldId id="259" r:id="rId5"/>
+    <p:sldId id="260" r:id="rId6"/>
   </p:sldIdLst>
   <p:sldSz cx="12192000" cy="6858000"/>
   <p:notesSz cx="6858000" cy="9144000"/>
@@ -200,7 +201,7 @@
           <a:p>
             <a:fld id="{21E832DA-B4D8-4D11-8E14-97F9DC272DA8}" type="datetimeFigureOut">
               <a:rPr lang="en-US" smtClean="0"/>
-              <a:t>9/20/2017</a:t>
+              <a:t>10/9/17</a:t>
             </a:fld>
             <a:endParaRPr lang="en-US"/>
           </a:p>
@@ -719,6 +720,90 @@
 </p:notes>
 </file>
 
+<file path=ppt/notesSlides/notesSlide4.xml><?xml version="1.0" encoding="utf-8"?>
+<p:notes xmlns:a="http://schemas.openxmlformats.org/drawingml/2006/main" xmlns:r="http://schemas.openxmlformats.org/officeDocument/2006/relationships" xmlns:p="http://schemas.openxmlformats.org/presentationml/2006/main">
+  <p:cSld>
+    <p:spTree>
+      <p:nvGrpSpPr>
+        <p:cNvPr id="1" name=""/>
+        <p:cNvGrpSpPr/>
+        <p:nvPr/>
+      </p:nvGrpSpPr>
+      <p:grpSpPr>
+        <a:xfrm>
+          <a:off x="0" y="0"/>
+          <a:ext cx="0" cy="0"/>
+          <a:chOff x="0" y="0"/>
+          <a:chExt cx="0" cy="0"/>
+        </a:xfrm>
+      </p:grpSpPr>
+      <p:sp>
+        <p:nvSpPr>
+          <p:cNvPr id="2" name="Slide Image Placeholder 1"/>
+          <p:cNvSpPr>
+            <a:spLocks noGrp="1" noRot="1" noChangeAspect="1"/>
+          </p:cNvSpPr>
+          <p:nvPr>
+            <p:ph type="sldImg"/>
+          </p:nvPr>
+        </p:nvSpPr>
+        <p:spPr/>
+      </p:sp>
+      <p:sp>
+        <p:nvSpPr>
+          <p:cNvPr id="3" name="Notes Placeholder 2"/>
+          <p:cNvSpPr>
+            <a:spLocks noGrp="1"/>
+          </p:cNvSpPr>
+          <p:nvPr>
+            <p:ph type="body" idx="1"/>
+          </p:nvPr>
+        </p:nvSpPr>
+        <p:spPr/>
+        <p:txBody>
+          <a:bodyPr/>
+          <a:lstStyle/>
+          <a:p>
+            <a:endParaRPr lang="en-US" dirty="0"/>
+          </a:p>
+        </p:txBody>
+      </p:sp>
+      <p:sp>
+        <p:nvSpPr>
+          <p:cNvPr id="4" name="Slide Number Placeholder 3"/>
+          <p:cNvSpPr>
+            <a:spLocks noGrp="1"/>
+          </p:cNvSpPr>
+          <p:nvPr>
+            <p:ph type="sldNum" sz="quarter" idx="10"/>
+          </p:nvPr>
+        </p:nvSpPr>
+        <p:spPr/>
+        <p:txBody>
+          <a:bodyPr/>
+          <a:lstStyle/>
+          <a:p>
+            <a:fld id="{970F1AE5-394A-478E-8827-A9DAEC6D2B91}" type="slidenum">
+              <a:rPr lang="en-US" smtClean="0"/>
+              <a:t>5</a:t>
+            </a:fld>
+            <a:endParaRPr lang="en-US"/>
+          </a:p>
+        </p:txBody>
+      </p:sp>
+    </p:spTree>
+    <p:extLst>
+      <p:ext uri="{BB962C8B-B14F-4D97-AF65-F5344CB8AC3E}">
+        <p14:creationId xmlns:p14="http://schemas.microsoft.com/office/powerpoint/2010/main" val="557011105"/>
+      </p:ext>
+    </p:extLst>
+  </p:cSld>
+  <p:clrMapOvr>
+    <a:masterClrMapping/>
+  </p:clrMapOvr>
+</p:notes>
+</file>
+
 <file path=ppt/slideLayouts/slideLayout1.xml><?xml version="1.0" encoding="utf-8"?>
 <p:sldLayout xmlns:a="http://schemas.openxmlformats.org/drawingml/2006/main" xmlns:r="http://schemas.openxmlformats.org/officeDocument/2006/relationships" xmlns:p="http://schemas.openxmlformats.org/presentationml/2006/main" type="title" preserve="1">
   <p:cSld name="Title Slide">
@@ -848,7 +933,7 @@
           <a:p>
             <a:fld id="{0EB9FD00-C173-4304-AF07-4E0E5F6E2284}" type="datetimeFigureOut">
               <a:rPr lang="en-US" smtClean="0"/>
-              <a:t>9/20/2017</a:t>
+              <a:t>10/9/17</a:t>
             </a:fld>
             <a:endParaRPr lang="en-US"/>
           </a:p>
@@ -1016,7 +1101,7 @@
           <a:p>
             <a:fld id="{0EB9FD00-C173-4304-AF07-4E0E5F6E2284}" type="datetimeFigureOut">
               <a:rPr lang="en-US" smtClean="0"/>
-              <a:t>9/20/2017</a:t>
+              <a:t>10/9/17</a:t>
             </a:fld>
             <a:endParaRPr lang="en-US"/>
           </a:p>
@@ -1194,7 +1279,7 @@
           <a:p>
             <a:fld id="{0EB9FD00-C173-4304-AF07-4E0E5F6E2284}" type="datetimeFigureOut">
               <a:rPr lang="en-US" smtClean="0"/>
-              <a:t>9/20/2017</a:t>
+              <a:t>10/9/17</a:t>
             </a:fld>
             <a:endParaRPr lang="en-US"/>
           </a:p>
@@ -1362,7 +1447,7 @@
           <a:p>
             <a:fld id="{0EB9FD00-C173-4304-AF07-4E0E5F6E2284}" type="datetimeFigureOut">
               <a:rPr lang="en-US" smtClean="0"/>
-              <a:t>9/20/2017</a:t>
+              <a:t>10/9/17</a:t>
             </a:fld>
             <a:endParaRPr lang="en-US"/>
           </a:p>
@@ -1607,7 +1692,7 @@
           <a:p>
             <a:fld id="{0EB9FD00-C173-4304-AF07-4E0E5F6E2284}" type="datetimeFigureOut">
               <a:rPr lang="en-US" smtClean="0"/>
-              <a:t>9/20/2017</a:t>
+              <a:t>10/9/17</a:t>
             </a:fld>
             <a:endParaRPr lang="en-US"/>
           </a:p>
@@ -1836,7 +1921,7 @@
           <a:p>
             <a:fld id="{0EB9FD00-C173-4304-AF07-4E0E5F6E2284}" type="datetimeFigureOut">
               <a:rPr lang="en-US" smtClean="0"/>
-              <a:t>9/20/2017</a:t>
+              <a:t>10/9/17</a:t>
             </a:fld>
             <a:endParaRPr lang="en-US"/>
           </a:p>
@@ -2200,7 +2285,7 @@
           <a:p>
             <a:fld id="{0EB9FD00-C173-4304-AF07-4E0E5F6E2284}" type="datetimeFigureOut">
               <a:rPr lang="en-US" smtClean="0"/>
-              <a:t>9/20/2017</a:t>
+              <a:t>10/9/17</a:t>
             </a:fld>
             <a:endParaRPr lang="en-US"/>
           </a:p>
@@ -2317,7 +2402,7 @@
           <a:p>
             <a:fld id="{0EB9FD00-C173-4304-AF07-4E0E5F6E2284}" type="datetimeFigureOut">
               <a:rPr lang="en-US" smtClean="0"/>
-              <a:t>9/20/2017</a:t>
+              <a:t>10/9/17</a:t>
             </a:fld>
             <a:endParaRPr lang="en-US"/>
           </a:p>
@@ -2412,7 +2497,7 @@
           <a:p>
             <a:fld id="{0EB9FD00-C173-4304-AF07-4E0E5F6E2284}" type="datetimeFigureOut">
               <a:rPr lang="en-US" smtClean="0"/>
-              <a:t>9/20/2017</a:t>
+              <a:t>10/9/17</a:t>
             </a:fld>
             <a:endParaRPr lang="en-US"/>
           </a:p>
@@ -2687,7 +2772,7 @@
           <a:p>
             <a:fld id="{0EB9FD00-C173-4304-AF07-4E0E5F6E2284}" type="datetimeFigureOut">
               <a:rPr lang="en-US" smtClean="0"/>
-              <a:t>9/20/2017</a:t>
+              <a:t>10/9/17</a:t>
             </a:fld>
             <a:endParaRPr lang="en-US"/>
           </a:p>
@@ -2939,7 +3024,7 @@
           <a:p>
             <a:fld id="{0EB9FD00-C173-4304-AF07-4E0E5F6E2284}" type="datetimeFigureOut">
               <a:rPr lang="en-US" smtClean="0"/>
-              <a:t>9/20/2017</a:t>
+              <a:t>10/9/17</a:t>
             </a:fld>
             <a:endParaRPr lang="en-US"/>
           </a:p>
@@ -3150,7 +3235,7 @@
           <a:p>
             <a:fld id="{0EB9FD00-C173-4304-AF07-4E0E5F6E2284}" type="datetimeFigureOut">
               <a:rPr lang="en-US" smtClean="0"/>
-              <a:t>9/20/2017</a:t>
+              <a:t>10/9/17</a:t>
             </a:fld>
             <a:endParaRPr lang="en-US"/>
           </a:p>
@@ -5536,6 +5621,10 @@
             <a:br>
               <a:rPr lang="en-US" sz="1100" dirty="0"/>
             </a:br>
+            <a:r>
+              <a:rPr lang="en-US" sz="1100" dirty="0"/>
+              <a:t/>
+            </a:r>
             <a:br>
               <a:rPr lang="en-US" sz="1100" dirty="0"/>
             </a:br>
@@ -7360,11 +7449,7 @@
             </a:r>
             <a:r>
               <a:rPr lang="en-US" sz="2000" dirty="0"/>
-              <a:t> </a:t>
-            </a:r>
-            <a:r>
-              <a:rPr lang="en-US" sz="2000" dirty="0"/>
-              <a:t>based on </a:t>
+              <a:t> based on </a:t>
             </a:r>
             <a:r>
               <a:rPr lang="en-US" sz="2000" dirty="0">
@@ -7388,11 +7473,7 @@
             </a:r>
             <a:r>
               <a:rPr lang="en-US" sz="2000" dirty="0"/>
-              <a:t> compared </a:t>
-            </a:r>
-            <a:r>
-              <a:rPr lang="en-US" sz="2000" dirty="0"/>
-              <a:t>to her last visit on </a:t>
+              <a:t> compared to her last visit on </a:t>
             </a:r>
             <a:r>
               <a:rPr lang="en-US" sz="2000" dirty="0">
@@ -8674,6 +8755,10 @@
             <a:br>
               <a:rPr lang="en-US" sz="1100" dirty="0"/>
             </a:br>
+            <a:r>
+              <a:rPr lang="en-US" sz="1100" dirty="0"/>
+              <a:t/>
+            </a:r>
             <a:br>
               <a:rPr lang="en-US" sz="1100" dirty="0"/>
             </a:br>
@@ -11704,6 +11789,14 @@
             <a:br>
               <a:rPr lang="en-US" sz="1100" dirty="0"/>
             </a:br>
+            <a:r>
+              <a:rPr lang="en-US" sz="1100" dirty="0">
+                <a:highlight>
+                  <a:srgbClr val="CCECFF"/>
+                </a:highlight>
+              </a:rPr>
+              <a:t/>
+            </a:r>
             <a:br>
               <a:rPr lang="en-US" sz="1100" dirty="0">
                 <a:highlight>
@@ -13028,6 +13121,3327 @@
     <p:extLst>
       <p:ext uri="{BB962C8B-B14F-4D97-AF65-F5344CB8AC3E}">
         <p14:creationId xmlns:p14="http://schemas.microsoft.com/office/powerpoint/2010/main" val="3462219850"/>
+      </p:ext>
+    </p:extLst>
+  </p:cSld>
+  <p:clrMapOvr>
+    <a:masterClrMapping/>
+  </p:clrMapOvr>
+</p:sld>
+</file>
+
+<file path=ppt/slides/slide5.xml><?xml version="1.0" encoding="utf-8"?>
+<p:sld xmlns:a="http://schemas.openxmlformats.org/drawingml/2006/main" xmlns:r="http://schemas.openxmlformats.org/officeDocument/2006/relationships" xmlns:p="http://schemas.openxmlformats.org/presentationml/2006/main">
+  <p:cSld>
+    <p:spTree>
+      <p:nvGrpSpPr>
+        <p:cNvPr id="1" name=""/>
+        <p:cNvGrpSpPr/>
+        <p:nvPr/>
+      </p:nvGrpSpPr>
+      <p:grpSpPr>
+        <a:xfrm>
+          <a:off x="0" y="0"/>
+          <a:ext cx="0" cy="0"/>
+          <a:chOff x="0" y="0"/>
+          <a:chExt cx="0" cy="0"/>
+        </a:xfrm>
+      </p:grpSpPr>
+      <p:sp>
+        <p:nvSpPr>
+          <p:cNvPr id="3" name="Content Placeholder 2"/>
+          <p:cNvSpPr>
+            <a:spLocks noGrp="1"/>
+          </p:cNvSpPr>
+          <p:nvPr>
+            <p:ph idx="1"/>
+          </p:nvPr>
+        </p:nvSpPr>
+        <p:spPr>
+          <a:xfrm>
+            <a:off x="853848" y="192367"/>
+            <a:ext cx="2273666" cy="518746"/>
+          </a:xfrm>
+        </p:spPr>
+        <p:txBody>
+          <a:bodyPr>
+            <a:normAutofit/>
+          </a:bodyPr>
+          <a:lstStyle/>
+          <a:p>
+            <a:pPr marL="0" indent="0">
+              <a:buNone/>
+            </a:pPr>
+            <a:r>
+              <a:rPr lang="en-US" dirty="0" smtClean="0"/>
+              <a:t>Clinical Trial:</a:t>
+            </a:r>
+            <a:endParaRPr lang="en-US" dirty="0"/>
+          </a:p>
+        </p:txBody>
+      </p:sp>
+      <p:sp>
+        <p:nvSpPr>
+          <p:cNvPr id="4" name="Content Placeholder 2"/>
+          <p:cNvSpPr txBox="1">
+            <a:spLocks/>
+          </p:cNvSpPr>
+          <p:nvPr/>
+        </p:nvSpPr>
+        <p:spPr>
+          <a:xfrm>
+            <a:off x="2888974" y="192367"/>
+            <a:ext cx="8984371" cy="518746"/>
+          </a:xfrm>
+          <a:prstGeom prst="rect">
+            <a:avLst/>
+          </a:prstGeom>
+        </p:spPr>
+        <p:txBody>
+          <a:bodyPr vert="horz" lIns="91440" tIns="45720" rIns="91440" bIns="45720" rtlCol="0">
+            <a:noAutofit/>
+          </a:bodyPr>
+          <a:lstStyle>
+            <a:lvl1pPr marL="228600" indent="-228600" algn="l" defTabSz="914400" rtl="0" eaLnBrk="1" latinLnBrk="0" hangingPunct="1">
+              <a:lnSpc>
+                <a:spcPct val="90000"/>
+              </a:lnSpc>
+              <a:spcBef>
+                <a:spcPts val="1000"/>
+              </a:spcBef>
+              <a:buFont typeface="Arial" panose="020B0604020202020204" pitchFamily="34" charset="0"/>
+              <a:buChar char="•"/>
+              <a:defRPr sz="2800" kern="1200">
+                <a:solidFill>
+                  <a:schemeClr val="tx1"/>
+                </a:solidFill>
+                <a:latin typeface="+mn-lt"/>
+                <a:ea typeface="+mn-ea"/>
+                <a:cs typeface="+mn-cs"/>
+              </a:defRPr>
+            </a:lvl1pPr>
+            <a:lvl2pPr marL="685800" indent="-228600" algn="l" defTabSz="914400" rtl="0" eaLnBrk="1" latinLnBrk="0" hangingPunct="1">
+              <a:lnSpc>
+                <a:spcPct val="90000"/>
+              </a:lnSpc>
+              <a:spcBef>
+                <a:spcPts val="500"/>
+              </a:spcBef>
+              <a:buFont typeface="Arial" panose="020B0604020202020204" pitchFamily="34" charset="0"/>
+              <a:buChar char="•"/>
+              <a:defRPr sz="2400" kern="1200">
+                <a:solidFill>
+                  <a:schemeClr val="tx1"/>
+                </a:solidFill>
+                <a:latin typeface="+mn-lt"/>
+                <a:ea typeface="+mn-ea"/>
+                <a:cs typeface="+mn-cs"/>
+              </a:defRPr>
+            </a:lvl2pPr>
+            <a:lvl3pPr marL="1143000" indent="-228600" algn="l" defTabSz="914400" rtl="0" eaLnBrk="1" latinLnBrk="0" hangingPunct="1">
+              <a:lnSpc>
+                <a:spcPct val="90000"/>
+              </a:lnSpc>
+              <a:spcBef>
+                <a:spcPts val="500"/>
+              </a:spcBef>
+              <a:buFont typeface="Arial" panose="020B0604020202020204" pitchFamily="34" charset="0"/>
+              <a:buChar char="•"/>
+              <a:defRPr sz="2000" kern="1200">
+                <a:solidFill>
+                  <a:schemeClr val="tx1"/>
+                </a:solidFill>
+                <a:latin typeface="+mn-lt"/>
+                <a:ea typeface="+mn-ea"/>
+                <a:cs typeface="+mn-cs"/>
+              </a:defRPr>
+            </a:lvl3pPr>
+            <a:lvl4pPr marL="1600200" indent="-228600" algn="l" defTabSz="914400" rtl="0" eaLnBrk="1" latinLnBrk="0" hangingPunct="1">
+              <a:lnSpc>
+                <a:spcPct val="90000"/>
+              </a:lnSpc>
+              <a:spcBef>
+                <a:spcPts val="500"/>
+              </a:spcBef>
+              <a:buFont typeface="Arial" panose="020B0604020202020204" pitchFamily="34" charset="0"/>
+              <a:buChar char="•"/>
+              <a:defRPr sz="1800" kern="1200">
+                <a:solidFill>
+                  <a:schemeClr val="tx1"/>
+                </a:solidFill>
+                <a:latin typeface="+mn-lt"/>
+                <a:ea typeface="+mn-ea"/>
+                <a:cs typeface="+mn-cs"/>
+              </a:defRPr>
+            </a:lvl4pPr>
+            <a:lvl5pPr marL="2057400" indent="-228600" algn="l" defTabSz="914400" rtl="0" eaLnBrk="1" latinLnBrk="0" hangingPunct="1">
+              <a:lnSpc>
+                <a:spcPct val="90000"/>
+              </a:lnSpc>
+              <a:spcBef>
+                <a:spcPts val="500"/>
+              </a:spcBef>
+              <a:buFont typeface="Arial" panose="020B0604020202020204" pitchFamily="34" charset="0"/>
+              <a:buChar char="•"/>
+              <a:defRPr sz="1800" kern="1200">
+                <a:solidFill>
+                  <a:schemeClr val="tx1"/>
+                </a:solidFill>
+                <a:latin typeface="+mn-lt"/>
+                <a:ea typeface="+mn-ea"/>
+                <a:cs typeface="+mn-cs"/>
+              </a:defRPr>
+            </a:lvl5pPr>
+            <a:lvl6pPr marL="2514600" indent="-228600" algn="l" defTabSz="914400" rtl="0" eaLnBrk="1" latinLnBrk="0" hangingPunct="1">
+              <a:lnSpc>
+                <a:spcPct val="90000"/>
+              </a:lnSpc>
+              <a:spcBef>
+                <a:spcPts val="500"/>
+              </a:spcBef>
+              <a:buFont typeface="Arial" panose="020B0604020202020204" pitchFamily="34" charset="0"/>
+              <a:buChar char="•"/>
+              <a:defRPr sz="1800" kern="1200">
+                <a:solidFill>
+                  <a:schemeClr val="tx1"/>
+                </a:solidFill>
+                <a:latin typeface="+mn-lt"/>
+                <a:ea typeface="+mn-ea"/>
+                <a:cs typeface="+mn-cs"/>
+              </a:defRPr>
+            </a:lvl6pPr>
+            <a:lvl7pPr marL="2971800" indent="-228600" algn="l" defTabSz="914400" rtl="0" eaLnBrk="1" latinLnBrk="0" hangingPunct="1">
+              <a:lnSpc>
+                <a:spcPct val="90000"/>
+              </a:lnSpc>
+              <a:spcBef>
+                <a:spcPts val="500"/>
+              </a:spcBef>
+              <a:buFont typeface="Arial" panose="020B0604020202020204" pitchFamily="34" charset="0"/>
+              <a:buChar char="•"/>
+              <a:defRPr sz="1800" kern="1200">
+                <a:solidFill>
+                  <a:schemeClr val="tx1"/>
+                </a:solidFill>
+                <a:latin typeface="+mn-lt"/>
+                <a:ea typeface="+mn-ea"/>
+                <a:cs typeface="+mn-cs"/>
+              </a:defRPr>
+            </a:lvl7pPr>
+            <a:lvl8pPr marL="3429000" indent="-228600" algn="l" defTabSz="914400" rtl="0" eaLnBrk="1" latinLnBrk="0" hangingPunct="1">
+              <a:lnSpc>
+                <a:spcPct val="90000"/>
+              </a:lnSpc>
+              <a:spcBef>
+                <a:spcPts val="500"/>
+              </a:spcBef>
+              <a:buFont typeface="Arial" panose="020B0604020202020204" pitchFamily="34" charset="0"/>
+              <a:buChar char="•"/>
+              <a:defRPr sz="1800" kern="1200">
+                <a:solidFill>
+                  <a:schemeClr val="tx1"/>
+                </a:solidFill>
+                <a:latin typeface="+mn-lt"/>
+                <a:ea typeface="+mn-ea"/>
+                <a:cs typeface="+mn-cs"/>
+              </a:defRPr>
+            </a:lvl8pPr>
+            <a:lvl9pPr marL="3886200" indent="-228600" algn="l" defTabSz="914400" rtl="0" eaLnBrk="1" latinLnBrk="0" hangingPunct="1">
+              <a:lnSpc>
+                <a:spcPct val="90000"/>
+              </a:lnSpc>
+              <a:spcBef>
+                <a:spcPts val="500"/>
+              </a:spcBef>
+              <a:buFont typeface="Arial" panose="020B0604020202020204" pitchFamily="34" charset="0"/>
+              <a:buChar char="•"/>
+              <a:defRPr sz="1800" kern="1200">
+                <a:solidFill>
+                  <a:schemeClr val="tx1"/>
+                </a:solidFill>
+                <a:latin typeface="+mn-lt"/>
+                <a:ea typeface="+mn-ea"/>
+                <a:cs typeface="+mn-cs"/>
+              </a:defRPr>
+            </a:lvl9pPr>
+          </a:lstStyle>
+          <a:p>
+            <a:pPr marL="0" indent="0">
+              <a:buNone/>
+            </a:pPr>
+            <a:r>
+              <a:rPr lang="en-US" sz="1100" dirty="0" smtClean="0"/>
+              <a:t>Enrollment in a clinical trial.</a:t>
+            </a:r>
+            <a:endParaRPr lang="en-US" sz="1100" dirty="0"/>
+          </a:p>
+        </p:txBody>
+      </p:sp>
+      <p:sp>
+        <p:nvSpPr>
+          <p:cNvPr id="5" name="Content Placeholder 2"/>
+          <p:cNvSpPr txBox="1">
+            <a:spLocks/>
+          </p:cNvSpPr>
+          <p:nvPr/>
+        </p:nvSpPr>
+        <p:spPr>
+          <a:xfrm>
+            <a:off x="2122809" y="913335"/>
+            <a:ext cx="9750536" cy="529770"/>
+          </a:xfrm>
+          <a:prstGeom prst="rect">
+            <a:avLst/>
+          </a:prstGeom>
+        </p:spPr>
+        <p:txBody>
+          <a:bodyPr vert="horz" lIns="91440" tIns="45720" rIns="91440" bIns="45720" rtlCol="0">
+            <a:normAutofit fontScale="92500"/>
+          </a:bodyPr>
+          <a:lstStyle>
+            <a:lvl1pPr marL="228600" indent="-228600" algn="l" defTabSz="914400" rtl="0" eaLnBrk="1" latinLnBrk="0" hangingPunct="1">
+              <a:lnSpc>
+                <a:spcPct val="90000"/>
+              </a:lnSpc>
+              <a:spcBef>
+                <a:spcPts val="1000"/>
+              </a:spcBef>
+              <a:buFont typeface="Arial" panose="020B0604020202020204" pitchFamily="34" charset="0"/>
+              <a:buChar char="•"/>
+              <a:defRPr sz="2800" kern="1200">
+                <a:solidFill>
+                  <a:schemeClr val="tx1"/>
+                </a:solidFill>
+                <a:latin typeface="+mn-lt"/>
+                <a:ea typeface="+mn-ea"/>
+                <a:cs typeface="+mn-cs"/>
+              </a:defRPr>
+            </a:lvl1pPr>
+            <a:lvl2pPr marL="685800" indent="-228600" algn="l" defTabSz="914400" rtl="0" eaLnBrk="1" latinLnBrk="0" hangingPunct="1">
+              <a:lnSpc>
+                <a:spcPct val="90000"/>
+              </a:lnSpc>
+              <a:spcBef>
+                <a:spcPts val="500"/>
+              </a:spcBef>
+              <a:buFont typeface="Arial" panose="020B0604020202020204" pitchFamily="34" charset="0"/>
+              <a:buChar char="•"/>
+              <a:defRPr sz="2400" kern="1200">
+                <a:solidFill>
+                  <a:schemeClr val="tx1"/>
+                </a:solidFill>
+                <a:latin typeface="+mn-lt"/>
+                <a:ea typeface="+mn-ea"/>
+                <a:cs typeface="+mn-cs"/>
+              </a:defRPr>
+            </a:lvl2pPr>
+            <a:lvl3pPr marL="1143000" indent="-228600" algn="l" defTabSz="914400" rtl="0" eaLnBrk="1" latinLnBrk="0" hangingPunct="1">
+              <a:lnSpc>
+                <a:spcPct val="90000"/>
+              </a:lnSpc>
+              <a:spcBef>
+                <a:spcPts val="500"/>
+              </a:spcBef>
+              <a:buFont typeface="Arial" panose="020B0604020202020204" pitchFamily="34" charset="0"/>
+              <a:buChar char="•"/>
+              <a:defRPr sz="2000" kern="1200">
+                <a:solidFill>
+                  <a:schemeClr val="tx1"/>
+                </a:solidFill>
+                <a:latin typeface="+mn-lt"/>
+                <a:ea typeface="+mn-ea"/>
+                <a:cs typeface="+mn-cs"/>
+              </a:defRPr>
+            </a:lvl3pPr>
+            <a:lvl4pPr marL="1600200" indent="-228600" algn="l" defTabSz="914400" rtl="0" eaLnBrk="1" latinLnBrk="0" hangingPunct="1">
+              <a:lnSpc>
+                <a:spcPct val="90000"/>
+              </a:lnSpc>
+              <a:spcBef>
+                <a:spcPts val="500"/>
+              </a:spcBef>
+              <a:buFont typeface="Arial" panose="020B0604020202020204" pitchFamily="34" charset="0"/>
+              <a:buChar char="•"/>
+              <a:defRPr sz="1800" kern="1200">
+                <a:solidFill>
+                  <a:schemeClr val="tx1"/>
+                </a:solidFill>
+                <a:latin typeface="+mn-lt"/>
+                <a:ea typeface="+mn-ea"/>
+                <a:cs typeface="+mn-cs"/>
+              </a:defRPr>
+            </a:lvl4pPr>
+            <a:lvl5pPr marL="2057400" indent="-228600" algn="l" defTabSz="914400" rtl="0" eaLnBrk="1" latinLnBrk="0" hangingPunct="1">
+              <a:lnSpc>
+                <a:spcPct val="90000"/>
+              </a:lnSpc>
+              <a:spcBef>
+                <a:spcPts val="500"/>
+              </a:spcBef>
+              <a:buFont typeface="Arial" panose="020B0604020202020204" pitchFamily="34" charset="0"/>
+              <a:buChar char="•"/>
+              <a:defRPr sz="1800" kern="1200">
+                <a:solidFill>
+                  <a:schemeClr val="tx1"/>
+                </a:solidFill>
+                <a:latin typeface="+mn-lt"/>
+                <a:ea typeface="+mn-ea"/>
+                <a:cs typeface="+mn-cs"/>
+              </a:defRPr>
+            </a:lvl5pPr>
+            <a:lvl6pPr marL="2514600" indent="-228600" algn="l" defTabSz="914400" rtl="0" eaLnBrk="1" latinLnBrk="0" hangingPunct="1">
+              <a:lnSpc>
+                <a:spcPct val="90000"/>
+              </a:lnSpc>
+              <a:spcBef>
+                <a:spcPts val="500"/>
+              </a:spcBef>
+              <a:buFont typeface="Arial" panose="020B0604020202020204" pitchFamily="34" charset="0"/>
+              <a:buChar char="•"/>
+              <a:defRPr sz="1800" kern="1200">
+                <a:solidFill>
+                  <a:schemeClr val="tx1"/>
+                </a:solidFill>
+                <a:latin typeface="+mn-lt"/>
+                <a:ea typeface="+mn-ea"/>
+                <a:cs typeface="+mn-cs"/>
+              </a:defRPr>
+            </a:lvl6pPr>
+            <a:lvl7pPr marL="2971800" indent="-228600" algn="l" defTabSz="914400" rtl="0" eaLnBrk="1" latinLnBrk="0" hangingPunct="1">
+              <a:lnSpc>
+                <a:spcPct val="90000"/>
+              </a:lnSpc>
+              <a:spcBef>
+                <a:spcPts val="500"/>
+              </a:spcBef>
+              <a:buFont typeface="Arial" panose="020B0604020202020204" pitchFamily="34" charset="0"/>
+              <a:buChar char="•"/>
+              <a:defRPr sz="1800" kern="1200">
+                <a:solidFill>
+                  <a:schemeClr val="tx1"/>
+                </a:solidFill>
+                <a:latin typeface="+mn-lt"/>
+                <a:ea typeface="+mn-ea"/>
+                <a:cs typeface="+mn-cs"/>
+              </a:defRPr>
+            </a:lvl7pPr>
+            <a:lvl8pPr marL="3429000" indent="-228600" algn="l" defTabSz="914400" rtl="0" eaLnBrk="1" latinLnBrk="0" hangingPunct="1">
+              <a:lnSpc>
+                <a:spcPct val="90000"/>
+              </a:lnSpc>
+              <a:spcBef>
+                <a:spcPts val="500"/>
+              </a:spcBef>
+              <a:buFont typeface="Arial" panose="020B0604020202020204" pitchFamily="34" charset="0"/>
+              <a:buChar char="•"/>
+              <a:defRPr sz="1800" kern="1200">
+                <a:solidFill>
+                  <a:schemeClr val="tx1"/>
+                </a:solidFill>
+                <a:latin typeface="+mn-lt"/>
+                <a:ea typeface="+mn-ea"/>
+                <a:cs typeface="+mn-cs"/>
+              </a:defRPr>
+            </a:lvl8pPr>
+            <a:lvl9pPr marL="3886200" indent="-228600" algn="l" defTabSz="914400" rtl="0" eaLnBrk="1" latinLnBrk="0" hangingPunct="1">
+              <a:lnSpc>
+                <a:spcPct val="90000"/>
+              </a:lnSpc>
+              <a:spcBef>
+                <a:spcPts val="500"/>
+              </a:spcBef>
+              <a:buFont typeface="Arial" panose="020B0604020202020204" pitchFamily="34" charset="0"/>
+              <a:buChar char="•"/>
+              <a:defRPr sz="1800" kern="1200">
+                <a:solidFill>
+                  <a:schemeClr val="tx1"/>
+                </a:solidFill>
+                <a:latin typeface="+mn-lt"/>
+                <a:ea typeface="+mn-ea"/>
+                <a:cs typeface="+mn-cs"/>
+              </a:defRPr>
+            </a:lvl9pPr>
+          </a:lstStyle>
+          <a:p>
+            <a:pPr marL="0" indent="0">
+              <a:buNone/>
+            </a:pPr>
+            <a:r>
+              <a:rPr lang="en-US" sz="2000" dirty="0" smtClean="0"/>
+              <a:t>Patient in </a:t>
+            </a:r>
+            <a:r>
+              <a:rPr lang="en-US" sz="2000" dirty="0" smtClean="0">
+                <a:highlight>
+                  <a:srgbClr val="CCECFF"/>
+                </a:highlight>
+              </a:rPr>
+              <a:t>#clinical trial</a:t>
+            </a:r>
+            <a:r>
+              <a:rPr lang="en-US" sz="2000" dirty="0" smtClean="0"/>
+              <a:t> </a:t>
+            </a:r>
+            <a:r>
+              <a:rPr lang="en-US" sz="2000" dirty="0" smtClean="0">
+                <a:highlight>
+                  <a:srgbClr val="CCECFF"/>
+                </a:highlight>
+              </a:rPr>
+              <a:t>#&lt;trial name&gt;</a:t>
+            </a:r>
+            <a:r>
+              <a:rPr lang="en-US" sz="2000" dirty="0" smtClean="0"/>
+              <a:t> </a:t>
+            </a:r>
+            <a:r>
+              <a:rPr lang="en-US" sz="2000" dirty="0" smtClean="0">
+                <a:highlight>
+                  <a:srgbClr val="CCECFF"/>
+                </a:highlight>
+              </a:rPr>
+              <a:t>#enrolled on</a:t>
+            </a:r>
+            <a:r>
+              <a:rPr lang="en-US" sz="2000" dirty="0" smtClean="0"/>
+              <a:t> </a:t>
+            </a:r>
+            <a:r>
+              <a:rPr lang="en-US" sz="2000" dirty="0" smtClean="0">
+                <a:highlight>
+                  <a:srgbClr val="CCECFF"/>
+                </a:highlight>
+              </a:rPr>
+              <a:t>#01/01/2017</a:t>
+            </a:r>
+            <a:r>
+              <a:rPr lang="en-US" sz="2000" dirty="0" smtClean="0"/>
+              <a:t> and </a:t>
+            </a:r>
+            <a:r>
+              <a:rPr lang="en-US" sz="2000" dirty="0" smtClean="0">
+                <a:highlight>
+                  <a:srgbClr val="CCECFF"/>
+                </a:highlight>
+              </a:rPr>
+              <a:t>#ended on</a:t>
+            </a:r>
+            <a:r>
+              <a:rPr lang="en-US" sz="2000" dirty="0" smtClean="0"/>
+              <a:t> </a:t>
+            </a:r>
+            <a:r>
+              <a:rPr lang="en-US" sz="2000" dirty="0" smtClean="0">
+                <a:highlight>
+                  <a:srgbClr val="CCECFF"/>
+                </a:highlight>
+              </a:rPr>
+              <a:t>#10/10/2017</a:t>
+            </a:r>
+            <a:endParaRPr lang="en-US" sz="2000" dirty="0">
+              <a:highlight>
+                <a:srgbClr val="CCECFF"/>
+              </a:highlight>
+            </a:endParaRPr>
+          </a:p>
+        </p:txBody>
+      </p:sp>
+      <p:sp>
+        <p:nvSpPr>
+          <p:cNvPr id="7" name="Content Placeholder 2"/>
+          <p:cNvSpPr txBox="1">
+            <a:spLocks/>
+          </p:cNvSpPr>
+          <p:nvPr/>
+        </p:nvSpPr>
+        <p:spPr>
+          <a:xfrm>
+            <a:off x="2166487" y="5401367"/>
+            <a:ext cx="1444974" cy="787061"/>
+          </a:xfrm>
+          <a:prstGeom prst="rect">
+            <a:avLst/>
+          </a:prstGeom>
+        </p:spPr>
+        <p:txBody>
+          <a:bodyPr vert="horz" lIns="91440" tIns="45720" rIns="91440" bIns="45720" rtlCol="0">
+            <a:normAutofit/>
+          </a:bodyPr>
+          <a:lstStyle>
+            <a:lvl1pPr marL="228600" indent="-228600" algn="l" defTabSz="914400" rtl="0" eaLnBrk="1" latinLnBrk="0" hangingPunct="1">
+              <a:lnSpc>
+                <a:spcPct val="90000"/>
+              </a:lnSpc>
+              <a:spcBef>
+                <a:spcPts val="1000"/>
+              </a:spcBef>
+              <a:buFont typeface="Arial" panose="020B0604020202020204" pitchFamily="34" charset="0"/>
+              <a:buChar char="•"/>
+              <a:defRPr sz="2800" kern="1200">
+                <a:solidFill>
+                  <a:schemeClr val="tx1"/>
+                </a:solidFill>
+                <a:latin typeface="+mn-lt"/>
+                <a:ea typeface="+mn-ea"/>
+                <a:cs typeface="+mn-cs"/>
+              </a:defRPr>
+            </a:lvl1pPr>
+            <a:lvl2pPr marL="685800" indent="-228600" algn="l" defTabSz="914400" rtl="0" eaLnBrk="1" latinLnBrk="0" hangingPunct="1">
+              <a:lnSpc>
+                <a:spcPct val="90000"/>
+              </a:lnSpc>
+              <a:spcBef>
+                <a:spcPts val="500"/>
+              </a:spcBef>
+              <a:buFont typeface="Arial" panose="020B0604020202020204" pitchFamily="34" charset="0"/>
+              <a:buChar char="•"/>
+              <a:defRPr sz="2400" kern="1200">
+                <a:solidFill>
+                  <a:schemeClr val="tx1"/>
+                </a:solidFill>
+                <a:latin typeface="+mn-lt"/>
+                <a:ea typeface="+mn-ea"/>
+                <a:cs typeface="+mn-cs"/>
+              </a:defRPr>
+            </a:lvl2pPr>
+            <a:lvl3pPr marL="1143000" indent="-228600" algn="l" defTabSz="914400" rtl="0" eaLnBrk="1" latinLnBrk="0" hangingPunct="1">
+              <a:lnSpc>
+                <a:spcPct val="90000"/>
+              </a:lnSpc>
+              <a:spcBef>
+                <a:spcPts val="500"/>
+              </a:spcBef>
+              <a:buFont typeface="Arial" panose="020B0604020202020204" pitchFamily="34" charset="0"/>
+              <a:buChar char="•"/>
+              <a:defRPr sz="2000" kern="1200">
+                <a:solidFill>
+                  <a:schemeClr val="tx1"/>
+                </a:solidFill>
+                <a:latin typeface="+mn-lt"/>
+                <a:ea typeface="+mn-ea"/>
+                <a:cs typeface="+mn-cs"/>
+              </a:defRPr>
+            </a:lvl3pPr>
+            <a:lvl4pPr marL="1600200" indent="-228600" algn="l" defTabSz="914400" rtl="0" eaLnBrk="1" latinLnBrk="0" hangingPunct="1">
+              <a:lnSpc>
+                <a:spcPct val="90000"/>
+              </a:lnSpc>
+              <a:spcBef>
+                <a:spcPts val="500"/>
+              </a:spcBef>
+              <a:buFont typeface="Arial" panose="020B0604020202020204" pitchFamily="34" charset="0"/>
+              <a:buChar char="•"/>
+              <a:defRPr sz="1800" kern="1200">
+                <a:solidFill>
+                  <a:schemeClr val="tx1"/>
+                </a:solidFill>
+                <a:latin typeface="+mn-lt"/>
+                <a:ea typeface="+mn-ea"/>
+                <a:cs typeface="+mn-cs"/>
+              </a:defRPr>
+            </a:lvl4pPr>
+            <a:lvl5pPr marL="2057400" indent="-228600" algn="l" defTabSz="914400" rtl="0" eaLnBrk="1" latinLnBrk="0" hangingPunct="1">
+              <a:lnSpc>
+                <a:spcPct val="90000"/>
+              </a:lnSpc>
+              <a:spcBef>
+                <a:spcPts val="500"/>
+              </a:spcBef>
+              <a:buFont typeface="Arial" panose="020B0604020202020204" pitchFamily="34" charset="0"/>
+              <a:buChar char="•"/>
+              <a:defRPr sz="1800" kern="1200">
+                <a:solidFill>
+                  <a:schemeClr val="tx1"/>
+                </a:solidFill>
+                <a:latin typeface="+mn-lt"/>
+                <a:ea typeface="+mn-ea"/>
+                <a:cs typeface="+mn-cs"/>
+              </a:defRPr>
+            </a:lvl5pPr>
+            <a:lvl6pPr marL="2514600" indent="-228600" algn="l" defTabSz="914400" rtl="0" eaLnBrk="1" latinLnBrk="0" hangingPunct="1">
+              <a:lnSpc>
+                <a:spcPct val="90000"/>
+              </a:lnSpc>
+              <a:spcBef>
+                <a:spcPts val="500"/>
+              </a:spcBef>
+              <a:buFont typeface="Arial" panose="020B0604020202020204" pitchFamily="34" charset="0"/>
+              <a:buChar char="•"/>
+              <a:defRPr sz="1800" kern="1200">
+                <a:solidFill>
+                  <a:schemeClr val="tx1"/>
+                </a:solidFill>
+                <a:latin typeface="+mn-lt"/>
+                <a:ea typeface="+mn-ea"/>
+                <a:cs typeface="+mn-cs"/>
+              </a:defRPr>
+            </a:lvl6pPr>
+            <a:lvl7pPr marL="2971800" indent="-228600" algn="l" defTabSz="914400" rtl="0" eaLnBrk="1" latinLnBrk="0" hangingPunct="1">
+              <a:lnSpc>
+                <a:spcPct val="90000"/>
+              </a:lnSpc>
+              <a:spcBef>
+                <a:spcPts val="500"/>
+              </a:spcBef>
+              <a:buFont typeface="Arial" panose="020B0604020202020204" pitchFamily="34" charset="0"/>
+              <a:buChar char="•"/>
+              <a:defRPr sz="1800" kern="1200">
+                <a:solidFill>
+                  <a:schemeClr val="tx1"/>
+                </a:solidFill>
+                <a:latin typeface="+mn-lt"/>
+                <a:ea typeface="+mn-ea"/>
+                <a:cs typeface="+mn-cs"/>
+              </a:defRPr>
+            </a:lvl7pPr>
+            <a:lvl8pPr marL="3429000" indent="-228600" algn="l" defTabSz="914400" rtl="0" eaLnBrk="1" latinLnBrk="0" hangingPunct="1">
+              <a:lnSpc>
+                <a:spcPct val="90000"/>
+              </a:lnSpc>
+              <a:spcBef>
+                <a:spcPts val="500"/>
+              </a:spcBef>
+              <a:buFont typeface="Arial" panose="020B0604020202020204" pitchFamily="34" charset="0"/>
+              <a:buChar char="•"/>
+              <a:defRPr sz="1800" kern="1200">
+                <a:solidFill>
+                  <a:schemeClr val="tx1"/>
+                </a:solidFill>
+                <a:latin typeface="+mn-lt"/>
+                <a:ea typeface="+mn-ea"/>
+                <a:cs typeface="+mn-cs"/>
+              </a:defRPr>
+            </a:lvl8pPr>
+            <a:lvl9pPr marL="3886200" indent="-228600" algn="l" defTabSz="914400" rtl="0" eaLnBrk="1" latinLnBrk="0" hangingPunct="1">
+              <a:lnSpc>
+                <a:spcPct val="90000"/>
+              </a:lnSpc>
+              <a:spcBef>
+                <a:spcPts val="500"/>
+              </a:spcBef>
+              <a:buFont typeface="Arial" panose="020B0604020202020204" pitchFamily="34" charset="0"/>
+              <a:buChar char="•"/>
+              <a:defRPr sz="1800" kern="1200">
+                <a:solidFill>
+                  <a:schemeClr val="tx1"/>
+                </a:solidFill>
+                <a:latin typeface="+mn-lt"/>
+                <a:ea typeface="+mn-ea"/>
+                <a:cs typeface="+mn-cs"/>
+              </a:defRPr>
+            </a:lvl9pPr>
+          </a:lstStyle>
+          <a:p>
+            <a:pPr marL="0" indent="0">
+              <a:buNone/>
+            </a:pPr>
+            <a:r>
+              <a:rPr lang="en-US" sz="1100" dirty="0"/>
+              <a:t>Case of the </a:t>
+            </a:r>
+            <a:r>
+              <a:rPr lang="en-US" sz="1100" dirty="0" smtClean="0">
+                <a:highlight>
+                  <a:srgbClr val="CCECFF"/>
+                </a:highlight>
+              </a:rPr>
+              <a:t>#clinical trial</a:t>
+            </a:r>
+            <a:r>
+              <a:rPr lang="en-US" sz="1100" dirty="0" smtClean="0"/>
+              <a:t> tag </a:t>
+            </a:r>
+            <a:r>
+              <a:rPr lang="en-US" sz="1100" dirty="0"/>
+              <a:t>can vary</a:t>
+            </a:r>
+            <a:r>
+              <a:rPr lang="en-US" sz="1100" dirty="0" smtClean="0"/>
+              <a:t>.</a:t>
+            </a:r>
+            <a:endParaRPr lang="en-US" sz="1100" dirty="0"/>
+          </a:p>
+        </p:txBody>
+      </p:sp>
+      <p:sp>
+        <p:nvSpPr>
+          <p:cNvPr id="8" name="Content Placeholder 2"/>
+          <p:cNvSpPr txBox="1">
+            <a:spLocks/>
+          </p:cNvSpPr>
+          <p:nvPr/>
+        </p:nvSpPr>
+        <p:spPr>
+          <a:xfrm>
+            <a:off x="842254" y="844058"/>
+            <a:ext cx="1260389" cy="439457"/>
+          </a:xfrm>
+          <a:prstGeom prst="rect">
+            <a:avLst/>
+          </a:prstGeom>
+        </p:spPr>
+        <p:txBody>
+          <a:bodyPr vert="horz" lIns="91440" tIns="45720" rIns="91440" bIns="45720" rtlCol="0">
+            <a:noAutofit/>
+          </a:bodyPr>
+          <a:lstStyle>
+            <a:lvl1pPr marL="228600" indent="-228600" algn="l" defTabSz="914400" rtl="0" eaLnBrk="1" latinLnBrk="0" hangingPunct="1">
+              <a:lnSpc>
+                <a:spcPct val="90000"/>
+              </a:lnSpc>
+              <a:spcBef>
+                <a:spcPts val="1000"/>
+              </a:spcBef>
+              <a:buFont typeface="Arial" panose="020B0604020202020204" pitchFamily="34" charset="0"/>
+              <a:buChar char="•"/>
+              <a:defRPr sz="2800" kern="1200">
+                <a:solidFill>
+                  <a:schemeClr val="tx1"/>
+                </a:solidFill>
+                <a:latin typeface="+mn-lt"/>
+                <a:ea typeface="+mn-ea"/>
+                <a:cs typeface="+mn-cs"/>
+              </a:defRPr>
+            </a:lvl1pPr>
+            <a:lvl2pPr marL="685800" indent="-228600" algn="l" defTabSz="914400" rtl="0" eaLnBrk="1" latinLnBrk="0" hangingPunct="1">
+              <a:lnSpc>
+                <a:spcPct val="90000"/>
+              </a:lnSpc>
+              <a:spcBef>
+                <a:spcPts val="500"/>
+              </a:spcBef>
+              <a:buFont typeface="Arial" panose="020B0604020202020204" pitchFamily="34" charset="0"/>
+              <a:buChar char="•"/>
+              <a:defRPr sz="2400" kern="1200">
+                <a:solidFill>
+                  <a:schemeClr val="tx1"/>
+                </a:solidFill>
+                <a:latin typeface="+mn-lt"/>
+                <a:ea typeface="+mn-ea"/>
+                <a:cs typeface="+mn-cs"/>
+              </a:defRPr>
+            </a:lvl2pPr>
+            <a:lvl3pPr marL="1143000" indent="-228600" algn="l" defTabSz="914400" rtl="0" eaLnBrk="1" latinLnBrk="0" hangingPunct="1">
+              <a:lnSpc>
+                <a:spcPct val="90000"/>
+              </a:lnSpc>
+              <a:spcBef>
+                <a:spcPts val="500"/>
+              </a:spcBef>
+              <a:buFont typeface="Arial" panose="020B0604020202020204" pitchFamily="34" charset="0"/>
+              <a:buChar char="•"/>
+              <a:defRPr sz="2000" kern="1200">
+                <a:solidFill>
+                  <a:schemeClr val="tx1"/>
+                </a:solidFill>
+                <a:latin typeface="+mn-lt"/>
+                <a:ea typeface="+mn-ea"/>
+                <a:cs typeface="+mn-cs"/>
+              </a:defRPr>
+            </a:lvl3pPr>
+            <a:lvl4pPr marL="1600200" indent="-228600" algn="l" defTabSz="914400" rtl="0" eaLnBrk="1" latinLnBrk="0" hangingPunct="1">
+              <a:lnSpc>
+                <a:spcPct val="90000"/>
+              </a:lnSpc>
+              <a:spcBef>
+                <a:spcPts val="500"/>
+              </a:spcBef>
+              <a:buFont typeface="Arial" panose="020B0604020202020204" pitchFamily="34" charset="0"/>
+              <a:buChar char="•"/>
+              <a:defRPr sz="1800" kern="1200">
+                <a:solidFill>
+                  <a:schemeClr val="tx1"/>
+                </a:solidFill>
+                <a:latin typeface="+mn-lt"/>
+                <a:ea typeface="+mn-ea"/>
+                <a:cs typeface="+mn-cs"/>
+              </a:defRPr>
+            </a:lvl4pPr>
+            <a:lvl5pPr marL="2057400" indent="-228600" algn="l" defTabSz="914400" rtl="0" eaLnBrk="1" latinLnBrk="0" hangingPunct="1">
+              <a:lnSpc>
+                <a:spcPct val="90000"/>
+              </a:lnSpc>
+              <a:spcBef>
+                <a:spcPts val="500"/>
+              </a:spcBef>
+              <a:buFont typeface="Arial" panose="020B0604020202020204" pitchFamily="34" charset="0"/>
+              <a:buChar char="•"/>
+              <a:defRPr sz="1800" kern="1200">
+                <a:solidFill>
+                  <a:schemeClr val="tx1"/>
+                </a:solidFill>
+                <a:latin typeface="+mn-lt"/>
+                <a:ea typeface="+mn-ea"/>
+                <a:cs typeface="+mn-cs"/>
+              </a:defRPr>
+            </a:lvl5pPr>
+            <a:lvl6pPr marL="2514600" indent="-228600" algn="l" defTabSz="914400" rtl="0" eaLnBrk="1" latinLnBrk="0" hangingPunct="1">
+              <a:lnSpc>
+                <a:spcPct val="90000"/>
+              </a:lnSpc>
+              <a:spcBef>
+                <a:spcPts val="500"/>
+              </a:spcBef>
+              <a:buFont typeface="Arial" panose="020B0604020202020204" pitchFamily="34" charset="0"/>
+              <a:buChar char="•"/>
+              <a:defRPr sz="1800" kern="1200">
+                <a:solidFill>
+                  <a:schemeClr val="tx1"/>
+                </a:solidFill>
+                <a:latin typeface="+mn-lt"/>
+                <a:ea typeface="+mn-ea"/>
+                <a:cs typeface="+mn-cs"/>
+              </a:defRPr>
+            </a:lvl6pPr>
+            <a:lvl7pPr marL="2971800" indent="-228600" algn="l" defTabSz="914400" rtl="0" eaLnBrk="1" latinLnBrk="0" hangingPunct="1">
+              <a:lnSpc>
+                <a:spcPct val="90000"/>
+              </a:lnSpc>
+              <a:spcBef>
+                <a:spcPts val="500"/>
+              </a:spcBef>
+              <a:buFont typeface="Arial" panose="020B0604020202020204" pitchFamily="34" charset="0"/>
+              <a:buChar char="•"/>
+              <a:defRPr sz="1800" kern="1200">
+                <a:solidFill>
+                  <a:schemeClr val="tx1"/>
+                </a:solidFill>
+                <a:latin typeface="+mn-lt"/>
+                <a:ea typeface="+mn-ea"/>
+                <a:cs typeface="+mn-cs"/>
+              </a:defRPr>
+            </a:lvl7pPr>
+            <a:lvl8pPr marL="3429000" indent="-228600" algn="l" defTabSz="914400" rtl="0" eaLnBrk="1" latinLnBrk="0" hangingPunct="1">
+              <a:lnSpc>
+                <a:spcPct val="90000"/>
+              </a:lnSpc>
+              <a:spcBef>
+                <a:spcPts val="500"/>
+              </a:spcBef>
+              <a:buFont typeface="Arial" panose="020B0604020202020204" pitchFamily="34" charset="0"/>
+              <a:buChar char="•"/>
+              <a:defRPr sz="1800" kern="1200">
+                <a:solidFill>
+                  <a:schemeClr val="tx1"/>
+                </a:solidFill>
+                <a:latin typeface="+mn-lt"/>
+                <a:ea typeface="+mn-ea"/>
+                <a:cs typeface="+mn-cs"/>
+              </a:defRPr>
+            </a:lvl8pPr>
+            <a:lvl9pPr marL="3886200" indent="-228600" algn="l" defTabSz="914400" rtl="0" eaLnBrk="1" latinLnBrk="0" hangingPunct="1">
+              <a:lnSpc>
+                <a:spcPct val="90000"/>
+              </a:lnSpc>
+              <a:spcBef>
+                <a:spcPts val="500"/>
+              </a:spcBef>
+              <a:buFont typeface="Arial" panose="020B0604020202020204" pitchFamily="34" charset="0"/>
+              <a:buChar char="•"/>
+              <a:defRPr sz="1800" kern="1200">
+                <a:solidFill>
+                  <a:schemeClr val="tx1"/>
+                </a:solidFill>
+                <a:latin typeface="+mn-lt"/>
+                <a:ea typeface="+mn-ea"/>
+                <a:cs typeface="+mn-cs"/>
+              </a:defRPr>
+            </a:lvl9pPr>
+          </a:lstStyle>
+          <a:p>
+            <a:pPr marL="0" indent="0">
+              <a:buFont typeface="Arial" panose="020B0604020202020204" pitchFamily="34" charset="0"/>
+              <a:buNone/>
+            </a:pPr>
+            <a:r>
+              <a:rPr lang="en-US" sz="2200" dirty="0">
+                <a:solidFill>
+                  <a:schemeClr val="bg1">
+                    <a:lumMod val="65000"/>
+                  </a:schemeClr>
+                </a:solidFill>
+              </a:rPr>
+              <a:t>Example</a:t>
+            </a:r>
+            <a:r>
+              <a:rPr lang="en-US" sz="2600" dirty="0">
+                <a:solidFill>
+                  <a:schemeClr val="bg1">
+                    <a:lumMod val="65000"/>
+                  </a:schemeClr>
+                </a:solidFill>
+              </a:rPr>
+              <a:t>:</a:t>
+            </a:r>
+          </a:p>
+        </p:txBody>
+      </p:sp>
+      <p:sp>
+        <p:nvSpPr>
+          <p:cNvPr id="9" name="Content Placeholder 2"/>
+          <p:cNvSpPr txBox="1">
+            <a:spLocks/>
+          </p:cNvSpPr>
+          <p:nvPr/>
+        </p:nvSpPr>
+        <p:spPr>
+          <a:xfrm>
+            <a:off x="888651" y="1692198"/>
+            <a:ext cx="1280746" cy="518746"/>
+          </a:xfrm>
+          <a:prstGeom prst="rect">
+            <a:avLst/>
+          </a:prstGeom>
+        </p:spPr>
+        <p:txBody>
+          <a:bodyPr vert="horz" lIns="91440" tIns="45720" rIns="91440" bIns="45720" rtlCol="0">
+            <a:normAutofit fontScale="92500"/>
+          </a:bodyPr>
+          <a:lstStyle>
+            <a:lvl1pPr marL="228600" indent="-228600" algn="l" defTabSz="914400" rtl="0" eaLnBrk="1" latinLnBrk="0" hangingPunct="1">
+              <a:lnSpc>
+                <a:spcPct val="90000"/>
+              </a:lnSpc>
+              <a:spcBef>
+                <a:spcPts val="1000"/>
+              </a:spcBef>
+              <a:buFont typeface="Arial" panose="020B0604020202020204" pitchFamily="34" charset="0"/>
+              <a:buChar char="•"/>
+              <a:defRPr sz="2800" kern="1200">
+                <a:solidFill>
+                  <a:schemeClr val="tx1"/>
+                </a:solidFill>
+                <a:latin typeface="+mn-lt"/>
+                <a:ea typeface="+mn-ea"/>
+                <a:cs typeface="+mn-cs"/>
+              </a:defRPr>
+            </a:lvl1pPr>
+            <a:lvl2pPr marL="685800" indent="-228600" algn="l" defTabSz="914400" rtl="0" eaLnBrk="1" latinLnBrk="0" hangingPunct="1">
+              <a:lnSpc>
+                <a:spcPct val="90000"/>
+              </a:lnSpc>
+              <a:spcBef>
+                <a:spcPts val="500"/>
+              </a:spcBef>
+              <a:buFont typeface="Arial" panose="020B0604020202020204" pitchFamily="34" charset="0"/>
+              <a:buChar char="•"/>
+              <a:defRPr sz="2400" kern="1200">
+                <a:solidFill>
+                  <a:schemeClr val="tx1"/>
+                </a:solidFill>
+                <a:latin typeface="+mn-lt"/>
+                <a:ea typeface="+mn-ea"/>
+                <a:cs typeface="+mn-cs"/>
+              </a:defRPr>
+            </a:lvl2pPr>
+            <a:lvl3pPr marL="1143000" indent="-228600" algn="l" defTabSz="914400" rtl="0" eaLnBrk="1" latinLnBrk="0" hangingPunct="1">
+              <a:lnSpc>
+                <a:spcPct val="90000"/>
+              </a:lnSpc>
+              <a:spcBef>
+                <a:spcPts val="500"/>
+              </a:spcBef>
+              <a:buFont typeface="Arial" panose="020B0604020202020204" pitchFamily="34" charset="0"/>
+              <a:buChar char="•"/>
+              <a:defRPr sz="2000" kern="1200">
+                <a:solidFill>
+                  <a:schemeClr val="tx1"/>
+                </a:solidFill>
+                <a:latin typeface="+mn-lt"/>
+                <a:ea typeface="+mn-ea"/>
+                <a:cs typeface="+mn-cs"/>
+              </a:defRPr>
+            </a:lvl3pPr>
+            <a:lvl4pPr marL="1600200" indent="-228600" algn="l" defTabSz="914400" rtl="0" eaLnBrk="1" latinLnBrk="0" hangingPunct="1">
+              <a:lnSpc>
+                <a:spcPct val="90000"/>
+              </a:lnSpc>
+              <a:spcBef>
+                <a:spcPts val="500"/>
+              </a:spcBef>
+              <a:buFont typeface="Arial" panose="020B0604020202020204" pitchFamily="34" charset="0"/>
+              <a:buChar char="•"/>
+              <a:defRPr sz="1800" kern="1200">
+                <a:solidFill>
+                  <a:schemeClr val="tx1"/>
+                </a:solidFill>
+                <a:latin typeface="+mn-lt"/>
+                <a:ea typeface="+mn-ea"/>
+                <a:cs typeface="+mn-cs"/>
+              </a:defRPr>
+            </a:lvl4pPr>
+            <a:lvl5pPr marL="2057400" indent="-228600" algn="l" defTabSz="914400" rtl="0" eaLnBrk="1" latinLnBrk="0" hangingPunct="1">
+              <a:lnSpc>
+                <a:spcPct val="90000"/>
+              </a:lnSpc>
+              <a:spcBef>
+                <a:spcPts val="500"/>
+              </a:spcBef>
+              <a:buFont typeface="Arial" panose="020B0604020202020204" pitchFamily="34" charset="0"/>
+              <a:buChar char="•"/>
+              <a:defRPr sz="1800" kern="1200">
+                <a:solidFill>
+                  <a:schemeClr val="tx1"/>
+                </a:solidFill>
+                <a:latin typeface="+mn-lt"/>
+                <a:ea typeface="+mn-ea"/>
+                <a:cs typeface="+mn-cs"/>
+              </a:defRPr>
+            </a:lvl5pPr>
+            <a:lvl6pPr marL="2514600" indent="-228600" algn="l" defTabSz="914400" rtl="0" eaLnBrk="1" latinLnBrk="0" hangingPunct="1">
+              <a:lnSpc>
+                <a:spcPct val="90000"/>
+              </a:lnSpc>
+              <a:spcBef>
+                <a:spcPts val="500"/>
+              </a:spcBef>
+              <a:buFont typeface="Arial" panose="020B0604020202020204" pitchFamily="34" charset="0"/>
+              <a:buChar char="•"/>
+              <a:defRPr sz="1800" kern="1200">
+                <a:solidFill>
+                  <a:schemeClr val="tx1"/>
+                </a:solidFill>
+                <a:latin typeface="+mn-lt"/>
+                <a:ea typeface="+mn-ea"/>
+                <a:cs typeface="+mn-cs"/>
+              </a:defRPr>
+            </a:lvl6pPr>
+            <a:lvl7pPr marL="2971800" indent="-228600" algn="l" defTabSz="914400" rtl="0" eaLnBrk="1" latinLnBrk="0" hangingPunct="1">
+              <a:lnSpc>
+                <a:spcPct val="90000"/>
+              </a:lnSpc>
+              <a:spcBef>
+                <a:spcPts val="500"/>
+              </a:spcBef>
+              <a:buFont typeface="Arial" panose="020B0604020202020204" pitchFamily="34" charset="0"/>
+              <a:buChar char="•"/>
+              <a:defRPr sz="1800" kern="1200">
+                <a:solidFill>
+                  <a:schemeClr val="tx1"/>
+                </a:solidFill>
+                <a:latin typeface="+mn-lt"/>
+                <a:ea typeface="+mn-ea"/>
+                <a:cs typeface="+mn-cs"/>
+              </a:defRPr>
+            </a:lvl7pPr>
+            <a:lvl8pPr marL="3429000" indent="-228600" algn="l" defTabSz="914400" rtl="0" eaLnBrk="1" latinLnBrk="0" hangingPunct="1">
+              <a:lnSpc>
+                <a:spcPct val="90000"/>
+              </a:lnSpc>
+              <a:spcBef>
+                <a:spcPts val="500"/>
+              </a:spcBef>
+              <a:buFont typeface="Arial" panose="020B0604020202020204" pitchFamily="34" charset="0"/>
+              <a:buChar char="•"/>
+              <a:defRPr sz="1800" kern="1200">
+                <a:solidFill>
+                  <a:schemeClr val="tx1"/>
+                </a:solidFill>
+                <a:latin typeface="+mn-lt"/>
+                <a:ea typeface="+mn-ea"/>
+                <a:cs typeface="+mn-cs"/>
+              </a:defRPr>
+            </a:lvl8pPr>
+            <a:lvl9pPr marL="3886200" indent="-228600" algn="l" defTabSz="914400" rtl="0" eaLnBrk="1" latinLnBrk="0" hangingPunct="1">
+              <a:lnSpc>
+                <a:spcPct val="90000"/>
+              </a:lnSpc>
+              <a:spcBef>
+                <a:spcPts val="500"/>
+              </a:spcBef>
+              <a:buFont typeface="Arial" panose="020B0604020202020204" pitchFamily="34" charset="0"/>
+              <a:buChar char="•"/>
+              <a:defRPr sz="1800" kern="1200">
+                <a:solidFill>
+                  <a:schemeClr val="tx1"/>
+                </a:solidFill>
+                <a:latin typeface="+mn-lt"/>
+                <a:ea typeface="+mn-ea"/>
+                <a:cs typeface="+mn-cs"/>
+              </a:defRPr>
+            </a:lvl9pPr>
+          </a:lstStyle>
+          <a:p>
+            <a:pPr marL="0" indent="0">
+              <a:buFont typeface="Arial" panose="020B0604020202020204" pitchFamily="34" charset="0"/>
+              <a:buNone/>
+            </a:pPr>
+            <a:r>
+              <a:rPr lang="en-US" sz="2600" dirty="0">
+                <a:solidFill>
+                  <a:schemeClr val="bg1">
+                    <a:lumMod val="75000"/>
+                  </a:schemeClr>
+                </a:solidFill>
+              </a:rPr>
+              <a:t>Process</a:t>
+            </a:r>
+            <a:r>
+              <a:rPr lang="en-US" dirty="0">
+                <a:solidFill>
+                  <a:schemeClr val="bg1">
+                    <a:lumMod val="75000"/>
+                  </a:schemeClr>
+                </a:solidFill>
+              </a:rPr>
+              <a:t>:</a:t>
+            </a:r>
+          </a:p>
+        </p:txBody>
+      </p:sp>
+      <p:sp>
+        <p:nvSpPr>
+          <p:cNvPr id="10" name="Content Placeholder 2"/>
+          <p:cNvSpPr txBox="1">
+            <a:spLocks/>
+          </p:cNvSpPr>
+          <p:nvPr/>
+        </p:nvSpPr>
+        <p:spPr>
+          <a:xfrm>
+            <a:off x="549876" y="4100815"/>
+            <a:ext cx="1437452" cy="518746"/>
+          </a:xfrm>
+          <a:prstGeom prst="rect">
+            <a:avLst/>
+          </a:prstGeom>
+        </p:spPr>
+        <p:txBody>
+          <a:bodyPr vert="horz" lIns="91440" tIns="45720" rIns="91440" bIns="45720" rtlCol="0">
+            <a:noAutofit/>
+          </a:bodyPr>
+          <a:lstStyle>
+            <a:lvl1pPr marL="228600" indent="-228600" algn="l" defTabSz="914400" rtl="0" eaLnBrk="1" latinLnBrk="0" hangingPunct="1">
+              <a:lnSpc>
+                <a:spcPct val="90000"/>
+              </a:lnSpc>
+              <a:spcBef>
+                <a:spcPts val="1000"/>
+              </a:spcBef>
+              <a:buFont typeface="Arial" panose="020B0604020202020204" pitchFamily="34" charset="0"/>
+              <a:buChar char="•"/>
+              <a:defRPr sz="2800" kern="1200">
+                <a:solidFill>
+                  <a:schemeClr val="tx1"/>
+                </a:solidFill>
+                <a:latin typeface="+mn-lt"/>
+                <a:ea typeface="+mn-ea"/>
+                <a:cs typeface="+mn-cs"/>
+              </a:defRPr>
+            </a:lvl1pPr>
+            <a:lvl2pPr marL="685800" indent="-228600" algn="l" defTabSz="914400" rtl="0" eaLnBrk="1" latinLnBrk="0" hangingPunct="1">
+              <a:lnSpc>
+                <a:spcPct val="90000"/>
+              </a:lnSpc>
+              <a:spcBef>
+                <a:spcPts val="500"/>
+              </a:spcBef>
+              <a:buFont typeface="Arial" panose="020B0604020202020204" pitchFamily="34" charset="0"/>
+              <a:buChar char="•"/>
+              <a:defRPr sz="2400" kern="1200">
+                <a:solidFill>
+                  <a:schemeClr val="tx1"/>
+                </a:solidFill>
+                <a:latin typeface="+mn-lt"/>
+                <a:ea typeface="+mn-ea"/>
+                <a:cs typeface="+mn-cs"/>
+              </a:defRPr>
+            </a:lvl2pPr>
+            <a:lvl3pPr marL="1143000" indent="-228600" algn="l" defTabSz="914400" rtl="0" eaLnBrk="1" latinLnBrk="0" hangingPunct="1">
+              <a:lnSpc>
+                <a:spcPct val="90000"/>
+              </a:lnSpc>
+              <a:spcBef>
+                <a:spcPts val="500"/>
+              </a:spcBef>
+              <a:buFont typeface="Arial" panose="020B0604020202020204" pitchFamily="34" charset="0"/>
+              <a:buChar char="•"/>
+              <a:defRPr sz="2000" kern="1200">
+                <a:solidFill>
+                  <a:schemeClr val="tx1"/>
+                </a:solidFill>
+                <a:latin typeface="+mn-lt"/>
+                <a:ea typeface="+mn-ea"/>
+                <a:cs typeface="+mn-cs"/>
+              </a:defRPr>
+            </a:lvl3pPr>
+            <a:lvl4pPr marL="1600200" indent="-228600" algn="l" defTabSz="914400" rtl="0" eaLnBrk="1" latinLnBrk="0" hangingPunct="1">
+              <a:lnSpc>
+                <a:spcPct val="90000"/>
+              </a:lnSpc>
+              <a:spcBef>
+                <a:spcPts val="500"/>
+              </a:spcBef>
+              <a:buFont typeface="Arial" panose="020B0604020202020204" pitchFamily="34" charset="0"/>
+              <a:buChar char="•"/>
+              <a:defRPr sz="1800" kern="1200">
+                <a:solidFill>
+                  <a:schemeClr val="tx1"/>
+                </a:solidFill>
+                <a:latin typeface="+mn-lt"/>
+                <a:ea typeface="+mn-ea"/>
+                <a:cs typeface="+mn-cs"/>
+              </a:defRPr>
+            </a:lvl4pPr>
+            <a:lvl5pPr marL="2057400" indent="-228600" algn="l" defTabSz="914400" rtl="0" eaLnBrk="1" latinLnBrk="0" hangingPunct="1">
+              <a:lnSpc>
+                <a:spcPct val="90000"/>
+              </a:lnSpc>
+              <a:spcBef>
+                <a:spcPts val="500"/>
+              </a:spcBef>
+              <a:buFont typeface="Arial" panose="020B0604020202020204" pitchFamily="34" charset="0"/>
+              <a:buChar char="•"/>
+              <a:defRPr sz="1800" kern="1200">
+                <a:solidFill>
+                  <a:schemeClr val="tx1"/>
+                </a:solidFill>
+                <a:latin typeface="+mn-lt"/>
+                <a:ea typeface="+mn-ea"/>
+                <a:cs typeface="+mn-cs"/>
+              </a:defRPr>
+            </a:lvl5pPr>
+            <a:lvl6pPr marL="2514600" indent="-228600" algn="l" defTabSz="914400" rtl="0" eaLnBrk="1" latinLnBrk="0" hangingPunct="1">
+              <a:lnSpc>
+                <a:spcPct val="90000"/>
+              </a:lnSpc>
+              <a:spcBef>
+                <a:spcPts val="500"/>
+              </a:spcBef>
+              <a:buFont typeface="Arial" panose="020B0604020202020204" pitchFamily="34" charset="0"/>
+              <a:buChar char="•"/>
+              <a:defRPr sz="1800" kern="1200">
+                <a:solidFill>
+                  <a:schemeClr val="tx1"/>
+                </a:solidFill>
+                <a:latin typeface="+mn-lt"/>
+                <a:ea typeface="+mn-ea"/>
+                <a:cs typeface="+mn-cs"/>
+              </a:defRPr>
+            </a:lvl6pPr>
+            <a:lvl7pPr marL="2971800" indent="-228600" algn="l" defTabSz="914400" rtl="0" eaLnBrk="1" latinLnBrk="0" hangingPunct="1">
+              <a:lnSpc>
+                <a:spcPct val="90000"/>
+              </a:lnSpc>
+              <a:spcBef>
+                <a:spcPts val="500"/>
+              </a:spcBef>
+              <a:buFont typeface="Arial" panose="020B0604020202020204" pitchFamily="34" charset="0"/>
+              <a:buChar char="•"/>
+              <a:defRPr sz="1800" kern="1200">
+                <a:solidFill>
+                  <a:schemeClr val="tx1"/>
+                </a:solidFill>
+                <a:latin typeface="+mn-lt"/>
+                <a:ea typeface="+mn-ea"/>
+                <a:cs typeface="+mn-cs"/>
+              </a:defRPr>
+            </a:lvl7pPr>
+            <a:lvl8pPr marL="3429000" indent="-228600" algn="l" defTabSz="914400" rtl="0" eaLnBrk="1" latinLnBrk="0" hangingPunct="1">
+              <a:lnSpc>
+                <a:spcPct val="90000"/>
+              </a:lnSpc>
+              <a:spcBef>
+                <a:spcPts val="500"/>
+              </a:spcBef>
+              <a:buFont typeface="Arial" panose="020B0604020202020204" pitchFamily="34" charset="0"/>
+              <a:buChar char="•"/>
+              <a:defRPr sz="1800" kern="1200">
+                <a:solidFill>
+                  <a:schemeClr val="tx1"/>
+                </a:solidFill>
+                <a:latin typeface="+mn-lt"/>
+                <a:ea typeface="+mn-ea"/>
+                <a:cs typeface="+mn-cs"/>
+              </a:defRPr>
+            </a:lvl8pPr>
+            <a:lvl9pPr marL="3886200" indent="-228600" algn="l" defTabSz="914400" rtl="0" eaLnBrk="1" latinLnBrk="0" hangingPunct="1">
+              <a:lnSpc>
+                <a:spcPct val="90000"/>
+              </a:lnSpc>
+              <a:spcBef>
+                <a:spcPts val="500"/>
+              </a:spcBef>
+              <a:buFont typeface="Arial" panose="020B0604020202020204" pitchFamily="34" charset="0"/>
+              <a:buChar char="•"/>
+              <a:defRPr sz="1800" kern="1200">
+                <a:solidFill>
+                  <a:schemeClr val="tx1"/>
+                </a:solidFill>
+                <a:latin typeface="+mn-lt"/>
+                <a:ea typeface="+mn-ea"/>
+                <a:cs typeface="+mn-cs"/>
+              </a:defRPr>
+            </a:lvl9pPr>
+          </a:lstStyle>
+          <a:p>
+            <a:pPr marL="0" indent="0">
+              <a:buFont typeface="Arial" panose="020B0604020202020204" pitchFamily="34" charset="0"/>
+              <a:buNone/>
+            </a:pPr>
+            <a:r>
+              <a:rPr lang="en-US" sz="2200" dirty="0">
+                <a:solidFill>
+                  <a:schemeClr val="bg1">
+                    <a:lumMod val="65000"/>
+                  </a:schemeClr>
+                </a:solidFill>
+              </a:rPr>
+              <a:t>Additional examples:</a:t>
+            </a:r>
+          </a:p>
+        </p:txBody>
+      </p:sp>
+      <p:sp>
+        <p:nvSpPr>
+          <p:cNvPr id="11" name="Content Placeholder 2"/>
+          <p:cNvSpPr txBox="1">
+            <a:spLocks/>
+          </p:cNvSpPr>
+          <p:nvPr/>
+        </p:nvSpPr>
+        <p:spPr>
+          <a:xfrm>
+            <a:off x="3350717" y="1735798"/>
+            <a:ext cx="1398288" cy="518746"/>
+          </a:xfrm>
+          <a:prstGeom prst="rect">
+            <a:avLst/>
+          </a:prstGeom>
+        </p:spPr>
+        <p:txBody>
+          <a:bodyPr vert="horz" lIns="91440" tIns="45720" rIns="91440" bIns="45720" rtlCol="0">
+            <a:normAutofit/>
+          </a:bodyPr>
+          <a:lstStyle>
+            <a:lvl1pPr marL="228600" indent="-228600" algn="l" defTabSz="914400" rtl="0" eaLnBrk="1" latinLnBrk="0" hangingPunct="1">
+              <a:lnSpc>
+                <a:spcPct val="90000"/>
+              </a:lnSpc>
+              <a:spcBef>
+                <a:spcPts val="1000"/>
+              </a:spcBef>
+              <a:buFont typeface="Arial" panose="020B0604020202020204" pitchFamily="34" charset="0"/>
+              <a:buChar char="•"/>
+              <a:defRPr sz="2800" kern="1200">
+                <a:solidFill>
+                  <a:schemeClr val="tx1"/>
+                </a:solidFill>
+                <a:latin typeface="+mn-lt"/>
+                <a:ea typeface="+mn-ea"/>
+                <a:cs typeface="+mn-cs"/>
+              </a:defRPr>
+            </a:lvl1pPr>
+            <a:lvl2pPr marL="685800" indent="-228600" algn="l" defTabSz="914400" rtl="0" eaLnBrk="1" latinLnBrk="0" hangingPunct="1">
+              <a:lnSpc>
+                <a:spcPct val="90000"/>
+              </a:lnSpc>
+              <a:spcBef>
+                <a:spcPts val="500"/>
+              </a:spcBef>
+              <a:buFont typeface="Arial" panose="020B0604020202020204" pitchFamily="34" charset="0"/>
+              <a:buChar char="•"/>
+              <a:defRPr sz="2400" kern="1200">
+                <a:solidFill>
+                  <a:schemeClr val="tx1"/>
+                </a:solidFill>
+                <a:latin typeface="+mn-lt"/>
+                <a:ea typeface="+mn-ea"/>
+                <a:cs typeface="+mn-cs"/>
+              </a:defRPr>
+            </a:lvl2pPr>
+            <a:lvl3pPr marL="1143000" indent="-228600" algn="l" defTabSz="914400" rtl="0" eaLnBrk="1" latinLnBrk="0" hangingPunct="1">
+              <a:lnSpc>
+                <a:spcPct val="90000"/>
+              </a:lnSpc>
+              <a:spcBef>
+                <a:spcPts val="500"/>
+              </a:spcBef>
+              <a:buFont typeface="Arial" panose="020B0604020202020204" pitchFamily="34" charset="0"/>
+              <a:buChar char="•"/>
+              <a:defRPr sz="2000" kern="1200">
+                <a:solidFill>
+                  <a:schemeClr val="tx1"/>
+                </a:solidFill>
+                <a:latin typeface="+mn-lt"/>
+                <a:ea typeface="+mn-ea"/>
+                <a:cs typeface="+mn-cs"/>
+              </a:defRPr>
+            </a:lvl3pPr>
+            <a:lvl4pPr marL="1600200" indent="-228600" algn="l" defTabSz="914400" rtl="0" eaLnBrk="1" latinLnBrk="0" hangingPunct="1">
+              <a:lnSpc>
+                <a:spcPct val="90000"/>
+              </a:lnSpc>
+              <a:spcBef>
+                <a:spcPts val="500"/>
+              </a:spcBef>
+              <a:buFont typeface="Arial" panose="020B0604020202020204" pitchFamily="34" charset="0"/>
+              <a:buChar char="•"/>
+              <a:defRPr sz="1800" kern="1200">
+                <a:solidFill>
+                  <a:schemeClr val="tx1"/>
+                </a:solidFill>
+                <a:latin typeface="+mn-lt"/>
+                <a:ea typeface="+mn-ea"/>
+                <a:cs typeface="+mn-cs"/>
+              </a:defRPr>
+            </a:lvl4pPr>
+            <a:lvl5pPr marL="2057400" indent="-228600" algn="l" defTabSz="914400" rtl="0" eaLnBrk="1" latinLnBrk="0" hangingPunct="1">
+              <a:lnSpc>
+                <a:spcPct val="90000"/>
+              </a:lnSpc>
+              <a:spcBef>
+                <a:spcPts val="500"/>
+              </a:spcBef>
+              <a:buFont typeface="Arial" panose="020B0604020202020204" pitchFamily="34" charset="0"/>
+              <a:buChar char="•"/>
+              <a:defRPr sz="1800" kern="1200">
+                <a:solidFill>
+                  <a:schemeClr val="tx1"/>
+                </a:solidFill>
+                <a:latin typeface="+mn-lt"/>
+                <a:ea typeface="+mn-ea"/>
+                <a:cs typeface="+mn-cs"/>
+              </a:defRPr>
+            </a:lvl5pPr>
+            <a:lvl6pPr marL="2514600" indent="-228600" algn="l" defTabSz="914400" rtl="0" eaLnBrk="1" latinLnBrk="0" hangingPunct="1">
+              <a:lnSpc>
+                <a:spcPct val="90000"/>
+              </a:lnSpc>
+              <a:spcBef>
+                <a:spcPts val="500"/>
+              </a:spcBef>
+              <a:buFont typeface="Arial" panose="020B0604020202020204" pitchFamily="34" charset="0"/>
+              <a:buChar char="•"/>
+              <a:defRPr sz="1800" kern="1200">
+                <a:solidFill>
+                  <a:schemeClr val="tx1"/>
+                </a:solidFill>
+                <a:latin typeface="+mn-lt"/>
+                <a:ea typeface="+mn-ea"/>
+                <a:cs typeface="+mn-cs"/>
+              </a:defRPr>
+            </a:lvl6pPr>
+            <a:lvl7pPr marL="2971800" indent="-228600" algn="l" defTabSz="914400" rtl="0" eaLnBrk="1" latinLnBrk="0" hangingPunct="1">
+              <a:lnSpc>
+                <a:spcPct val="90000"/>
+              </a:lnSpc>
+              <a:spcBef>
+                <a:spcPts val="500"/>
+              </a:spcBef>
+              <a:buFont typeface="Arial" panose="020B0604020202020204" pitchFamily="34" charset="0"/>
+              <a:buChar char="•"/>
+              <a:defRPr sz="1800" kern="1200">
+                <a:solidFill>
+                  <a:schemeClr val="tx1"/>
+                </a:solidFill>
+                <a:latin typeface="+mn-lt"/>
+                <a:ea typeface="+mn-ea"/>
+                <a:cs typeface="+mn-cs"/>
+              </a:defRPr>
+            </a:lvl7pPr>
+            <a:lvl8pPr marL="3429000" indent="-228600" algn="l" defTabSz="914400" rtl="0" eaLnBrk="1" latinLnBrk="0" hangingPunct="1">
+              <a:lnSpc>
+                <a:spcPct val="90000"/>
+              </a:lnSpc>
+              <a:spcBef>
+                <a:spcPts val="500"/>
+              </a:spcBef>
+              <a:buFont typeface="Arial" panose="020B0604020202020204" pitchFamily="34" charset="0"/>
+              <a:buChar char="•"/>
+              <a:defRPr sz="1800" kern="1200">
+                <a:solidFill>
+                  <a:schemeClr val="tx1"/>
+                </a:solidFill>
+                <a:latin typeface="+mn-lt"/>
+                <a:ea typeface="+mn-ea"/>
+                <a:cs typeface="+mn-cs"/>
+              </a:defRPr>
+            </a:lvl8pPr>
+            <a:lvl9pPr marL="3886200" indent="-228600" algn="l" defTabSz="914400" rtl="0" eaLnBrk="1" latinLnBrk="0" hangingPunct="1">
+              <a:lnSpc>
+                <a:spcPct val="90000"/>
+              </a:lnSpc>
+              <a:spcBef>
+                <a:spcPts val="500"/>
+              </a:spcBef>
+              <a:buFont typeface="Arial" panose="020B0604020202020204" pitchFamily="34" charset="0"/>
+              <a:buChar char="•"/>
+              <a:defRPr sz="1800" kern="1200">
+                <a:solidFill>
+                  <a:schemeClr val="tx1"/>
+                </a:solidFill>
+                <a:latin typeface="+mn-lt"/>
+                <a:ea typeface="+mn-ea"/>
+                <a:cs typeface="+mn-cs"/>
+              </a:defRPr>
+            </a:lvl9pPr>
+          </a:lstStyle>
+          <a:p>
+            <a:pPr marL="0" indent="0">
+              <a:buNone/>
+            </a:pPr>
+            <a:r>
+              <a:rPr lang="en-US" sz="1100" dirty="0"/>
+              <a:t>1. Must start with the </a:t>
+            </a:r>
+            <a:r>
+              <a:rPr lang="en-US" sz="1100" dirty="0">
+                <a:highlight>
+                  <a:srgbClr val="CCECFF"/>
+                </a:highlight>
+              </a:rPr>
+              <a:t>#clinical trial</a:t>
+            </a:r>
+            <a:r>
+              <a:rPr lang="en-US" sz="1100" dirty="0"/>
+              <a:t> tag.</a:t>
+            </a:r>
+          </a:p>
+        </p:txBody>
+      </p:sp>
+      <p:sp>
+        <p:nvSpPr>
+          <p:cNvPr id="12" name="Content Placeholder 2"/>
+          <p:cNvSpPr txBox="1">
+            <a:spLocks/>
+          </p:cNvSpPr>
+          <p:nvPr/>
+        </p:nvSpPr>
+        <p:spPr>
+          <a:xfrm>
+            <a:off x="4738579" y="1713815"/>
+            <a:ext cx="1280746" cy="481445"/>
+          </a:xfrm>
+          <a:prstGeom prst="rect">
+            <a:avLst/>
+          </a:prstGeom>
+        </p:spPr>
+        <p:txBody>
+          <a:bodyPr vert="horz" lIns="91440" tIns="45720" rIns="91440" bIns="45720" rtlCol="0">
+            <a:noAutofit/>
+          </a:bodyPr>
+          <a:lstStyle>
+            <a:lvl1pPr marL="228600" indent="-228600" algn="l" defTabSz="914400" rtl="0" eaLnBrk="1" latinLnBrk="0" hangingPunct="1">
+              <a:lnSpc>
+                <a:spcPct val="90000"/>
+              </a:lnSpc>
+              <a:spcBef>
+                <a:spcPts val="1000"/>
+              </a:spcBef>
+              <a:buFont typeface="Arial" panose="020B0604020202020204" pitchFamily="34" charset="0"/>
+              <a:buChar char="•"/>
+              <a:defRPr sz="2800" kern="1200">
+                <a:solidFill>
+                  <a:schemeClr val="tx1"/>
+                </a:solidFill>
+                <a:latin typeface="+mn-lt"/>
+                <a:ea typeface="+mn-ea"/>
+                <a:cs typeface="+mn-cs"/>
+              </a:defRPr>
+            </a:lvl1pPr>
+            <a:lvl2pPr marL="685800" indent="-228600" algn="l" defTabSz="914400" rtl="0" eaLnBrk="1" latinLnBrk="0" hangingPunct="1">
+              <a:lnSpc>
+                <a:spcPct val="90000"/>
+              </a:lnSpc>
+              <a:spcBef>
+                <a:spcPts val="500"/>
+              </a:spcBef>
+              <a:buFont typeface="Arial" panose="020B0604020202020204" pitchFamily="34" charset="0"/>
+              <a:buChar char="•"/>
+              <a:defRPr sz="2400" kern="1200">
+                <a:solidFill>
+                  <a:schemeClr val="tx1"/>
+                </a:solidFill>
+                <a:latin typeface="+mn-lt"/>
+                <a:ea typeface="+mn-ea"/>
+                <a:cs typeface="+mn-cs"/>
+              </a:defRPr>
+            </a:lvl2pPr>
+            <a:lvl3pPr marL="1143000" indent="-228600" algn="l" defTabSz="914400" rtl="0" eaLnBrk="1" latinLnBrk="0" hangingPunct="1">
+              <a:lnSpc>
+                <a:spcPct val="90000"/>
+              </a:lnSpc>
+              <a:spcBef>
+                <a:spcPts val="500"/>
+              </a:spcBef>
+              <a:buFont typeface="Arial" panose="020B0604020202020204" pitchFamily="34" charset="0"/>
+              <a:buChar char="•"/>
+              <a:defRPr sz="2000" kern="1200">
+                <a:solidFill>
+                  <a:schemeClr val="tx1"/>
+                </a:solidFill>
+                <a:latin typeface="+mn-lt"/>
+                <a:ea typeface="+mn-ea"/>
+                <a:cs typeface="+mn-cs"/>
+              </a:defRPr>
+            </a:lvl3pPr>
+            <a:lvl4pPr marL="1600200" indent="-228600" algn="l" defTabSz="914400" rtl="0" eaLnBrk="1" latinLnBrk="0" hangingPunct="1">
+              <a:lnSpc>
+                <a:spcPct val="90000"/>
+              </a:lnSpc>
+              <a:spcBef>
+                <a:spcPts val="500"/>
+              </a:spcBef>
+              <a:buFont typeface="Arial" panose="020B0604020202020204" pitchFamily="34" charset="0"/>
+              <a:buChar char="•"/>
+              <a:defRPr sz="1800" kern="1200">
+                <a:solidFill>
+                  <a:schemeClr val="tx1"/>
+                </a:solidFill>
+                <a:latin typeface="+mn-lt"/>
+                <a:ea typeface="+mn-ea"/>
+                <a:cs typeface="+mn-cs"/>
+              </a:defRPr>
+            </a:lvl4pPr>
+            <a:lvl5pPr marL="2057400" indent="-228600" algn="l" defTabSz="914400" rtl="0" eaLnBrk="1" latinLnBrk="0" hangingPunct="1">
+              <a:lnSpc>
+                <a:spcPct val="90000"/>
+              </a:lnSpc>
+              <a:spcBef>
+                <a:spcPts val="500"/>
+              </a:spcBef>
+              <a:buFont typeface="Arial" panose="020B0604020202020204" pitchFamily="34" charset="0"/>
+              <a:buChar char="•"/>
+              <a:defRPr sz="1800" kern="1200">
+                <a:solidFill>
+                  <a:schemeClr val="tx1"/>
+                </a:solidFill>
+                <a:latin typeface="+mn-lt"/>
+                <a:ea typeface="+mn-ea"/>
+                <a:cs typeface="+mn-cs"/>
+              </a:defRPr>
+            </a:lvl5pPr>
+            <a:lvl6pPr marL="2514600" indent="-228600" algn="l" defTabSz="914400" rtl="0" eaLnBrk="1" latinLnBrk="0" hangingPunct="1">
+              <a:lnSpc>
+                <a:spcPct val="90000"/>
+              </a:lnSpc>
+              <a:spcBef>
+                <a:spcPts val="500"/>
+              </a:spcBef>
+              <a:buFont typeface="Arial" panose="020B0604020202020204" pitchFamily="34" charset="0"/>
+              <a:buChar char="•"/>
+              <a:defRPr sz="1800" kern="1200">
+                <a:solidFill>
+                  <a:schemeClr val="tx1"/>
+                </a:solidFill>
+                <a:latin typeface="+mn-lt"/>
+                <a:ea typeface="+mn-ea"/>
+                <a:cs typeface="+mn-cs"/>
+              </a:defRPr>
+            </a:lvl6pPr>
+            <a:lvl7pPr marL="2971800" indent="-228600" algn="l" defTabSz="914400" rtl="0" eaLnBrk="1" latinLnBrk="0" hangingPunct="1">
+              <a:lnSpc>
+                <a:spcPct val="90000"/>
+              </a:lnSpc>
+              <a:spcBef>
+                <a:spcPts val="500"/>
+              </a:spcBef>
+              <a:buFont typeface="Arial" panose="020B0604020202020204" pitchFamily="34" charset="0"/>
+              <a:buChar char="•"/>
+              <a:defRPr sz="1800" kern="1200">
+                <a:solidFill>
+                  <a:schemeClr val="tx1"/>
+                </a:solidFill>
+                <a:latin typeface="+mn-lt"/>
+                <a:ea typeface="+mn-ea"/>
+                <a:cs typeface="+mn-cs"/>
+              </a:defRPr>
+            </a:lvl7pPr>
+            <a:lvl8pPr marL="3429000" indent="-228600" algn="l" defTabSz="914400" rtl="0" eaLnBrk="1" latinLnBrk="0" hangingPunct="1">
+              <a:lnSpc>
+                <a:spcPct val="90000"/>
+              </a:lnSpc>
+              <a:spcBef>
+                <a:spcPts val="500"/>
+              </a:spcBef>
+              <a:buFont typeface="Arial" panose="020B0604020202020204" pitchFamily="34" charset="0"/>
+              <a:buChar char="•"/>
+              <a:defRPr sz="1800" kern="1200">
+                <a:solidFill>
+                  <a:schemeClr val="tx1"/>
+                </a:solidFill>
+                <a:latin typeface="+mn-lt"/>
+                <a:ea typeface="+mn-ea"/>
+                <a:cs typeface="+mn-cs"/>
+              </a:defRPr>
+            </a:lvl8pPr>
+            <a:lvl9pPr marL="3886200" indent="-228600" algn="l" defTabSz="914400" rtl="0" eaLnBrk="1" latinLnBrk="0" hangingPunct="1">
+              <a:lnSpc>
+                <a:spcPct val="90000"/>
+              </a:lnSpc>
+              <a:spcBef>
+                <a:spcPts val="500"/>
+              </a:spcBef>
+              <a:buFont typeface="Arial" panose="020B0604020202020204" pitchFamily="34" charset="0"/>
+              <a:buChar char="•"/>
+              <a:defRPr sz="1800" kern="1200">
+                <a:solidFill>
+                  <a:schemeClr val="tx1"/>
+                </a:solidFill>
+                <a:latin typeface="+mn-lt"/>
+                <a:ea typeface="+mn-ea"/>
+                <a:cs typeface="+mn-cs"/>
+              </a:defRPr>
+            </a:lvl9pPr>
+          </a:lstStyle>
+          <a:p>
+            <a:pPr marL="0" indent="0">
+              <a:buNone/>
+            </a:pPr>
+            <a:r>
+              <a:rPr lang="en-US" sz="1100" dirty="0"/>
+              <a:t>2. Specify </a:t>
+            </a:r>
+            <a:r>
+              <a:rPr lang="en-US" sz="1100" dirty="0" smtClean="0"/>
+              <a:t>one clinical trial name</a:t>
+            </a:r>
+            <a:endParaRPr lang="en-US" sz="1100" dirty="0">
+              <a:highlight>
+                <a:srgbClr val="CCECFF"/>
+              </a:highlight>
+            </a:endParaRPr>
+          </a:p>
+        </p:txBody>
+      </p:sp>
+      <p:sp>
+        <p:nvSpPr>
+          <p:cNvPr id="13" name="Content Placeholder 2"/>
+          <p:cNvSpPr txBox="1">
+            <a:spLocks/>
+          </p:cNvSpPr>
+          <p:nvPr/>
+        </p:nvSpPr>
+        <p:spPr>
+          <a:xfrm>
+            <a:off x="6098837" y="1677395"/>
+            <a:ext cx="1280746" cy="1827272"/>
+          </a:xfrm>
+          <a:prstGeom prst="rect">
+            <a:avLst/>
+          </a:prstGeom>
+        </p:spPr>
+        <p:txBody>
+          <a:bodyPr vert="horz" lIns="91440" tIns="45720" rIns="91440" bIns="45720" rtlCol="0">
+            <a:noAutofit/>
+          </a:bodyPr>
+          <a:lstStyle>
+            <a:lvl1pPr marL="228600" indent="-228600" algn="l" defTabSz="914400" rtl="0" eaLnBrk="1" latinLnBrk="0" hangingPunct="1">
+              <a:lnSpc>
+                <a:spcPct val="90000"/>
+              </a:lnSpc>
+              <a:spcBef>
+                <a:spcPts val="1000"/>
+              </a:spcBef>
+              <a:buFont typeface="Arial" panose="020B0604020202020204" pitchFamily="34" charset="0"/>
+              <a:buChar char="•"/>
+              <a:defRPr sz="2800" kern="1200">
+                <a:solidFill>
+                  <a:schemeClr val="tx1"/>
+                </a:solidFill>
+                <a:latin typeface="+mn-lt"/>
+                <a:ea typeface="+mn-ea"/>
+                <a:cs typeface="+mn-cs"/>
+              </a:defRPr>
+            </a:lvl1pPr>
+            <a:lvl2pPr marL="685800" indent="-228600" algn="l" defTabSz="914400" rtl="0" eaLnBrk="1" latinLnBrk="0" hangingPunct="1">
+              <a:lnSpc>
+                <a:spcPct val="90000"/>
+              </a:lnSpc>
+              <a:spcBef>
+                <a:spcPts val="500"/>
+              </a:spcBef>
+              <a:buFont typeface="Arial" panose="020B0604020202020204" pitchFamily="34" charset="0"/>
+              <a:buChar char="•"/>
+              <a:defRPr sz="2400" kern="1200">
+                <a:solidFill>
+                  <a:schemeClr val="tx1"/>
+                </a:solidFill>
+                <a:latin typeface="+mn-lt"/>
+                <a:ea typeface="+mn-ea"/>
+                <a:cs typeface="+mn-cs"/>
+              </a:defRPr>
+            </a:lvl2pPr>
+            <a:lvl3pPr marL="1143000" indent="-228600" algn="l" defTabSz="914400" rtl="0" eaLnBrk="1" latinLnBrk="0" hangingPunct="1">
+              <a:lnSpc>
+                <a:spcPct val="90000"/>
+              </a:lnSpc>
+              <a:spcBef>
+                <a:spcPts val="500"/>
+              </a:spcBef>
+              <a:buFont typeface="Arial" panose="020B0604020202020204" pitchFamily="34" charset="0"/>
+              <a:buChar char="•"/>
+              <a:defRPr sz="2000" kern="1200">
+                <a:solidFill>
+                  <a:schemeClr val="tx1"/>
+                </a:solidFill>
+                <a:latin typeface="+mn-lt"/>
+                <a:ea typeface="+mn-ea"/>
+                <a:cs typeface="+mn-cs"/>
+              </a:defRPr>
+            </a:lvl3pPr>
+            <a:lvl4pPr marL="1600200" indent="-228600" algn="l" defTabSz="914400" rtl="0" eaLnBrk="1" latinLnBrk="0" hangingPunct="1">
+              <a:lnSpc>
+                <a:spcPct val="90000"/>
+              </a:lnSpc>
+              <a:spcBef>
+                <a:spcPts val="500"/>
+              </a:spcBef>
+              <a:buFont typeface="Arial" panose="020B0604020202020204" pitchFamily="34" charset="0"/>
+              <a:buChar char="•"/>
+              <a:defRPr sz="1800" kern="1200">
+                <a:solidFill>
+                  <a:schemeClr val="tx1"/>
+                </a:solidFill>
+                <a:latin typeface="+mn-lt"/>
+                <a:ea typeface="+mn-ea"/>
+                <a:cs typeface="+mn-cs"/>
+              </a:defRPr>
+            </a:lvl4pPr>
+            <a:lvl5pPr marL="2057400" indent="-228600" algn="l" defTabSz="914400" rtl="0" eaLnBrk="1" latinLnBrk="0" hangingPunct="1">
+              <a:lnSpc>
+                <a:spcPct val="90000"/>
+              </a:lnSpc>
+              <a:spcBef>
+                <a:spcPts val="500"/>
+              </a:spcBef>
+              <a:buFont typeface="Arial" panose="020B0604020202020204" pitchFamily="34" charset="0"/>
+              <a:buChar char="•"/>
+              <a:defRPr sz="1800" kern="1200">
+                <a:solidFill>
+                  <a:schemeClr val="tx1"/>
+                </a:solidFill>
+                <a:latin typeface="+mn-lt"/>
+                <a:ea typeface="+mn-ea"/>
+                <a:cs typeface="+mn-cs"/>
+              </a:defRPr>
+            </a:lvl5pPr>
+            <a:lvl6pPr marL="2514600" indent="-228600" algn="l" defTabSz="914400" rtl="0" eaLnBrk="1" latinLnBrk="0" hangingPunct="1">
+              <a:lnSpc>
+                <a:spcPct val="90000"/>
+              </a:lnSpc>
+              <a:spcBef>
+                <a:spcPts val="500"/>
+              </a:spcBef>
+              <a:buFont typeface="Arial" panose="020B0604020202020204" pitchFamily="34" charset="0"/>
+              <a:buChar char="•"/>
+              <a:defRPr sz="1800" kern="1200">
+                <a:solidFill>
+                  <a:schemeClr val="tx1"/>
+                </a:solidFill>
+                <a:latin typeface="+mn-lt"/>
+                <a:ea typeface="+mn-ea"/>
+                <a:cs typeface="+mn-cs"/>
+              </a:defRPr>
+            </a:lvl6pPr>
+            <a:lvl7pPr marL="2971800" indent="-228600" algn="l" defTabSz="914400" rtl="0" eaLnBrk="1" latinLnBrk="0" hangingPunct="1">
+              <a:lnSpc>
+                <a:spcPct val="90000"/>
+              </a:lnSpc>
+              <a:spcBef>
+                <a:spcPts val="500"/>
+              </a:spcBef>
+              <a:buFont typeface="Arial" panose="020B0604020202020204" pitchFamily="34" charset="0"/>
+              <a:buChar char="•"/>
+              <a:defRPr sz="1800" kern="1200">
+                <a:solidFill>
+                  <a:schemeClr val="tx1"/>
+                </a:solidFill>
+                <a:latin typeface="+mn-lt"/>
+                <a:ea typeface="+mn-ea"/>
+                <a:cs typeface="+mn-cs"/>
+              </a:defRPr>
+            </a:lvl7pPr>
+            <a:lvl8pPr marL="3429000" indent="-228600" algn="l" defTabSz="914400" rtl="0" eaLnBrk="1" latinLnBrk="0" hangingPunct="1">
+              <a:lnSpc>
+                <a:spcPct val="90000"/>
+              </a:lnSpc>
+              <a:spcBef>
+                <a:spcPts val="500"/>
+              </a:spcBef>
+              <a:buFont typeface="Arial" panose="020B0604020202020204" pitchFamily="34" charset="0"/>
+              <a:buChar char="•"/>
+              <a:defRPr sz="1800" kern="1200">
+                <a:solidFill>
+                  <a:schemeClr val="tx1"/>
+                </a:solidFill>
+                <a:latin typeface="+mn-lt"/>
+                <a:ea typeface="+mn-ea"/>
+                <a:cs typeface="+mn-cs"/>
+              </a:defRPr>
+            </a:lvl8pPr>
+            <a:lvl9pPr marL="3886200" indent="-228600" algn="l" defTabSz="914400" rtl="0" eaLnBrk="1" latinLnBrk="0" hangingPunct="1">
+              <a:lnSpc>
+                <a:spcPct val="90000"/>
+              </a:lnSpc>
+              <a:spcBef>
+                <a:spcPts val="500"/>
+              </a:spcBef>
+              <a:buFont typeface="Arial" panose="020B0604020202020204" pitchFamily="34" charset="0"/>
+              <a:buChar char="•"/>
+              <a:defRPr sz="1800" kern="1200">
+                <a:solidFill>
+                  <a:schemeClr val="tx1"/>
+                </a:solidFill>
+                <a:latin typeface="+mn-lt"/>
+                <a:ea typeface="+mn-ea"/>
+                <a:cs typeface="+mn-cs"/>
+              </a:defRPr>
+            </a:lvl9pPr>
+          </a:lstStyle>
+          <a:p>
+            <a:pPr marL="0" indent="0">
+              <a:buNone/>
+            </a:pPr>
+            <a:r>
+              <a:rPr lang="en-US" sz="1100" dirty="0"/>
+              <a:t>3. </a:t>
+            </a:r>
+            <a:r>
+              <a:rPr lang="en-US" sz="1100" dirty="0" smtClean="0"/>
+              <a:t>The </a:t>
+            </a:r>
+            <a:r>
+              <a:rPr lang="en-US" sz="1100" dirty="0">
+                <a:highlight>
+                  <a:srgbClr val="CCECFF"/>
+                </a:highlight>
+              </a:rPr>
+              <a:t>#enrolled on</a:t>
+            </a:r>
+            <a:r>
+              <a:rPr lang="en-US" sz="1100" dirty="0"/>
+              <a:t> </a:t>
+            </a:r>
+            <a:r>
+              <a:rPr lang="en-US" sz="1100" dirty="0" smtClean="0"/>
+              <a:t>date is the date the patient was enrolled in the specified clinical trial.</a:t>
+            </a:r>
+            <a:endParaRPr lang="pt-BR" sz="1100" dirty="0">
+              <a:highlight>
+                <a:srgbClr val="CCECFF"/>
+              </a:highlight>
+            </a:endParaRPr>
+          </a:p>
+        </p:txBody>
+      </p:sp>
+      <p:sp>
+        <p:nvSpPr>
+          <p:cNvPr id="14" name="Content Placeholder 2"/>
+          <p:cNvSpPr txBox="1">
+            <a:spLocks/>
+          </p:cNvSpPr>
+          <p:nvPr/>
+        </p:nvSpPr>
+        <p:spPr>
+          <a:xfrm>
+            <a:off x="9129522" y="1675869"/>
+            <a:ext cx="1280746" cy="1919885"/>
+          </a:xfrm>
+          <a:prstGeom prst="rect">
+            <a:avLst/>
+          </a:prstGeom>
+        </p:spPr>
+        <p:txBody>
+          <a:bodyPr vert="horz" lIns="91440" tIns="45720" rIns="91440" bIns="45720" rtlCol="0">
+            <a:normAutofit/>
+          </a:bodyPr>
+          <a:lstStyle>
+            <a:lvl1pPr marL="228600" indent="-228600" algn="l" defTabSz="914400" rtl="0" eaLnBrk="1" latinLnBrk="0" hangingPunct="1">
+              <a:lnSpc>
+                <a:spcPct val="90000"/>
+              </a:lnSpc>
+              <a:spcBef>
+                <a:spcPts val="1000"/>
+              </a:spcBef>
+              <a:buFont typeface="Arial" panose="020B0604020202020204" pitchFamily="34" charset="0"/>
+              <a:buChar char="•"/>
+              <a:defRPr sz="2800" kern="1200">
+                <a:solidFill>
+                  <a:schemeClr val="tx1"/>
+                </a:solidFill>
+                <a:latin typeface="+mn-lt"/>
+                <a:ea typeface="+mn-ea"/>
+                <a:cs typeface="+mn-cs"/>
+              </a:defRPr>
+            </a:lvl1pPr>
+            <a:lvl2pPr marL="685800" indent="-228600" algn="l" defTabSz="914400" rtl="0" eaLnBrk="1" latinLnBrk="0" hangingPunct="1">
+              <a:lnSpc>
+                <a:spcPct val="90000"/>
+              </a:lnSpc>
+              <a:spcBef>
+                <a:spcPts val="500"/>
+              </a:spcBef>
+              <a:buFont typeface="Arial" panose="020B0604020202020204" pitchFamily="34" charset="0"/>
+              <a:buChar char="•"/>
+              <a:defRPr sz="2400" kern="1200">
+                <a:solidFill>
+                  <a:schemeClr val="tx1"/>
+                </a:solidFill>
+                <a:latin typeface="+mn-lt"/>
+                <a:ea typeface="+mn-ea"/>
+                <a:cs typeface="+mn-cs"/>
+              </a:defRPr>
+            </a:lvl2pPr>
+            <a:lvl3pPr marL="1143000" indent="-228600" algn="l" defTabSz="914400" rtl="0" eaLnBrk="1" latinLnBrk="0" hangingPunct="1">
+              <a:lnSpc>
+                <a:spcPct val="90000"/>
+              </a:lnSpc>
+              <a:spcBef>
+                <a:spcPts val="500"/>
+              </a:spcBef>
+              <a:buFont typeface="Arial" panose="020B0604020202020204" pitchFamily="34" charset="0"/>
+              <a:buChar char="•"/>
+              <a:defRPr sz="2000" kern="1200">
+                <a:solidFill>
+                  <a:schemeClr val="tx1"/>
+                </a:solidFill>
+                <a:latin typeface="+mn-lt"/>
+                <a:ea typeface="+mn-ea"/>
+                <a:cs typeface="+mn-cs"/>
+              </a:defRPr>
+            </a:lvl3pPr>
+            <a:lvl4pPr marL="1600200" indent="-228600" algn="l" defTabSz="914400" rtl="0" eaLnBrk="1" latinLnBrk="0" hangingPunct="1">
+              <a:lnSpc>
+                <a:spcPct val="90000"/>
+              </a:lnSpc>
+              <a:spcBef>
+                <a:spcPts val="500"/>
+              </a:spcBef>
+              <a:buFont typeface="Arial" panose="020B0604020202020204" pitchFamily="34" charset="0"/>
+              <a:buChar char="•"/>
+              <a:defRPr sz="1800" kern="1200">
+                <a:solidFill>
+                  <a:schemeClr val="tx1"/>
+                </a:solidFill>
+                <a:latin typeface="+mn-lt"/>
+                <a:ea typeface="+mn-ea"/>
+                <a:cs typeface="+mn-cs"/>
+              </a:defRPr>
+            </a:lvl4pPr>
+            <a:lvl5pPr marL="2057400" indent="-228600" algn="l" defTabSz="914400" rtl="0" eaLnBrk="1" latinLnBrk="0" hangingPunct="1">
+              <a:lnSpc>
+                <a:spcPct val="90000"/>
+              </a:lnSpc>
+              <a:spcBef>
+                <a:spcPts val="500"/>
+              </a:spcBef>
+              <a:buFont typeface="Arial" panose="020B0604020202020204" pitchFamily="34" charset="0"/>
+              <a:buChar char="•"/>
+              <a:defRPr sz="1800" kern="1200">
+                <a:solidFill>
+                  <a:schemeClr val="tx1"/>
+                </a:solidFill>
+                <a:latin typeface="+mn-lt"/>
+                <a:ea typeface="+mn-ea"/>
+                <a:cs typeface="+mn-cs"/>
+              </a:defRPr>
+            </a:lvl5pPr>
+            <a:lvl6pPr marL="2514600" indent="-228600" algn="l" defTabSz="914400" rtl="0" eaLnBrk="1" latinLnBrk="0" hangingPunct="1">
+              <a:lnSpc>
+                <a:spcPct val="90000"/>
+              </a:lnSpc>
+              <a:spcBef>
+                <a:spcPts val="500"/>
+              </a:spcBef>
+              <a:buFont typeface="Arial" panose="020B0604020202020204" pitchFamily="34" charset="0"/>
+              <a:buChar char="•"/>
+              <a:defRPr sz="1800" kern="1200">
+                <a:solidFill>
+                  <a:schemeClr val="tx1"/>
+                </a:solidFill>
+                <a:latin typeface="+mn-lt"/>
+                <a:ea typeface="+mn-ea"/>
+                <a:cs typeface="+mn-cs"/>
+              </a:defRPr>
+            </a:lvl6pPr>
+            <a:lvl7pPr marL="2971800" indent="-228600" algn="l" defTabSz="914400" rtl="0" eaLnBrk="1" latinLnBrk="0" hangingPunct="1">
+              <a:lnSpc>
+                <a:spcPct val="90000"/>
+              </a:lnSpc>
+              <a:spcBef>
+                <a:spcPts val="500"/>
+              </a:spcBef>
+              <a:buFont typeface="Arial" panose="020B0604020202020204" pitchFamily="34" charset="0"/>
+              <a:buChar char="•"/>
+              <a:defRPr sz="1800" kern="1200">
+                <a:solidFill>
+                  <a:schemeClr val="tx1"/>
+                </a:solidFill>
+                <a:latin typeface="+mn-lt"/>
+                <a:ea typeface="+mn-ea"/>
+                <a:cs typeface="+mn-cs"/>
+              </a:defRPr>
+            </a:lvl7pPr>
+            <a:lvl8pPr marL="3429000" indent="-228600" algn="l" defTabSz="914400" rtl="0" eaLnBrk="1" latinLnBrk="0" hangingPunct="1">
+              <a:lnSpc>
+                <a:spcPct val="90000"/>
+              </a:lnSpc>
+              <a:spcBef>
+                <a:spcPts val="500"/>
+              </a:spcBef>
+              <a:buFont typeface="Arial" panose="020B0604020202020204" pitchFamily="34" charset="0"/>
+              <a:buChar char="•"/>
+              <a:defRPr sz="1800" kern="1200">
+                <a:solidFill>
+                  <a:schemeClr val="tx1"/>
+                </a:solidFill>
+                <a:latin typeface="+mn-lt"/>
+                <a:ea typeface="+mn-ea"/>
+                <a:cs typeface="+mn-cs"/>
+              </a:defRPr>
+            </a:lvl8pPr>
+            <a:lvl9pPr marL="3886200" indent="-228600" algn="l" defTabSz="914400" rtl="0" eaLnBrk="1" latinLnBrk="0" hangingPunct="1">
+              <a:lnSpc>
+                <a:spcPct val="90000"/>
+              </a:lnSpc>
+              <a:spcBef>
+                <a:spcPts val="500"/>
+              </a:spcBef>
+              <a:buFont typeface="Arial" panose="020B0604020202020204" pitchFamily="34" charset="0"/>
+              <a:buChar char="•"/>
+              <a:defRPr sz="1800" kern="1200">
+                <a:solidFill>
+                  <a:schemeClr val="tx1"/>
+                </a:solidFill>
+                <a:latin typeface="+mn-lt"/>
+                <a:ea typeface="+mn-ea"/>
+                <a:cs typeface="+mn-cs"/>
+              </a:defRPr>
+            </a:lvl9pPr>
+          </a:lstStyle>
+          <a:p>
+            <a:pPr marL="0" indent="0">
+              <a:buNone/>
+            </a:pPr>
+            <a:r>
+              <a:rPr lang="en-US" sz="1100" dirty="0"/>
+              <a:t>4. </a:t>
+            </a:r>
+            <a:r>
+              <a:rPr lang="en-US" sz="1100" dirty="0" smtClean="0"/>
+              <a:t>The </a:t>
+            </a:r>
+            <a:r>
+              <a:rPr lang="en-US" sz="1100" dirty="0">
+                <a:highlight>
+                  <a:srgbClr val="CCECFF"/>
+                </a:highlight>
+              </a:rPr>
+              <a:t>#ended on</a:t>
+            </a:r>
+            <a:r>
+              <a:rPr lang="en-US" sz="1100" dirty="0"/>
+              <a:t> </a:t>
+            </a:r>
+            <a:r>
+              <a:rPr lang="en-US" sz="1100" dirty="0" smtClean="0"/>
+              <a:t> date is the date the patient ended or left the specified clinical trial.</a:t>
+            </a:r>
+            <a:endParaRPr lang="en-US" sz="1100" dirty="0"/>
+          </a:p>
+        </p:txBody>
+      </p:sp>
+      <p:sp>
+        <p:nvSpPr>
+          <p:cNvPr id="15" name="Content Placeholder 2"/>
+          <p:cNvSpPr txBox="1">
+            <a:spLocks/>
+          </p:cNvSpPr>
+          <p:nvPr/>
+        </p:nvSpPr>
+        <p:spPr>
+          <a:xfrm>
+            <a:off x="2118265" y="4100815"/>
+            <a:ext cx="7433270" cy="975093"/>
+          </a:xfrm>
+          <a:prstGeom prst="rect">
+            <a:avLst/>
+          </a:prstGeom>
+        </p:spPr>
+        <p:txBody>
+          <a:bodyPr vert="horz" lIns="91440" tIns="45720" rIns="91440" bIns="45720" rtlCol="0">
+            <a:normAutofit/>
+          </a:bodyPr>
+          <a:lstStyle>
+            <a:lvl1pPr marL="228600" indent="-228600" algn="l" defTabSz="914400" rtl="0" eaLnBrk="1" latinLnBrk="0" hangingPunct="1">
+              <a:lnSpc>
+                <a:spcPct val="90000"/>
+              </a:lnSpc>
+              <a:spcBef>
+                <a:spcPts val="1000"/>
+              </a:spcBef>
+              <a:buFont typeface="Arial" panose="020B0604020202020204" pitchFamily="34" charset="0"/>
+              <a:buChar char="•"/>
+              <a:defRPr sz="2800" kern="1200">
+                <a:solidFill>
+                  <a:schemeClr val="tx1"/>
+                </a:solidFill>
+                <a:latin typeface="+mn-lt"/>
+                <a:ea typeface="+mn-ea"/>
+                <a:cs typeface="+mn-cs"/>
+              </a:defRPr>
+            </a:lvl1pPr>
+            <a:lvl2pPr marL="685800" indent="-228600" algn="l" defTabSz="914400" rtl="0" eaLnBrk="1" latinLnBrk="0" hangingPunct="1">
+              <a:lnSpc>
+                <a:spcPct val="90000"/>
+              </a:lnSpc>
+              <a:spcBef>
+                <a:spcPts val="500"/>
+              </a:spcBef>
+              <a:buFont typeface="Arial" panose="020B0604020202020204" pitchFamily="34" charset="0"/>
+              <a:buChar char="•"/>
+              <a:defRPr sz="2400" kern="1200">
+                <a:solidFill>
+                  <a:schemeClr val="tx1"/>
+                </a:solidFill>
+                <a:latin typeface="+mn-lt"/>
+                <a:ea typeface="+mn-ea"/>
+                <a:cs typeface="+mn-cs"/>
+              </a:defRPr>
+            </a:lvl2pPr>
+            <a:lvl3pPr marL="1143000" indent="-228600" algn="l" defTabSz="914400" rtl="0" eaLnBrk="1" latinLnBrk="0" hangingPunct="1">
+              <a:lnSpc>
+                <a:spcPct val="90000"/>
+              </a:lnSpc>
+              <a:spcBef>
+                <a:spcPts val="500"/>
+              </a:spcBef>
+              <a:buFont typeface="Arial" panose="020B0604020202020204" pitchFamily="34" charset="0"/>
+              <a:buChar char="•"/>
+              <a:defRPr sz="2000" kern="1200">
+                <a:solidFill>
+                  <a:schemeClr val="tx1"/>
+                </a:solidFill>
+                <a:latin typeface="+mn-lt"/>
+                <a:ea typeface="+mn-ea"/>
+                <a:cs typeface="+mn-cs"/>
+              </a:defRPr>
+            </a:lvl3pPr>
+            <a:lvl4pPr marL="1600200" indent="-228600" algn="l" defTabSz="914400" rtl="0" eaLnBrk="1" latinLnBrk="0" hangingPunct="1">
+              <a:lnSpc>
+                <a:spcPct val="90000"/>
+              </a:lnSpc>
+              <a:spcBef>
+                <a:spcPts val="500"/>
+              </a:spcBef>
+              <a:buFont typeface="Arial" panose="020B0604020202020204" pitchFamily="34" charset="0"/>
+              <a:buChar char="•"/>
+              <a:defRPr sz="1800" kern="1200">
+                <a:solidFill>
+                  <a:schemeClr val="tx1"/>
+                </a:solidFill>
+                <a:latin typeface="+mn-lt"/>
+                <a:ea typeface="+mn-ea"/>
+                <a:cs typeface="+mn-cs"/>
+              </a:defRPr>
+            </a:lvl4pPr>
+            <a:lvl5pPr marL="2057400" indent="-228600" algn="l" defTabSz="914400" rtl="0" eaLnBrk="1" latinLnBrk="0" hangingPunct="1">
+              <a:lnSpc>
+                <a:spcPct val="90000"/>
+              </a:lnSpc>
+              <a:spcBef>
+                <a:spcPts val="500"/>
+              </a:spcBef>
+              <a:buFont typeface="Arial" panose="020B0604020202020204" pitchFamily="34" charset="0"/>
+              <a:buChar char="•"/>
+              <a:defRPr sz="1800" kern="1200">
+                <a:solidFill>
+                  <a:schemeClr val="tx1"/>
+                </a:solidFill>
+                <a:latin typeface="+mn-lt"/>
+                <a:ea typeface="+mn-ea"/>
+                <a:cs typeface="+mn-cs"/>
+              </a:defRPr>
+            </a:lvl5pPr>
+            <a:lvl6pPr marL="2514600" indent="-228600" algn="l" defTabSz="914400" rtl="0" eaLnBrk="1" latinLnBrk="0" hangingPunct="1">
+              <a:lnSpc>
+                <a:spcPct val="90000"/>
+              </a:lnSpc>
+              <a:spcBef>
+                <a:spcPts val="500"/>
+              </a:spcBef>
+              <a:buFont typeface="Arial" panose="020B0604020202020204" pitchFamily="34" charset="0"/>
+              <a:buChar char="•"/>
+              <a:defRPr sz="1800" kern="1200">
+                <a:solidFill>
+                  <a:schemeClr val="tx1"/>
+                </a:solidFill>
+                <a:latin typeface="+mn-lt"/>
+                <a:ea typeface="+mn-ea"/>
+                <a:cs typeface="+mn-cs"/>
+              </a:defRPr>
+            </a:lvl6pPr>
+            <a:lvl7pPr marL="2971800" indent="-228600" algn="l" defTabSz="914400" rtl="0" eaLnBrk="1" latinLnBrk="0" hangingPunct="1">
+              <a:lnSpc>
+                <a:spcPct val="90000"/>
+              </a:lnSpc>
+              <a:spcBef>
+                <a:spcPts val="500"/>
+              </a:spcBef>
+              <a:buFont typeface="Arial" panose="020B0604020202020204" pitchFamily="34" charset="0"/>
+              <a:buChar char="•"/>
+              <a:defRPr sz="1800" kern="1200">
+                <a:solidFill>
+                  <a:schemeClr val="tx1"/>
+                </a:solidFill>
+                <a:latin typeface="+mn-lt"/>
+                <a:ea typeface="+mn-ea"/>
+                <a:cs typeface="+mn-cs"/>
+              </a:defRPr>
+            </a:lvl7pPr>
+            <a:lvl8pPr marL="3429000" indent="-228600" algn="l" defTabSz="914400" rtl="0" eaLnBrk="1" latinLnBrk="0" hangingPunct="1">
+              <a:lnSpc>
+                <a:spcPct val="90000"/>
+              </a:lnSpc>
+              <a:spcBef>
+                <a:spcPts val="500"/>
+              </a:spcBef>
+              <a:buFont typeface="Arial" panose="020B0604020202020204" pitchFamily="34" charset="0"/>
+              <a:buChar char="•"/>
+              <a:defRPr sz="1800" kern="1200">
+                <a:solidFill>
+                  <a:schemeClr val="tx1"/>
+                </a:solidFill>
+                <a:latin typeface="+mn-lt"/>
+                <a:ea typeface="+mn-ea"/>
+                <a:cs typeface="+mn-cs"/>
+              </a:defRPr>
+            </a:lvl8pPr>
+            <a:lvl9pPr marL="3886200" indent="-228600" algn="l" defTabSz="914400" rtl="0" eaLnBrk="1" latinLnBrk="0" hangingPunct="1">
+              <a:lnSpc>
+                <a:spcPct val="90000"/>
+              </a:lnSpc>
+              <a:spcBef>
+                <a:spcPts val="500"/>
+              </a:spcBef>
+              <a:buFont typeface="Arial" panose="020B0604020202020204" pitchFamily="34" charset="0"/>
+              <a:buChar char="•"/>
+              <a:defRPr sz="1800" kern="1200">
+                <a:solidFill>
+                  <a:schemeClr val="tx1"/>
+                </a:solidFill>
+                <a:latin typeface="+mn-lt"/>
+                <a:ea typeface="+mn-ea"/>
+                <a:cs typeface="+mn-cs"/>
+              </a:defRPr>
+            </a:lvl9pPr>
+          </a:lstStyle>
+          <a:p>
+            <a:pPr marL="0" indent="0">
+              <a:buNone/>
+            </a:pPr>
+            <a:r>
+              <a:rPr lang="de-DE" sz="1600" dirty="0" smtClean="0"/>
+              <a:t>The </a:t>
+            </a:r>
+            <a:r>
+              <a:rPr lang="de-DE" sz="1600" dirty="0" err="1" smtClean="0"/>
+              <a:t>patient</a:t>
+            </a:r>
+            <a:r>
+              <a:rPr lang="de-DE" sz="1600" dirty="0" smtClean="0"/>
+              <a:t> </a:t>
+            </a:r>
+            <a:r>
+              <a:rPr lang="de-DE" sz="1600" dirty="0" err="1" smtClean="0"/>
+              <a:t>is</a:t>
+            </a:r>
+            <a:r>
+              <a:rPr lang="de-DE" sz="1600" dirty="0" smtClean="0"/>
+              <a:t> </a:t>
+            </a:r>
+            <a:r>
+              <a:rPr lang="de-DE" sz="1600" dirty="0" err="1" smtClean="0"/>
+              <a:t>enrolled</a:t>
+            </a:r>
+            <a:r>
+              <a:rPr lang="de-DE" sz="1600" dirty="0" smtClean="0"/>
+              <a:t> in </a:t>
+            </a:r>
+            <a:r>
+              <a:rPr lang="en-US" sz="1600" dirty="0" smtClean="0">
+                <a:highlight>
+                  <a:srgbClr val="CCECFF"/>
+                </a:highlight>
+              </a:rPr>
+              <a:t>#clinical </a:t>
+            </a:r>
+            <a:r>
+              <a:rPr lang="en-US" sz="1600" dirty="0">
+                <a:highlight>
+                  <a:srgbClr val="CCECFF"/>
+                </a:highlight>
+              </a:rPr>
+              <a:t>trial</a:t>
+            </a:r>
+            <a:r>
+              <a:rPr lang="en-US" sz="1600" dirty="0"/>
+              <a:t> </a:t>
+            </a:r>
+            <a:r>
+              <a:rPr lang="en-US" sz="1600" dirty="0" smtClean="0">
+                <a:highlight>
+                  <a:srgbClr val="CCECFF"/>
+                </a:highlight>
+              </a:rPr>
+              <a:t>#PATINA</a:t>
+            </a:r>
+            <a:r>
+              <a:rPr lang="de-DE" sz="1600" dirty="0" smtClean="0"/>
+              <a:t> </a:t>
+            </a:r>
+            <a:r>
+              <a:rPr lang="de-DE" sz="1600" dirty="0" err="1" smtClean="0"/>
+              <a:t>and</a:t>
+            </a:r>
+            <a:r>
+              <a:rPr lang="de-DE" sz="1600" dirty="0" smtClean="0"/>
+              <a:t> </a:t>
+            </a:r>
+            <a:r>
+              <a:rPr lang="en-US" sz="1600" dirty="0" smtClean="0">
+                <a:highlight>
+                  <a:srgbClr val="CCECFF"/>
+                </a:highlight>
+              </a:rPr>
+              <a:t> </a:t>
+            </a:r>
+            <a:r>
+              <a:rPr lang="en-US" sz="1600" dirty="0">
+                <a:highlight>
+                  <a:srgbClr val="CCECFF"/>
+                </a:highlight>
+              </a:rPr>
+              <a:t>#enrolled on</a:t>
+            </a:r>
+            <a:r>
+              <a:rPr lang="de-DE" sz="1600" dirty="0" smtClean="0"/>
+              <a:t> </a:t>
+            </a:r>
+            <a:r>
+              <a:rPr lang="en-US" sz="1600" dirty="0">
+                <a:highlight>
+                  <a:srgbClr val="CCECFF"/>
+                </a:highlight>
+              </a:rPr>
+              <a:t>#</a:t>
+            </a:r>
+            <a:r>
+              <a:rPr lang="en-US" sz="1600" dirty="0" smtClean="0">
+                <a:highlight>
+                  <a:srgbClr val="CCECFF"/>
+                </a:highlight>
+              </a:rPr>
+              <a:t>01/01/2017</a:t>
+            </a:r>
+            <a:r>
+              <a:rPr lang="de-DE" sz="1600" dirty="0" smtClean="0"/>
+              <a:t>.</a:t>
+            </a:r>
+          </a:p>
+          <a:p>
+            <a:pPr marL="0" indent="0">
+              <a:buNone/>
+            </a:pPr>
+            <a:r>
+              <a:rPr lang="en-US" sz="1600" dirty="0" smtClean="0">
+                <a:highlight>
+                  <a:srgbClr val="CCECFF"/>
+                </a:highlight>
+              </a:rPr>
+              <a:t>#Clinical trial</a:t>
+            </a:r>
+            <a:r>
+              <a:rPr lang="de-DE" sz="1600" dirty="0" smtClean="0"/>
+              <a:t> </a:t>
+            </a:r>
+            <a:r>
+              <a:rPr lang="de-DE" sz="1600" dirty="0" err="1" smtClean="0"/>
+              <a:t>for</a:t>
+            </a:r>
+            <a:r>
+              <a:rPr lang="de-DE" sz="1600" dirty="0" smtClean="0"/>
+              <a:t> </a:t>
+            </a:r>
+            <a:r>
+              <a:rPr lang="de-DE" sz="1600" dirty="0" err="1" smtClean="0"/>
+              <a:t>the</a:t>
+            </a:r>
+            <a:r>
+              <a:rPr lang="de-DE" sz="1600" dirty="0" smtClean="0"/>
+              <a:t> </a:t>
+            </a:r>
+            <a:r>
+              <a:rPr lang="de-DE" sz="1600" dirty="0" err="1" smtClean="0"/>
+              <a:t>patient</a:t>
+            </a:r>
+            <a:r>
+              <a:rPr lang="de-DE" sz="1600" dirty="0" smtClean="0"/>
+              <a:t> </a:t>
+            </a:r>
+            <a:r>
+              <a:rPr lang="en-US" sz="1600" dirty="0" smtClean="0">
+                <a:highlight>
+                  <a:srgbClr val="CCECFF"/>
+                </a:highlight>
+              </a:rPr>
+              <a:t>#ended on</a:t>
+            </a:r>
+            <a:r>
+              <a:rPr lang="en-US" sz="1600" dirty="0" smtClean="0"/>
+              <a:t> </a:t>
+            </a:r>
+            <a:r>
+              <a:rPr lang="en-US" sz="1600" dirty="0" smtClean="0">
+                <a:highlight>
+                  <a:srgbClr val="CCECFF"/>
+                </a:highlight>
+              </a:rPr>
+              <a:t>#10/10/2017</a:t>
+            </a:r>
+            <a:r>
+              <a:rPr lang="en-US" sz="1600" dirty="0" smtClean="0"/>
+              <a:t> due to surgery. The </a:t>
+            </a:r>
+            <a:r>
+              <a:rPr lang="en-US" sz="1600" dirty="0" smtClean="0">
+                <a:highlight>
+                  <a:srgbClr val="CCECFF"/>
+                </a:highlight>
+              </a:rPr>
+              <a:t>#PATINA</a:t>
+            </a:r>
+            <a:r>
+              <a:rPr lang="en-US" sz="1600" dirty="0" smtClean="0"/>
+              <a:t> clinical trial was </a:t>
+            </a:r>
+            <a:r>
+              <a:rPr lang="en-US" sz="1600" dirty="0" smtClean="0">
+                <a:highlight>
+                  <a:srgbClr val="CCECFF"/>
+                </a:highlight>
+              </a:rPr>
+              <a:t>#enrolled on</a:t>
+            </a:r>
+            <a:r>
+              <a:rPr lang="en-US" sz="1600" dirty="0" smtClean="0"/>
+              <a:t> </a:t>
+            </a:r>
+            <a:r>
+              <a:rPr lang="en-US" sz="1600" dirty="0" smtClean="0">
+                <a:highlight>
+                  <a:srgbClr val="CCECFF"/>
+                </a:highlight>
+              </a:rPr>
+              <a:t>#01/01/2017</a:t>
+            </a:r>
+            <a:r>
+              <a:rPr lang="en-US" sz="1600" dirty="0" smtClean="0"/>
+              <a:t>. </a:t>
+            </a:r>
+            <a:endParaRPr lang="de-DE" sz="1600" dirty="0"/>
+          </a:p>
+        </p:txBody>
+      </p:sp>
+      <p:sp>
+        <p:nvSpPr>
+          <p:cNvPr id="16" name="Content Placeholder 2"/>
+          <p:cNvSpPr txBox="1">
+            <a:spLocks/>
+          </p:cNvSpPr>
+          <p:nvPr/>
+        </p:nvSpPr>
+        <p:spPr>
+          <a:xfrm>
+            <a:off x="3444963" y="5529013"/>
+            <a:ext cx="2049280" cy="720755"/>
+          </a:xfrm>
+          <a:prstGeom prst="rect">
+            <a:avLst/>
+          </a:prstGeom>
+        </p:spPr>
+        <p:txBody>
+          <a:bodyPr vert="horz" lIns="91440" tIns="45720" rIns="91440" bIns="45720" rtlCol="0">
+            <a:normAutofit/>
+          </a:bodyPr>
+          <a:lstStyle>
+            <a:lvl1pPr marL="228600" indent="-228600" algn="l" defTabSz="914400" rtl="0" eaLnBrk="1" latinLnBrk="0" hangingPunct="1">
+              <a:lnSpc>
+                <a:spcPct val="90000"/>
+              </a:lnSpc>
+              <a:spcBef>
+                <a:spcPts val="1000"/>
+              </a:spcBef>
+              <a:buFont typeface="Arial" panose="020B0604020202020204" pitchFamily="34" charset="0"/>
+              <a:buChar char="•"/>
+              <a:defRPr sz="2800" kern="1200">
+                <a:solidFill>
+                  <a:schemeClr val="tx1"/>
+                </a:solidFill>
+                <a:latin typeface="+mn-lt"/>
+                <a:ea typeface="+mn-ea"/>
+                <a:cs typeface="+mn-cs"/>
+              </a:defRPr>
+            </a:lvl1pPr>
+            <a:lvl2pPr marL="685800" indent="-228600" algn="l" defTabSz="914400" rtl="0" eaLnBrk="1" latinLnBrk="0" hangingPunct="1">
+              <a:lnSpc>
+                <a:spcPct val="90000"/>
+              </a:lnSpc>
+              <a:spcBef>
+                <a:spcPts val="500"/>
+              </a:spcBef>
+              <a:buFont typeface="Arial" panose="020B0604020202020204" pitchFamily="34" charset="0"/>
+              <a:buChar char="•"/>
+              <a:defRPr sz="2400" kern="1200">
+                <a:solidFill>
+                  <a:schemeClr val="tx1"/>
+                </a:solidFill>
+                <a:latin typeface="+mn-lt"/>
+                <a:ea typeface="+mn-ea"/>
+                <a:cs typeface="+mn-cs"/>
+              </a:defRPr>
+            </a:lvl2pPr>
+            <a:lvl3pPr marL="1143000" indent="-228600" algn="l" defTabSz="914400" rtl="0" eaLnBrk="1" latinLnBrk="0" hangingPunct="1">
+              <a:lnSpc>
+                <a:spcPct val="90000"/>
+              </a:lnSpc>
+              <a:spcBef>
+                <a:spcPts val="500"/>
+              </a:spcBef>
+              <a:buFont typeface="Arial" panose="020B0604020202020204" pitchFamily="34" charset="0"/>
+              <a:buChar char="•"/>
+              <a:defRPr sz="2000" kern="1200">
+                <a:solidFill>
+                  <a:schemeClr val="tx1"/>
+                </a:solidFill>
+                <a:latin typeface="+mn-lt"/>
+                <a:ea typeface="+mn-ea"/>
+                <a:cs typeface="+mn-cs"/>
+              </a:defRPr>
+            </a:lvl3pPr>
+            <a:lvl4pPr marL="1600200" indent="-228600" algn="l" defTabSz="914400" rtl="0" eaLnBrk="1" latinLnBrk="0" hangingPunct="1">
+              <a:lnSpc>
+                <a:spcPct val="90000"/>
+              </a:lnSpc>
+              <a:spcBef>
+                <a:spcPts val="500"/>
+              </a:spcBef>
+              <a:buFont typeface="Arial" panose="020B0604020202020204" pitchFamily="34" charset="0"/>
+              <a:buChar char="•"/>
+              <a:defRPr sz="1800" kern="1200">
+                <a:solidFill>
+                  <a:schemeClr val="tx1"/>
+                </a:solidFill>
+                <a:latin typeface="+mn-lt"/>
+                <a:ea typeface="+mn-ea"/>
+                <a:cs typeface="+mn-cs"/>
+              </a:defRPr>
+            </a:lvl4pPr>
+            <a:lvl5pPr marL="2057400" indent="-228600" algn="l" defTabSz="914400" rtl="0" eaLnBrk="1" latinLnBrk="0" hangingPunct="1">
+              <a:lnSpc>
+                <a:spcPct val="90000"/>
+              </a:lnSpc>
+              <a:spcBef>
+                <a:spcPts val="500"/>
+              </a:spcBef>
+              <a:buFont typeface="Arial" panose="020B0604020202020204" pitchFamily="34" charset="0"/>
+              <a:buChar char="•"/>
+              <a:defRPr sz="1800" kern="1200">
+                <a:solidFill>
+                  <a:schemeClr val="tx1"/>
+                </a:solidFill>
+                <a:latin typeface="+mn-lt"/>
+                <a:ea typeface="+mn-ea"/>
+                <a:cs typeface="+mn-cs"/>
+              </a:defRPr>
+            </a:lvl5pPr>
+            <a:lvl6pPr marL="2514600" indent="-228600" algn="l" defTabSz="914400" rtl="0" eaLnBrk="1" latinLnBrk="0" hangingPunct="1">
+              <a:lnSpc>
+                <a:spcPct val="90000"/>
+              </a:lnSpc>
+              <a:spcBef>
+                <a:spcPts val="500"/>
+              </a:spcBef>
+              <a:buFont typeface="Arial" panose="020B0604020202020204" pitchFamily="34" charset="0"/>
+              <a:buChar char="•"/>
+              <a:defRPr sz="1800" kern="1200">
+                <a:solidFill>
+                  <a:schemeClr val="tx1"/>
+                </a:solidFill>
+                <a:latin typeface="+mn-lt"/>
+                <a:ea typeface="+mn-ea"/>
+                <a:cs typeface="+mn-cs"/>
+              </a:defRPr>
+            </a:lvl6pPr>
+            <a:lvl7pPr marL="2971800" indent="-228600" algn="l" defTabSz="914400" rtl="0" eaLnBrk="1" latinLnBrk="0" hangingPunct="1">
+              <a:lnSpc>
+                <a:spcPct val="90000"/>
+              </a:lnSpc>
+              <a:spcBef>
+                <a:spcPts val="500"/>
+              </a:spcBef>
+              <a:buFont typeface="Arial" panose="020B0604020202020204" pitchFamily="34" charset="0"/>
+              <a:buChar char="•"/>
+              <a:defRPr sz="1800" kern="1200">
+                <a:solidFill>
+                  <a:schemeClr val="tx1"/>
+                </a:solidFill>
+                <a:latin typeface="+mn-lt"/>
+                <a:ea typeface="+mn-ea"/>
+                <a:cs typeface="+mn-cs"/>
+              </a:defRPr>
+            </a:lvl7pPr>
+            <a:lvl8pPr marL="3429000" indent="-228600" algn="l" defTabSz="914400" rtl="0" eaLnBrk="1" latinLnBrk="0" hangingPunct="1">
+              <a:lnSpc>
+                <a:spcPct val="90000"/>
+              </a:lnSpc>
+              <a:spcBef>
+                <a:spcPts val="500"/>
+              </a:spcBef>
+              <a:buFont typeface="Arial" panose="020B0604020202020204" pitchFamily="34" charset="0"/>
+              <a:buChar char="•"/>
+              <a:defRPr sz="1800" kern="1200">
+                <a:solidFill>
+                  <a:schemeClr val="tx1"/>
+                </a:solidFill>
+                <a:latin typeface="+mn-lt"/>
+                <a:ea typeface="+mn-ea"/>
+                <a:cs typeface="+mn-cs"/>
+              </a:defRPr>
+            </a:lvl8pPr>
+            <a:lvl9pPr marL="3886200" indent="-228600" algn="l" defTabSz="914400" rtl="0" eaLnBrk="1" latinLnBrk="0" hangingPunct="1">
+              <a:lnSpc>
+                <a:spcPct val="90000"/>
+              </a:lnSpc>
+              <a:spcBef>
+                <a:spcPts val="500"/>
+              </a:spcBef>
+              <a:buFont typeface="Arial" panose="020B0604020202020204" pitchFamily="34" charset="0"/>
+              <a:buChar char="•"/>
+              <a:defRPr sz="1800" kern="1200">
+                <a:solidFill>
+                  <a:schemeClr val="tx1"/>
+                </a:solidFill>
+                <a:latin typeface="+mn-lt"/>
+                <a:ea typeface="+mn-ea"/>
+                <a:cs typeface="+mn-cs"/>
+              </a:defRPr>
+            </a:lvl9pPr>
+          </a:lstStyle>
+          <a:p>
+            <a:pPr marL="0" indent="0">
+              <a:buNone/>
+            </a:pPr>
+            <a:r>
+              <a:rPr lang="en-US" sz="1100" dirty="0" smtClean="0"/>
+              <a:t>Trial name, </a:t>
+            </a:r>
+            <a:r>
+              <a:rPr lang="en-US" sz="1100" dirty="0">
+                <a:highlight>
+                  <a:srgbClr val="CCECFF"/>
+                </a:highlight>
+              </a:rPr>
+              <a:t>#</a:t>
+            </a:r>
+            <a:r>
+              <a:rPr lang="en-US" sz="1100" dirty="0" smtClean="0">
+                <a:highlight>
+                  <a:srgbClr val="CCECFF"/>
+                </a:highlight>
+              </a:rPr>
+              <a:t>enrolled on</a:t>
+            </a:r>
+            <a:r>
+              <a:rPr lang="en-US" sz="1100" dirty="0" smtClean="0"/>
+              <a:t>, and </a:t>
+            </a:r>
+            <a:r>
+              <a:rPr lang="en-US" sz="1100" dirty="0">
+                <a:highlight>
+                  <a:srgbClr val="CCECFF"/>
+                </a:highlight>
+              </a:rPr>
+              <a:t>#ended on</a:t>
+            </a:r>
+            <a:r>
+              <a:rPr lang="en-US" sz="1100" dirty="0" smtClean="0"/>
+              <a:t> dates can be specified in any order.   </a:t>
+            </a:r>
+            <a:endParaRPr lang="en-US" sz="1100" dirty="0"/>
+          </a:p>
+        </p:txBody>
+      </p:sp>
+      <p:cxnSp>
+        <p:nvCxnSpPr>
+          <p:cNvPr id="24" name="Straight Connector 23"/>
+          <p:cNvCxnSpPr/>
+          <p:nvPr/>
+        </p:nvCxnSpPr>
+        <p:spPr>
+          <a:xfrm flipH="1" flipV="1">
+            <a:off x="4853469" y="1277657"/>
+            <a:ext cx="2738" cy="350040"/>
+          </a:xfrm>
+          <a:prstGeom prst="line">
+            <a:avLst/>
+          </a:prstGeom>
+          <a:ln>
+            <a:solidFill>
+              <a:schemeClr val="tx1"/>
+            </a:solidFill>
+          </a:ln>
+        </p:spPr>
+        <p:style>
+          <a:lnRef idx="1">
+            <a:schemeClr val="accent1"/>
+          </a:lnRef>
+          <a:fillRef idx="0">
+            <a:schemeClr val="accent1"/>
+          </a:fillRef>
+          <a:effectRef idx="0">
+            <a:schemeClr val="accent1"/>
+          </a:effectRef>
+          <a:fontRef idx="minor">
+            <a:schemeClr val="tx1"/>
+          </a:fontRef>
+        </p:style>
+      </p:cxnSp>
+      <p:cxnSp>
+        <p:nvCxnSpPr>
+          <p:cNvPr id="27" name="Straight Connector 26"/>
+          <p:cNvCxnSpPr/>
+          <p:nvPr/>
+        </p:nvCxnSpPr>
+        <p:spPr>
+          <a:xfrm flipH="1" flipV="1">
+            <a:off x="6198378" y="1294405"/>
+            <a:ext cx="2738" cy="350040"/>
+          </a:xfrm>
+          <a:prstGeom prst="line">
+            <a:avLst/>
+          </a:prstGeom>
+          <a:ln>
+            <a:solidFill>
+              <a:schemeClr val="bg1">
+                <a:lumMod val="50000"/>
+              </a:schemeClr>
+            </a:solidFill>
+          </a:ln>
+        </p:spPr>
+        <p:style>
+          <a:lnRef idx="1">
+            <a:schemeClr val="accent1"/>
+          </a:lnRef>
+          <a:fillRef idx="0">
+            <a:schemeClr val="accent1"/>
+          </a:fillRef>
+          <a:effectRef idx="0">
+            <a:schemeClr val="accent1"/>
+          </a:effectRef>
+          <a:fontRef idx="minor">
+            <a:schemeClr val="tx1"/>
+          </a:fontRef>
+        </p:style>
+      </p:cxnSp>
+      <p:cxnSp>
+        <p:nvCxnSpPr>
+          <p:cNvPr id="28" name="Straight Connector 27"/>
+          <p:cNvCxnSpPr/>
+          <p:nvPr/>
+        </p:nvCxnSpPr>
+        <p:spPr>
+          <a:xfrm flipH="1" flipV="1">
+            <a:off x="9227903" y="1294401"/>
+            <a:ext cx="2738" cy="350040"/>
+          </a:xfrm>
+          <a:prstGeom prst="line">
+            <a:avLst/>
+          </a:prstGeom>
+          <a:ln>
+            <a:solidFill>
+              <a:schemeClr val="tx1"/>
+            </a:solidFill>
+          </a:ln>
+        </p:spPr>
+        <p:style>
+          <a:lnRef idx="1">
+            <a:schemeClr val="accent1"/>
+          </a:lnRef>
+          <a:fillRef idx="0">
+            <a:schemeClr val="accent1"/>
+          </a:fillRef>
+          <a:effectRef idx="0">
+            <a:schemeClr val="accent1"/>
+          </a:effectRef>
+          <a:fontRef idx="minor">
+            <a:schemeClr val="tx1"/>
+          </a:fontRef>
+        </p:style>
+      </p:cxnSp>
+      <p:cxnSp>
+        <p:nvCxnSpPr>
+          <p:cNvPr id="29" name="Straight Connector 28"/>
+          <p:cNvCxnSpPr/>
+          <p:nvPr/>
+        </p:nvCxnSpPr>
+        <p:spPr>
+          <a:xfrm flipH="1" flipV="1">
+            <a:off x="3440236" y="1308247"/>
+            <a:ext cx="2738" cy="350040"/>
+          </a:xfrm>
+          <a:prstGeom prst="line">
+            <a:avLst/>
+          </a:prstGeom>
+          <a:ln>
+            <a:solidFill>
+              <a:schemeClr val="tx1"/>
+            </a:solidFill>
+          </a:ln>
+        </p:spPr>
+        <p:style>
+          <a:lnRef idx="1">
+            <a:schemeClr val="accent1"/>
+          </a:lnRef>
+          <a:fillRef idx="0">
+            <a:schemeClr val="accent1"/>
+          </a:fillRef>
+          <a:effectRef idx="0">
+            <a:schemeClr val="accent1"/>
+          </a:effectRef>
+          <a:fontRef idx="minor">
+            <a:schemeClr val="tx1"/>
+          </a:fontRef>
+        </p:style>
+      </p:cxnSp>
+      <p:cxnSp>
+        <p:nvCxnSpPr>
+          <p:cNvPr id="30" name="Straight Connector 29"/>
+          <p:cNvCxnSpPr/>
+          <p:nvPr/>
+        </p:nvCxnSpPr>
+        <p:spPr>
+          <a:xfrm flipH="1" flipV="1">
+            <a:off x="2285925" y="4920129"/>
+            <a:ext cx="1369" cy="465593"/>
+          </a:xfrm>
+          <a:prstGeom prst="line">
+            <a:avLst/>
+          </a:prstGeom>
+          <a:ln>
+            <a:solidFill>
+              <a:schemeClr val="tx1"/>
+            </a:solidFill>
+          </a:ln>
+        </p:spPr>
+        <p:style>
+          <a:lnRef idx="1">
+            <a:schemeClr val="accent1"/>
+          </a:lnRef>
+          <a:fillRef idx="0">
+            <a:schemeClr val="accent1"/>
+          </a:fillRef>
+          <a:effectRef idx="0">
+            <a:schemeClr val="accent1"/>
+          </a:effectRef>
+          <a:fontRef idx="minor">
+            <a:schemeClr val="tx1"/>
+          </a:fontRef>
+        </p:style>
+      </p:cxnSp>
+      <p:cxnSp>
+        <p:nvCxnSpPr>
+          <p:cNvPr id="51" name="Straight Connector 50"/>
+          <p:cNvCxnSpPr/>
+          <p:nvPr/>
+        </p:nvCxnSpPr>
+        <p:spPr>
+          <a:xfrm flipH="1" flipV="1">
+            <a:off x="3563239" y="4993801"/>
+            <a:ext cx="1369" cy="465593"/>
+          </a:xfrm>
+          <a:prstGeom prst="line">
+            <a:avLst/>
+          </a:prstGeom>
+          <a:ln>
+            <a:solidFill>
+              <a:schemeClr val="tx1"/>
+            </a:solidFill>
+          </a:ln>
+        </p:spPr>
+        <p:style>
+          <a:lnRef idx="1">
+            <a:schemeClr val="accent1"/>
+          </a:lnRef>
+          <a:fillRef idx="0">
+            <a:schemeClr val="accent1"/>
+          </a:fillRef>
+          <a:effectRef idx="0">
+            <a:schemeClr val="accent1"/>
+          </a:effectRef>
+          <a:fontRef idx="minor">
+            <a:schemeClr val="tx1"/>
+          </a:fontRef>
+        </p:style>
+      </p:cxnSp>
+      <p:cxnSp>
+        <p:nvCxnSpPr>
+          <p:cNvPr id="21" name="Straight Connector 20"/>
+          <p:cNvCxnSpPr/>
+          <p:nvPr/>
+        </p:nvCxnSpPr>
+        <p:spPr>
+          <a:xfrm flipH="1" flipV="1">
+            <a:off x="8731559" y="4358017"/>
+            <a:ext cx="1368" cy="834663"/>
+          </a:xfrm>
+          <a:prstGeom prst="line">
+            <a:avLst/>
+          </a:prstGeom>
+          <a:ln>
+            <a:solidFill>
+              <a:schemeClr val="tx1"/>
+            </a:solidFill>
+          </a:ln>
+        </p:spPr>
+        <p:style>
+          <a:lnRef idx="1">
+            <a:schemeClr val="accent1"/>
+          </a:lnRef>
+          <a:fillRef idx="0">
+            <a:schemeClr val="accent1"/>
+          </a:fillRef>
+          <a:effectRef idx="0">
+            <a:schemeClr val="accent1"/>
+          </a:effectRef>
+          <a:fontRef idx="minor">
+            <a:schemeClr val="tx1"/>
+          </a:fontRef>
+        </p:style>
+      </p:cxnSp>
+      <p:sp>
+        <p:nvSpPr>
+          <p:cNvPr id="25" name="Content Placeholder 2"/>
+          <p:cNvSpPr txBox="1">
+            <a:spLocks/>
+          </p:cNvSpPr>
+          <p:nvPr/>
+        </p:nvSpPr>
+        <p:spPr>
+          <a:xfrm>
+            <a:off x="8526895" y="5401367"/>
+            <a:ext cx="2049280" cy="720755"/>
+          </a:xfrm>
+          <a:prstGeom prst="rect">
+            <a:avLst/>
+          </a:prstGeom>
+        </p:spPr>
+        <p:txBody>
+          <a:bodyPr vert="horz" lIns="91440" tIns="45720" rIns="91440" bIns="45720" rtlCol="0">
+            <a:noAutofit/>
+          </a:bodyPr>
+          <a:lstStyle>
+            <a:lvl1pPr marL="228600" indent="-228600" algn="l" defTabSz="914400" rtl="0" eaLnBrk="1" latinLnBrk="0" hangingPunct="1">
+              <a:lnSpc>
+                <a:spcPct val="90000"/>
+              </a:lnSpc>
+              <a:spcBef>
+                <a:spcPts val="1000"/>
+              </a:spcBef>
+              <a:buFont typeface="Arial" panose="020B0604020202020204" pitchFamily="34" charset="0"/>
+              <a:buChar char="•"/>
+              <a:defRPr sz="2800" kern="1200">
+                <a:solidFill>
+                  <a:schemeClr val="tx1"/>
+                </a:solidFill>
+                <a:latin typeface="+mn-lt"/>
+                <a:ea typeface="+mn-ea"/>
+                <a:cs typeface="+mn-cs"/>
+              </a:defRPr>
+            </a:lvl1pPr>
+            <a:lvl2pPr marL="685800" indent="-228600" algn="l" defTabSz="914400" rtl="0" eaLnBrk="1" latinLnBrk="0" hangingPunct="1">
+              <a:lnSpc>
+                <a:spcPct val="90000"/>
+              </a:lnSpc>
+              <a:spcBef>
+                <a:spcPts val="500"/>
+              </a:spcBef>
+              <a:buFont typeface="Arial" panose="020B0604020202020204" pitchFamily="34" charset="0"/>
+              <a:buChar char="•"/>
+              <a:defRPr sz="2400" kern="1200">
+                <a:solidFill>
+                  <a:schemeClr val="tx1"/>
+                </a:solidFill>
+                <a:latin typeface="+mn-lt"/>
+                <a:ea typeface="+mn-ea"/>
+                <a:cs typeface="+mn-cs"/>
+              </a:defRPr>
+            </a:lvl2pPr>
+            <a:lvl3pPr marL="1143000" indent="-228600" algn="l" defTabSz="914400" rtl="0" eaLnBrk="1" latinLnBrk="0" hangingPunct="1">
+              <a:lnSpc>
+                <a:spcPct val="90000"/>
+              </a:lnSpc>
+              <a:spcBef>
+                <a:spcPts val="500"/>
+              </a:spcBef>
+              <a:buFont typeface="Arial" panose="020B0604020202020204" pitchFamily="34" charset="0"/>
+              <a:buChar char="•"/>
+              <a:defRPr sz="2000" kern="1200">
+                <a:solidFill>
+                  <a:schemeClr val="tx1"/>
+                </a:solidFill>
+                <a:latin typeface="+mn-lt"/>
+                <a:ea typeface="+mn-ea"/>
+                <a:cs typeface="+mn-cs"/>
+              </a:defRPr>
+            </a:lvl3pPr>
+            <a:lvl4pPr marL="1600200" indent="-228600" algn="l" defTabSz="914400" rtl="0" eaLnBrk="1" latinLnBrk="0" hangingPunct="1">
+              <a:lnSpc>
+                <a:spcPct val="90000"/>
+              </a:lnSpc>
+              <a:spcBef>
+                <a:spcPts val="500"/>
+              </a:spcBef>
+              <a:buFont typeface="Arial" panose="020B0604020202020204" pitchFamily="34" charset="0"/>
+              <a:buChar char="•"/>
+              <a:defRPr sz="1800" kern="1200">
+                <a:solidFill>
+                  <a:schemeClr val="tx1"/>
+                </a:solidFill>
+                <a:latin typeface="+mn-lt"/>
+                <a:ea typeface="+mn-ea"/>
+                <a:cs typeface="+mn-cs"/>
+              </a:defRPr>
+            </a:lvl4pPr>
+            <a:lvl5pPr marL="2057400" indent="-228600" algn="l" defTabSz="914400" rtl="0" eaLnBrk="1" latinLnBrk="0" hangingPunct="1">
+              <a:lnSpc>
+                <a:spcPct val="90000"/>
+              </a:lnSpc>
+              <a:spcBef>
+                <a:spcPts val="500"/>
+              </a:spcBef>
+              <a:buFont typeface="Arial" panose="020B0604020202020204" pitchFamily="34" charset="0"/>
+              <a:buChar char="•"/>
+              <a:defRPr sz="1800" kern="1200">
+                <a:solidFill>
+                  <a:schemeClr val="tx1"/>
+                </a:solidFill>
+                <a:latin typeface="+mn-lt"/>
+                <a:ea typeface="+mn-ea"/>
+                <a:cs typeface="+mn-cs"/>
+              </a:defRPr>
+            </a:lvl5pPr>
+            <a:lvl6pPr marL="2514600" indent="-228600" algn="l" defTabSz="914400" rtl="0" eaLnBrk="1" latinLnBrk="0" hangingPunct="1">
+              <a:lnSpc>
+                <a:spcPct val="90000"/>
+              </a:lnSpc>
+              <a:spcBef>
+                <a:spcPts val="500"/>
+              </a:spcBef>
+              <a:buFont typeface="Arial" panose="020B0604020202020204" pitchFamily="34" charset="0"/>
+              <a:buChar char="•"/>
+              <a:defRPr sz="1800" kern="1200">
+                <a:solidFill>
+                  <a:schemeClr val="tx1"/>
+                </a:solidFill>
+                <a:latin typeface="+mn-lt"/>
+                <a:ea typeface="+mn-ea"/>
+                <a:cs typeface="+mn-cs"/>
+              </a:defRPr>
+            </a:lvl6pPr>
+            <a:lvl7pPr marL="2971800" indent="-228600" algn="l" defTabSz="914400" rtl="0" eaLnBrk="1" latinLnBrk="0" hangingPunct="1">
+              <a:lnSpc>
+                <a:spcPct val="90000"/>
+              </a:lnSpc>
+              <a:spcBef>
+                <a:spcPts val="500"/>
+              </a:spcBef>
+              <a:buFont typeface="Arial" panose="020B0604020202020204" pitchFamily="34" charset="0"/>
+              <a:buChar char="•"/>
+              <a:defRPr sz="1800" kern="1200">
+                <a:solidFill>
+                  <a:schemeClr val="tx1"/>
+                </a:solidFill>
+                <a:latin typeface="+mn-lt"/>
+                <a:ea typeface="+mn-ea"/>
+                <a:cs typeface="+mn-cs"/>
+              </a:defRPr>
+            </a:lvl7pPr>
+            <a:lvl8pPr marL="3429000" indent="-228600" algn="l" defTabSz="914400" rtl="0" eaLnBrk="1" latinLnBrk="0" hangingPunct="1">
+              <a:lnSpc>
+                <a:spcPct val="90000"/>
+              </a:lnSpc>
+              <a:spcBef>
+                <a:spcPts val="500"/>
+              </a:spcBef>
+              <a:buFont typeface="Arial" panose="020B0604020202020204" pitchFamily="34" charset="0"/>
+              <a:buChar char="•"/>
+              <a:defRPr sz="1800" kern="1200">
+                <a:solidFill>
+                  <a:schemeClr val="tx1"/>
+                </a:solidFill>
+                <a:latin typeface="+mn-lt"/>
+                <a:ea typeface="+mn-ea"/>
+                <a:cs typeface="+mn-cs"/>
+              </a:defRPr>
+            </a:lvl8pPr>
+            <a:lvl9pPr marL="3886200" indent="-228600" algn="l" defTabSz="914400" rtl="0" eaLnBrk="1" latinLnBrk="0" hangingPunct="1">
+              <a:lnSpc>
+                <a:spcPct val="90000"/>
+              </a:lnSpc>
+              <a:spcBef>
+                <a:spcPts val="500"/>
+              </a:spcBef>
+              <a:buFont typeface="Arial" panose="020B0604020202020204" pitchFamily="34" charset="0"/>
+              <a:buChar char="•"/>
+              <a:defRPr sz="1800" kern="1200">
+                <a:solidFill>
+                  <a:schemeClr val="tx1"/>
+                </a:solidFill>
+                <a:latin typeface="+mn-lt"/>
+                <a:ea typeface="+mn-ea"/>
+                <a:cs typeface="+mn-cs"/>
+              </a:defRPr>
+            </a:lvl9pPr>
+          </a:lstStyle>
+          <a:p>
+            <a:pPr marL="0" indent="0">
+              <a:buNone/>
+            </a:pPr>
+            <a:r>
+              <a:rPr lang="en-US" sz="1100" dirty="0" smtClean="0"/>
+              <a:t>The </a:t>
+            </a:r>
+            <a:r>
+              <a:rPr lang="en-US" sz="1100" dirty="0">
+                <a:highlight>
+                  <a:srgbClr val="CCECFF"/>
+                </a:highlight>
+              </a:rPr>
+              <a:t>#ended </a:t>
+            </a:r>
+            <a:r>
+              <a:rPr lang="en-US" sz="1100" dirty="0" smtClean="0">
+                <a:highlight>
+                  <a:srgbClr val="CCECFF"/>
+                </a:highlight>
+              </a:rPr>
+              <a:t>on</a:t>
+            </a:r>
+            <a:r>
+              <a:rPr lang="en-US" sz="1100" dirty="0" smtClean="0"/>
+              <a:t> date does not need to be specified if a patient is still enrolled in the clinical trial.</a:t>
+            </a:r>
+            <a:endParaRPr lang="en-US" sz="1100" dirty="0"/>
+          </a:p>
+        </p:txBody>
+      </p:sp>
+    </p:spTree>
+    <p:extLst>
+      <p:ext uri="{BB962C8B-B14F-4D97-AF65-F5344CB8AC3E}">
+        <p14:creationId xmlns:p14="http://schemas.microsoft.com/office/powerpoint/2010/main" val="979414480"/>
       </p:ext>
     </p:extLst>
   </p:cSld>

</xml_diff>

<commit_message>
Update clinical trial cheat sheets
</commit_message>
<xml_diff>
--- a/docs/Structured Phrase Format Descriptions.pptx
+++ b/docs/Structured Phrase Format Descriptions.pptx
@@ -206,7 +206,7 @@
           <a:p>
             <a:fld id="{21E832DA-B4D8-4D11-8E14-97F9DC272DA8}" type="datetimeFigureOut">
               <a:rPr lang="en-US" smtClean="0"/>
-              <a:t>10/11/2017</a:t>
+              <a:t>10/17/17</a:t>
             </a:fld>
             <a:endParaRPr lang="en-US"/>
           </a:p>
@@ -1022,7 +1022,7 @@
           <a:p>
             <a:fld id="{0EB9FD00-C173-4304-AF07-4E0E5F6E2284}" type="datetimeFigureOut">
               <a:rPr lang="en-US" smtClean="0"/>
-              <a:t>10/11/2017</a:t>
+              <a:t>10/17/17</a:t>
             </a:fld>
             <a:endParaRPr lang="en-US"/>
           </a:p>
@@ -1190,7 +1190,7 @@
           <a:p>
             <a:fld id="{0EB9FD00-C173-4304-AF07-4E0E5F6E2284}" type="datetimeFigureOut">
               <a:rPr lang="en-US" smtClean="0"/>
-              <a:t>10/11/2017</a:t>
+              <a:t>10/17/17</a:t>
             </a:fld>
             <a:endParaRPr lang="en-US"/>
           </a:p>
@@ -1368,7 +1368,7 @@
           <a:p>
             <a:fld id="{0EB9FD00-C173-4304-AF07-4E0E5F6E2284}" type="datetimeFigureOut">
               <a:rPr lang="en-US" smtClean="0"/>
-              <a:t>10/11/2017</a:t>
+              <a:t>10/17/17</a:t>
             </a:fld>
             <a:endParaRPr lang="en-US"/>
           </a:p>
@@ -1536,7 +1536,7 @@
           <a:p>
             <a:fld id="{0EB9FD00-C173-4304-AF07-4E0E5F6E2284}" type="datetimeFigureOut">
               <a:rPr lang="en-US" smtClean="0"/>
-              <a:t>10/11/2017</a:t>
+              <a:t>10/17/17</a:t>
             </a:fld>
             <a:endParaRPr lang="en-US"/>
           </a:p>
@@ -1781,7 +1781,7 @@
           <a:p>
             <a:fld id="{0EB9FD00-C173-4304-AF07-4E0E5F6E2284}" type="datetimeFigureOut">
               <a:rPr lang="en-US" smtClean="0"/>
-              <a:t>10/11/2017</a:t>
+              <a:t>10/17/17</a:t>
             </a:fld>
             <a:endParaRPr lang="en-US"/>
           </a:p>
@@ -2010,7 +2010,7 @@
           <a:p>
             <a:fld id="{0EB9FD00-C173-4304-AF07-4E0E5F6E2284}" type="datetimeFigureOut">
               <a:rPr lang="en-US" smtClean="0"/>
-              <a:t>10/11/2017</a:t>
+              <a:t>10/17/17</a:t>
             </a:fld>
             <a:endParaRPr lang="en-US"/>
           </a:p>
@@ -2374,7 +2374,7 @@
           <a:p>
             <a:fld id="{0EB9FD00-C173-4304-AF07-4E0E5F6E2284}" type="datetimeFigureOut">
               <a:rPr lang="en-US" smtClean="0"/>
-              <a:t>10/11/2017</a:t>
+              <a:t>10/17/17</a:t>
             </a:fld>
             <a:endParaRPr lang="en-US"/>
           </a:p>
@@ -2491,7 +2491,7 @@
           <a:p>
             <a:fld id="{0EB9FD00-C173-4304-AF07-4E0E5F6E2284}" type="datetimeFigureOut">
               <a:rPr lang="en-US" smtClean="0"/>
-              <a:t>10/11/2017</a:t>
+              <a:t>10/17/17</a:t>
             </a:fld>
             <a:endParaRPr lang="en-US"/>
           </a:p>
@@ -2586,7 +2586,7 @@
           <a:p>
             <a:fld id="{0EB9FD00-C173-4304-AF07-4E0E5F6E2284}" type="datetimeFigureOut">
               <a:rPr lang="en-US" smtClean="0"/>
-              <a:t>10/11/2017</a:t>
+              <a:t>10/17/17</a:t>
             </a:fld>
             <a:endParaRPr lang="en-US"/>
           </a:p>
@@ -2861,7 +2861,7 @@
           <a:p>
             <a:fld id="{0EB9FD00-C173-4304-AF07-4E0E5F6E2284}" type="datetimeFigureOut">
               <a:rPr lang="en-US" smtClean="0"/>
-              <a:t>10/11/2017</a:t>
+              <a:t>10/17/17</a:t>
             </a:fld>
             <a:endParaRPr lang="en-US"/>
           </a:p>
@@ -3113,7 +3113,7 @@
           <a:p>
             <a:fld id="{0EB9FD00-C173-4304-AF07-4E0E5F6E2284}" type="datetimeFigureOut">
               <a:rPr lang="en-US" smtClean="0"/>
-              <a:t>10/11/2017</a:t>
+              <a:t>10/17/17</a:t>
             </a:fld>
             <a:endParaRPr lang="en-US"/>
           </a:p>
@@ -3324,7 +3324,7 @@
           <a:p>
             <a:fld id="{0EB9FD00-C173-4304-AF07-4E0E5F6E2284}" type="datetimeFigureOut">
               <a:rPr lang="en-US" smtClean="0"/>
-              <a:t>10/11/2017</a:t>
+              <a:t>10/17/17</a:t>
             </a:fld>
             <a:endParaRPr lang="en-US"/>
           </a:p>
@@ -5710,6 +5710,10 @@
             <a:br>
               <a:rPr lang="en-US" sz="1100" dirty="0"/>
             </a:br>
+            <a:r>
+              <a:rPr lang="en-US" sz="1100" dirty="0"/>
+              <a:t/>
+            </a:r>
             <a:br>
               <a:rPr lang="en-US" sz="1100" dirty="0"/>
             </a:br>
@@ -8840,6 +8844,10 @@
             <a:br>
               <a:rPr lang="en-US" sz="1100" dirty="0"/>
             </a:br>
+            <a:r>
+              <a:rPr lang="en-US" sz="1100" dirty="0"/>
+              <a:t/>
+            </a:r>
             <a:br>
               <a:rPr lang="en-US" sz="1100" dirty="0"/>
             </a:br>
@@ -11870,6 +11878,14 @@
             <a:br>
               <a:rPr lang="en-US" sz="1100" dirty="0"/>
             </a:br>
+            <a:r>
+              <a:rPr lang="en-US" sz="1100" dirty="0">
+                <a:highlight>
+                  <a:srgbClr val="CCECFF"/>
+                </a:highlight>
+              </a:rPr>
+              <a:t/>
+            </a:r>
             <a:br>
               <a:rPr lang="en-US" sz="1100" dirty="0">
                 <a:highlight>
@@ -13467,7 +13483,7 @@
         </p:spPr>
         <p:txBody>
           <a:bodyPr vert="horz" lIns="91440" tIns="45720" rIns="91440" bIns="45720" rtlCol="0">
-            <a:normAutofit fontScale="92500"/>
+            <a:normAutofit/>
           </a:bodyPr>
           <a:lstStyle>
             <a:lvl1pPr marL="228600" indent="-228600" algn="l" defTabSz="914400" rtl="0" eaLnBrk="1" latinLnBrk="0" hangingPunct="1">
@@ -13683,240 +13699,25 @@
                   <a:srgbClr val="CCECFF"/>
                 </a:highlight>
               </a:rPr>
-              <a:t>#01/01/2017</a:t>
-            </a:r>
-            <a:r>
-              <a:rPr lang="en-US" sz="2000" dirty="0"/>
-              <a:t> and </a:t>
-            </a:r>
-            <a:r>
-              <a:rPr lang="en-US" sz="2000" dirty="0">
+              <a:t>#</a:t>
+            </a:r>
+            <a:r>
+              <a:rPr lang="en-US" sz="2000" dirty="0" smtClean="0">
                 <a:highlight>
                   <a:srgbClr val="CCECFF"/>
                 </a:highlight>
               </a:rPr>
-              <a:t>#ended on</a:t>
-            </a:r>
-            <a:r>
-              <a:rPr lang="en-US" sz="2000" dirty="0"/>
-              <a:t> </a:t>
-            </a:r>
-            <a:r>
-              <a:rPr lang="en-US" sz="2000" dirty="0">
-                <a:highlight>
-                  <a:srgbClr val="CCECFF"/>
-                </a:highlight>
-              </a:rPr>
-              <a:t>#10/10/2017</a:t>
-            </a:r>
-          </a:p>
-        </p:txBody>
-      </p:sp>
-      <p:sp>
-        <p:nvSpPr>
-          <p:cNvPr id="7" name="Content Placeholder 2"/>
-          <p:cNvSpPr txBox="1">
-            <a:spLocks/>
-          </p:cNvSpPr>
-          <p:nvPr/>
-        </p:nvSpPr>
-        <p:spPr>
-          <a:xfrm>
-            <a:off x="2166487" y="5401367"/>
-            <a:ext cx="1444974" cy="787061"/>
-          </a:xfrm>
-          <a:prstGeom prst="rect">
-            <a:avLst/>
-          </a:prstGeom>
-        </p:spPr>
-        <p:txBody>
-          <a:bodyPr vert="horz" lIns="91440" tIns="45720" rIns="91440" bIns="45720" rtlCol="0">
-            <a:normAutofit/>
-          </a:bodyPr>
-          <a:lstStyle>
-            <a:lvl1pPr marL="228600" indent="-228600" algn="l" defTabSz="914400" rtl="0" eaLnBrk="1" latinLnBrk="0" hangingPunct="1">
-              <a:lnSpc>
-                <a:spcPct val="90000"/>
-              </a:lnSpc>
-              <a:spcBef>
-                <a:spcPts val="1000"/>
-              </a:spcBef>
-              <a:buFont typeface="Arial" panose="020B0604020202020204" pitchFamily="34" charset="0"/>
-              <a:buChar char="•"/>
-              <a:defRPr sz="2800" kern="1200">
-                <a:solidFill>
-                  <a:schemeClr val="tx1"/>
-                </a:solidFill>
-                <a:latin typeface="+mn-lt"/>
-                <a:ea typeface="+mn-ea"/>
-                <a:cs typeface="+mn-cs"/>
-              </a:defRPr>
-            </a:lvl1pPr>
-            <a:lvl2pPr marL="685800" indent="-228600" algn="l" defTabSz="914400" rtl="0" eaLnBrk="1" latinLnBrk="0" hangingPunct="1">
-              <a:lnSpc>
-                <a:spcPct val="90000"/>
-              </a:lnSpc>
-              <a:spcBef>
-                <a:spcPts val="500"/>
-              </a:spcBef>
-              <a:buFont typeface="Arial" panose="020B0604020202020204" pitchFamily="34" charset="0"/>
-              <a:buChar char="•"/>
-              <a:defRPr sz="2400" kern="1200">
-                <a:solidFill>
-                  <a:schemeClr val="tx1"/>
-                </a:solidFill>
-                <a:latin typeface="+mn-lt"/>
-                <a:ea typeface="+mn-ea"/>
-                <a:cs typeface="+mn-cs"/>
-              </a:defRPr>
-            </a:lvl2pPr>
-            <a:lvl3pPr marL="1143000" indent="-228600" algn="l" defTabSz="914400" rtl="0" eaLnBrk="1" latinLnBrk="0" hangingPunct="1">
-              <a:lnSpc>
-                <a:spcPct val="90000"/>
-              </a:lnSpc>
-              <a:spcBef>
-                <a:spcPts val="500"/>
-              </a:spcBef>
-              <a:buFont typeface="Arial" panose="020B0604020202020204" pitchFamily="34" charset="0"/>
-              <a:buChar char="•"/>
-              <a:defRPr sz="2000" kern="1200">
-                <a:solidFill>
-                  <a:schemeClr val="tx1"/>
-                </a:solidFill>
-                <a:latin typeface="+mn-lt"/>
-                <a:ea typeface="+mn-ea"/>
-                <a:cs typeface="+mn-cs"/>
-              </a:defRPr>
-            </a:lvl3pPr>
-            <a:lvl4pPr marL="1600200" indent="-228600" algn="l" defTabSz="914400" rtl="0" eaLnBrk="1" latinLnBrk="0" hangingPunct="1">
-              <a:lnSpc>
-                <a:spcPct val="90000"/>
-              </a:lnSpc>
-              <a:spcBef>
-                <a:spcPts val="500"/>
-              </a:spcBef>
-              <a:buFont typeface="Arial" panose="020B0604020202020204" pitchFamily="34" charset="0"/>
-              <a:buChar char="•"/>
-              <a:defRPr sz="1800" kern="1200">
-                <a:solidFill>
-                  <a:schemeClr val="tx1"/>
-                </a:solidFill>
-                <a:latin typeface="+mn-lt"/>
-                <a:ea typeface="+mn-ea"/>
-                <a:cs typeface="+mn-cs"/>
-              </a:defRPr>
-            </a:lvl4pPr>
-            <a:lvl5pPr marL="2057400" indent="-228600" algn="l" defTabSz="914400" rtl="0" eaLnBrk="1" latinLnBrk="0" hangingPunct="1">
-              <a:lnSpc>
-                <a:spcPct val="90000"/>
-              </a:lnSpc>
-              <a:spcBef>
-                <a:spcPts val="500"/>
-              </a:spcBef>
-              <a:buFont typeface="Arial" panose="020B0604020202020204" pitchFamily="34" charset="0"/>
-              <a:buChar char="•"/>
-              <a:defRPr sz="1800" kern="1200">
-                <a:solidFill>
-                  <a:schemeClr val="tx1"/>
-                </a:solidFill>
-                <a:latin typeface="+mn-lt"/>
-                <a:ea typeface="+mn-ea"/>
-                <a:cs typeface="+mn-cs"/>
-              </a:defRPr>
-            </a:lvl5pPr>
-            <a:lvl6pPr marL="2514600" indent="-228600" algn="l" defTabSz="914400" rtl="0" eaLnBrk="1" latinLnBrk="0" hangingPunct="1">
-              <a:lnSpc>
-                <a:spcPct val="90000"/>
-              </a:lnSpc>
-              <a:spcBef>
-                <a:spcPts val="500"/>
-              </a:spcBef>
-              <a:buFont typeface="Arial" panose="020B0604020202020204" pitchFamily="34" charset="0"/>
-              <a:buChar char="•"/>
-              <a:defRPr sz="1800" kern="1200">
-                <a:solidFill>
-                  <a:schemeClr val="tx1"/>
-                </a:solidFill>
-                <a:latin typeface="+mn-lt"/>
-                <a:ea typeface="+mn-ea"/>
-                <a:cs typeface="+mn-cs"/>
-              </a:defRPr>
-            </a:lvl6pPr>
-            <a:lvl7pPr marL="2971800" indent="-228600" algn="l" defTabSz="914400" rtl="0" eaLnBrk="1" latinLnBrk="0" hangingPunct="1">
-              <a:lnSpc>
-                <a:spcPct val="90000"/>
-              </a:lnSpc>
-              <a:spcBef>
-                <a:spcPts val="500"/>
-              </a:spcBef>
-              <a:buFont typeface="Arial" panose="020B0604020202020204" pitchFamily="34" charset="0"/>
-              <a:buChar char="•"/>
-              <a:defRPr sz="1800" kern="1200">
-                <a:solidFill>
-                  <a:schemeClr val="tx1"/>
-                </a:solidFill>
-                <a:latin typeface="+mn-lt"/>
-                <a:ea typeface="+mn-ea"/>
-                <a:cs typeface="+mn-cs"/>
-              </a:defRPr>
-            </a:lvl7pPr>
-            <a:lvl8pPr marL="3429000" indent="-228600" algn="l" defTabSz="914400" rtl="0" eaLnBrk="1" latinLnBrk="0" hangingPunct="1">
-              <a:lnSpc>
-                <a:spcPct val="90000"/>
-              </a:lnSpc>
-              <a:spcBef>
-                <a:spcPts val="500"/>
-              </a:spcBef>
-              <a:buFont typeface="Arial" panose="020B0604020202020204" pitchFamily="34" charset="0"/>
-              <a:buChar char="•"/>
-              <a:defRPr sz="1800" kern="1200">
-                <a:solidFill>
-                  <a:schemeClr val="tx1"/>
-                </a:solidFill>
-                <a:latin typeface="+mn-lt"/>
-                <a:ea typeface="+mn-ea"/>
-                <a:cs typeface="+mn-cs"/>
-              </a:defRPr>
-            </a:lvl8pPr>
-            <a:lvl9pPr marL="3886200" indent="-228600" algn="l" defTabSz="914400" rtl="0" eaLnBrk="1" latinLnBrk="0" hangingPunct="1">
-              <a:lnSpc>
-                <a:spcPct val="90000"/>
-              </a:lnSpc>
-              <a:spcBef>
-                <a:spcPts val="500"/>
-              </a:spcBef>
-              <a:buFont typeface="Arial" panose="020B0604020202020204" pitchFamily="34" charset="0"/>
-              <a:buChar char="•"/>
-              <a:defRPr sz="1800" kern="1200">
-                <a:solidFill>
-                  <a:schemeClr val="tx1"/>
-                </a:solidFill>
-                <a:latin typeface="+mn-lt"/>
-                <a:ea typeface="+mn-ea"/>
-                <a:cs typeface="+mn-cs"/>
-              </a:defRPr>
-            </a:lvl9pPr>
-          </a:lstStyle>
-          <a:p>
-            <a:pPr marL="0" indent="0">
-              <a:buNone/>
-            </a:pPr>
-            <a:r>
-              <a:rPr lang="en-US" sz="1100" dirty="0"/>
-              <a:t>Case of the </a:t>
-            </a:r>
-            <a:r>
-              <a:rPr lang="en-US" sz="1100" dirty="0">
-                <a:highlight>
-                  <a:srgbClr val="CCECFF"/>
-                </a:highlight>
-              </a:rPr>
-              <a:t>#clinical trial</a:t>
-            </a:r>
-            <a:r>
-              <a:rPr lang="en-US" sz="1100" dirty="0"/>
-              <a:t> tag can vary.</a:t>
-            </a:r>
+              <a:t>01/01/2017</a:t>
+            </a:r>
+            <a:r>
+              <a:rPr lang="en-US" sz="2000" dirty="0" smtClean="0"/>
+              <a:t>.</a:t>
+            </a:r>
+            <a:endParaRPr lang="en-US" sz="2000" dirty="0">
+              <a:highlight>
+                <a:srgbClr val="CCECFF"/>
+              </a:highlight>
+            </a:endParaRPr>
           </a:p>
         </p:txBody>
       </p:sp>
@@ -14544,8 +14345,25 @@
                   </a:schemeClr>
                 </a:solidFill>
               </a:rPr>
-              <a:t>Additional examples:</a:t>
-            </a:r>
+              <a:t>Additional </a:t>
+            </a:r>
+            <a:r>
+              <a:rPr lang="en-US" sz="2200" dirty="0" smtClean="0">
+                <a:solidFill>
+                  <a:schemeClr val="bg1">
+                    <a:lumMod val="65000"/>
+                  </a:schemeClr>
+                </a:solidFill>
+              </a:rPr>
+              <a:t>example:</a:t>
+            </a:r>
+            <a:endParaRPr lang="en-US" sz="2200" dirty="0">
+              <a:solidFill>
+                <a:schemeClr val="bg1">
+                  <a:lumMod val="65000"/>
+                </a:schemeClr>
+              </a:solidFill>
+            </a:endParaRPr>
           </a:p>
         </p:txBody>
       </p:sp>
@@ -14559,7 +14377,7 @@
         </p:nvSpPr>
         <p:spPr>
           <a:xfrm>
-            <a:off x="3350717" y="1735798"/>
+            <a:off x="3260779" y="1751799"/>
             <a:ext cx="1398288" cy="518746"/>
           </a:xfrm>
           <a:prstGeom prst="rect">
@@ -14767,7 +14585,7 @@
         </p:nvSpPr>
         <p:spPr>
           <a:xfrm>
-            <a:off x="4738579" y="1713815"/>
+            <a:off x="4659067" y="1727671"/>
             <a:ext cx="1280746" cy="481445"/>
           </a:xfrm>
           <a:prstGeom prst="rect">
@@ -15173,214 +14991,6 @@
       </p:sp>
       <p:sp>
         <p:nvSpPr>
-          <p:cNvPr id="14" name="Content Placeholder 2"/>
-          <p:cNvSpPr txBox="1">
-            <a:spLocks/>
-          </p:cNvSpPr>
-          <p:nvPr/>
-        </p:nvSpPr>
-        <p:spPr>
-          <a:xfrm>
-            <a:off x="9129522" y="1675869"/>
-            <a:ext cx="1280746" cy="1919885"/>
-          </a:xfrm>
-          <a:prstGeom prst="rect">
-            <a:avLst/>
-          </a:prstGeom>
-        </p:spPr>
-        <p:txBody>
-          <a:bodyPr vert="horz" lIns="91440" tIns="45720" rIns="91440" bIns="45720" rtlCol="0">
-            <a:normAutofit/>
-          </a:bodyPr>
-          <a:lstStyle>
-            <a:lvl1pPr marL="228600" indent="-228600" algn="l" defTabSz="914400" rtl="0" eaLnBrk="1" latinLnBrk="0" hangingPunct="1">
-              <a:lnSpc>
-                <a:spcPct val="90000"/>
-              </a:lnSpc>
-              <a:spcBef>
-                <a:spcPts val="1000"/>
-              </a:spcBef>
-              <a:buFont typeface="Arial" panose="020B0604020202020204" pitchFamily="34" charset="0"/>
-              <a:buChar char="•"/>
-              <a:defRPr sz="2800" kern="1200">
-                <a:solidFill>
-                  <a:schemeClr val="tx1"/>
-                </a:solidFill>
-                <a:latin typeface="+mn-lt"/>
-                <a:ea typeface="+mn-ea"/>
-                <a:cs typeface="+mn-cs"/>
-              </a:defRPr>
-            </a:lvl1pPr>
-            <a:lvl2pPr marL="685800" indent="-228600" algn="l" defTabSz="914400" rtl="0" eaLnBrk="1" latinLnBrk="0" hangingPunct="1">
-              <a:lnSpc>
-                <a:spcPct val="90000"/>
-              </a:lnSpc>
-              <a:spcBef>
-                <a:spcPts val="500"/>
-              </a:spcBef>
-              <a:buFont typeface="Arial" panose="020B0604020202020204" pitchFamily="34" charset="0"/>
-              <a:buChar char="•"/>
-              <a:defRPr sz="2400" kern="1200">
-                <a:solidFill>
-                  <a:schemeClr val="tx1"/>
-                </a:solidFill>
-                <a:latin typeface="+mn-lt"/>
-                <a:ea typeface="+mn-ea"/>
-                <a:cs typeface="+mn-cs"/>
-              </a:defRPr>
-            </a:lvl2pPr>
-            <a:lvl3pPr marL="1143000" indent="-228600" algn="l" defTabSz="914400" rtl="0" eaLnBrk="1" latinLnBrk="0" hangingPunct="1">
-              <a:lnSpc>
-                <a:spcPct val="90000"/>
-              </a:lnSpc>
-              <a:spcBef>
-                <a:spcPts val="500"/>
-              </a:spcBef>
-              <a:buFont typeface="Arial" panose="020B0604020202020204" pitchFamily="34" charset="0"/>
-              <a:buChar char="•"/>
-              <a:defRPr sz="2000" kern="1200">
-                <a:solidFill>
-                  <a:schemeClr val="tx1"/>
-                </a:solidFill>
-                <a:latin typeface="+mn-lt"/>
-                <a:ea typeface="+mn-ea"/>
-                <a:cs typeface="+mn-cs"/>
-              </a:defRPr>
-            </a:lvl3pPr>
-            <a:lvl4pPr marL="1600200" indent="-228600" algn="l" defTabSz="914400" rtl="0" eaLnBrk="1" latinLnBrk="0" hangingPunct="1">
-              <a:lnSpc>
-                <a:spcPct val="90000"/>
-              </a:lnSpc>
-              <a:spcBef>
-                <a:spcPts val="500"/>
-              </a:spcBef>
-              <a:buFont typeface="Arial" panose="020B0604020202020204" pitchFamily="34" charset="0"/>
-              <a:buChar char="•"/>
-              <a:defRPr sz="1800" kern="1200">
-                <a:solidFill>
-                  <a:schemeClr val="tx1"/>
-                </a:solidFill>
-                <a:latin typeface="+mn-lt"/>
-                <a:ea typeface="+mn-ea"/>
-                <a:cs typeface="+mn-cs"/>
-              </a:defRPr>
-            </a:lvl4pPr>
-            <a:lvl5pPr marL="2057400" indent="-228600" algn="l" defTabSz="914400" rtl="0" eaLnBrk="1" latinLnBrk="0" hangingPunct="1">
-              <a:lnSpc>
-                <a:spcPct val="90000"/>
-              </a:lnSpc>
-              <a:spcBef>
-                <a:spcPts val="500"/>
-              </a:spcBef>
-              <a:buFont typeface="Arial" panose="020B0604020202020204" pitchFamily="34" charset="0"/>
-              <a:buChar char="•"/>
-              <a:defRPr sz="1800" kern="1200">
-                <a:solidFill>
-                  <a:schemeClr val="tx1"/>
-                </a:solidFill>
-                <a:latin typeface="+mn-lt"/>
-                <a:ea typeface="+mn-ea"/>
-                <a:cs typeface="+mn-cs"/>
-              </a:defRPr>
-            </a:lvl5pPr>
-            <a:lvl6pPr marL="2514600" indent="-228600" algn="l" defTabSz="914400" rtl="0" eaLnBrk="1" latinLnBrk="0" hangingPunct="1">
-              <a:lnSpc>
-                <a:spcPct val="90000"/>
-              </a:lnSpc>
-              <a:spcBef>
-                <a:spcPts val="500"/>
-              </a:spcBef>
-              <a:buFont typeface="Arial" panose="020B0604020202020204" pitchFamily="34" charset="0"/>
-              <a:buChar char="•"/>
-              <a:defRPr sz="1800" kern="1200">
-                <a:solidFill>
-                  <a:schemeClr val="tx1"/>
-                </a:solidFill>
-                <a:latin typeface="+mn-lt"/>
-                <a:ea typeface="+mn-ea"/>
-                <a:cs typeface="+mn-cs"/>
-              </a:defRPr>
-            </a:lvl6pPr>
-            <a:lvl7pPr marL="2971800" indent="-228600" algn="l" defTabSz="914400" rtl="0" eaLnBrk="1" latinLnBrk="0" hangingPunct="1">
-              <a:lnSpc>
-                <a:spcPct val="90000"/>
-              </a:lnSpc>
-              <a:spcBef>
-                <a:spcPts val="500"/>
-              </a:spcBef>
-              <a:buFont typeface="Arial" panose="020B0604020202020204" pitchFamily="34" charset="0"/>
-              <a:buChar char="•"/>
-              <a:defRPr sz="1800" kern="1200">
-                <a:solidFill>
-                  <a:schemeClr val="tx1"/>
-                </a:solidFill>
-                <a:latin typeface="+mn-lt"/>
-                <a:ea typeface="+mn-ea"/>
-                <a:cs typeface="+mn-cs"/>
-              </a:defRPr>
-            </a:lvl7pPr>
-            <a:lvl8pPr marL="3429000" indent="-228600" algn="l" defTabSz="914400" rtl="0" eaLnBrk="1" latinLnBrk="0" hangingPunct="1">
-              <a:lnSpc>
-                <a:spcPct val="90000"/>
-              </a:lnSpc>
-              <a:spcBef>
-                <a:spcPts val="500"/>
-              </a:spcBef>
-              <a:buFont typeface="Arial" panose="020B0604020202020204" pitchFamily="34" charset="0"/>
-              <a:buChar char="•"/>
-              <a:defRPr sz="1800" kern="1200">
-                <a:solidFill>
-                  <a:schemeClr val="tx1"/>
-                </a:solidFill>
-                <a:latin typeface="+mn-lt"/>
-                <a:ea typeface="+mn-ea"/>
-                <a:cs typeface="+mn-cs"/>
-              </a:defRPr>
-            </a:lvl8pPr>
-            <a:lvl9pPr marL="3886200" indent="-228600" algn="l" defTabSz="914400" rtl="0" eaLnBrk="1" latinLnBrk="0" hangingPunct="1">
-              <a:lnSpc>
-                <a:spcPct val="90000"/>
-              </a:lnSpc>
-              <a:spcBef>
-                <a:spcPts val="500"/>
-              </a:spcBef>
-              <a:buFont typeface="Arial" panose="020B0604020202020204" pitchFamily="34" charset="0"/>
-              <a:buChar char="•"/>
-              <a:defRPr sz="1800" kern="1200">
-                <a:solidFill>
-                  <a:schemeClr val="tx1"/>
-                </a:solidFill>
-                <a:latin typeface="+mn-lt"/>
-                <a:ea typeface="+mn-ea"/>
-                <a:cs typeface="+mn-cs"/>
-              </a:defRPr>
-            </a:lvl9pPr>
-          </a:lstStyle>
-          <a:p>
-            <a:pPr marL="0" indent="0">
-              <a:buNone/>
-            </a:pPr>
-            <a:r>
-              <a:rPr lang="en-US" sz="1100" dirty="0"/>
-              <a:t>4. The </a:t>
-            </a:r>
-            <a:r>
-              <a:rPr lang="en-US" sz="1100" dirty="0">
-                <a:highlight>
-                  <a:srgbClr val="CCECFF"/>
-                </a:highlight>
-              </a:rPr>
-              <a:t>#ended on</a:t>
-            </a:r>
-            <a:r>
-              <a:rPr lang="en-US" sz="1100" dirty="0"/>
-              <a:t>  date is the date the patient ended or left the specified clinical trial.</a:t>
-            </a:r>
-          </a:p>
-        </p:txBody>
-      </p:sp>
-      <p:sp>
-        <p:nvSpPr>
           <p:cNvPr id="15" name="Content Placeholder 2"/>
           <p:cNvSpPr txBox="1">
             <a:spLocks/>
@@ -15581,20 +15191,8 @@
               <a:t> </a:t>
             </a:r>
             <a:r>
-              <a:rPr lang="de-DE" sz="1600" dirty="0" err="1"/>
-              <a:t>is</a:t>
-            </a:r>
-            <a:r>
-              <a:rPr lang="de-DE" sz="1600" dirty="0"/>
-              <a:t> </a:t>
-            </a:r>
-            <a:r>
-              <a:rPr lang="de-DE" sz="1600" dirty="0" err="1"/>
-              <a:t>enrolled</a:t>
-            </a:r>
-            <a:r>
-              <a:rPr lang="de-DE" sz="1600" dirty="0"/>
-              <a:t> in </a:t>
+              <a:rPr lang="de-DE" sz="1600" dirty="0" smtClean="0"/>
+              <a:t>in </a:t>
             </a:r>
             <a:r>
               <a:rPr lang="en-US" sz="1600" dirty="0">
@@ -15621,12 +15219,12 @@
               <a:t> </a:t>
             </a:r>
             <a:r>
-              <a:rPr lang="de-DE" sz="1600" dirty="0" err="1"/>
-              <a:t>and</a:t>
-            </a:r>
-            <a:r>
-              <a:rPr lang="de-DE" sz="1600" dirty="0"/>
-              <a:t> </a:t>
+              <a:rPr lang="en-US" sz="1600" dirty="0" smtClean="0">
+                <a:highlight>
+                  <a:srgbClr val="CCECFF"/>
+                </a:highlight>
+              </a:rPr>
+              <a:t>#ended </a:t>
             </a:r>
             <a:r>
               <a:rPr lang="en-US" sz="1600" dirty="0">
@@ -15634,79 +15232,14 @@
                   <a:srgbClr val="CCECFF"/>
                 </a:highlight>
               </a:rPr>
-              <a:t> #enrolled on</a:t>
+              <a:t>on</a:t>
             </a:r>
             <a:r>
               <a:rPr lang="de-DE" sz="1600" dirty="0"/>
               <a:t> </a:t>
             </a:r>
             <a:r>
-              <a:rPr lang="en-US" sz="1600" dirty="0">
-                <a:highlight>
-                  <a:srgbClr val="CCECFF"/>
-                </a:highlight>
-              </a:rPr>
-              <a:t>#01/01/2017</a:t>
-            </a:r>
-            <a:r>
-              <a:rPr lang="de-DE" sz="1600" dirty="0"/>
-              <a:t>.</a:t>
-            </a:r>
-          </a:p>
-          <a:p>
-            <a:pPr marL="0" indent="0">
-              <a:buNone/>
-            </a:pPr>
-            <a:r>
-              <a:rPr lang="en-US" sz="1600" dirty="0">
-                <a:highlight>
-                  <a:srgbClr val="CCECFF"/>
-                </a:highlight>
-              </a:rPr>
-              <a:t>#Clinical trial</a:t>
-            </a:r>
-            <a:r>
-              <a:rPr lang="de-DE" sz="1600" dirty="0"/>
-              <a:t> </a:t>
-            </a:r>
-            <a:r>
-              <a:rPr lang="de-DE" sz="1600" dirty="0" err="1"/>
-              <a:t>for</a:t>
-            </a:r>
-            <a:r>
-              <a:rPr lang="de-DE" sz="1600" dirty="0"/>
-              <a:t> </a:t>
-            </a:r>
-            <a:r>
-              <a:rPr lang="de-DE" sz="1600" dirty="0" err="1"/>
-              <a:t>the</a:t>
-            </a:r>
-            <a:r>
-              <a:rPr lang="de-DE" sz="1600" dirty="0"/>
-              <a:t> </a:t>
-            </a:r>
-            <a:r>
-              <a:rPr lang="de-DE" sz="1600" dirty="0" err="1"/>
-              <a:t>patient</a:t>
-            </a:r>
-            <a:r>
-              <a:rPr lang="de-DE" sz="1600" dirty="0"/>
-              <a:t> </a:t>
-            </a:r>
-            <a:r>
-              <a:rPr lang="en-US" sz="1600" dirty="0">
-                <a:highlight>
-                  <a:srgbClr val="CCECFF"/>
-                </a:highlight>
-              </a:rPr>
-              <a:t>#ended on</a:t>
-            </a:r>
-            <a:r>
-              <a:rPr lang="en-US" sz="1600" dirty="0"/>
-              <a:t> </a:t>
-            </a:r>
-            <a:r>
-              <a:rPr lang="en-US" sz="1600" dirty="0">
+              <a:rPr lang="en-US" sz="1600" dirty="0" smtClean="0">
                 <a:highlight>
                   <a:srgbClr val="CCECFF"/>
                 </a:highlight>
@@ -15714,44 +15247,8 @@
               <a:t>#10/10/2017</a:t>
             </a:r>
             <a:r>
-              <a:rPr lang="en-US" sz="1600" dirty="0"/>
-              <a:t> due to surgery. The </a:t>
-            </a:r>
-            <a:r>
-              <a:rPr lang="en-US" sz="1600" dirty="0">
-                <a:highlight>
-                  <a:srgbClr val="CCECFF"/>
-                </a:highlight>
-              </a:rPr>
-              <a:t>#PATINA</a:t>
-            </a:r>
-            <a:r>
-              <a:rPr lang="en-US" sz="1600" dirty="0"/>
-              <a:t> clinical trial was </a:t>
-            </a:r>
-            <a:r>
-              <a:rPr lang="en-US" sz="1600" dirty="0">
-                <a:highlight>
-                  <a:srgbClr val="CCECFF"/>
-                </a:highlight>
-              </a:rPr>
-              <a:t>#enrolled on</a:t>
-            </a:r>
-            <a:r>
-              <a:rPr lang="en-US" sz="1600" dirty="0"/>
-              <a:t> </a:t>
-            </a:r>
-            <a:r>
-              <a:rPr lang="en-US" sz="1600" dirty="0">
-                <a:highlight>
-                  <a:srgbClr val="CCECFF"/>
-                </a:highlight>
-              </a:rPr>
-              <a:t>#01/01/2017</a:t>
-            </a:r>
-            <a:r>
-              <a:rPr lang="en-US" sz="1600" dirty="0"/>
-              <a:t>. </a:t>
+              <a:rPr lang="de-DE" sz="1600" dirty="0" smtClean="0"/>
+              <a:t>.</a:t>
             </a:r>
             <a:endParaRPr lang="de-DE" sz="1600" dirty="0"/>
           </a:p>
@@ -15767,7 +15264,7 @@
         </p:nvSpPr>
         <p:spPr>
           <a:xfrm>
-            <a:off x="3444963" y="5529013"/>
+            <a:off x="2888974" y="4928255"/>
             <a:ext cx="2049280" cy="720755"/>
           </a:xfrm>
           <a:prstGeom prst="rect">
@@ -15985,7 +15482,7 @@
         </p:nvCxnSpPr>
         <p:spPr>
           <a:xfrm flipH="1" flipV="1">
-            <a:off x="4853469" y="1277657"/>
+            <a:off x="4700155" y="1292217"/>
             <a:ext cx="2738" cy="350040"/>
           </a:xfrm>
           <a:prstGeom prst="line">
@@ -16051,119 +15548,14 @@
       </p:cxnSp>
       <p:cxnSp>
         <p:nvCxnSpPr>
-          <p:cNvPr id="28" name="Straight Connector 27"/>
-          <p:cNvCxnSpPr/>
-          <p:nvPr/>
-        </p:nvCxnSpPr>
-        <p:spPr>
-          <a:xfrm flipH="1" flipV="1">
-            <a:off x="9227903" y="1294401"/>
-            <a:ext cx="2738" cy="350040"/>
-          </a:xfrm>
-          <a:prstGeom prst="line">
-            <a:avLst/>
-          </a:prstGeom>
-          <a:ln>
-            <a:solidFill>
-              <a:schemeClr val="tx1"/>
-            </a:solidFill>
-          </a:ln>
-        </p:spPr>
-        <p:style>
-          <a:lnRef idx="1">
-            <a:schemeClr val="accent1"/>
-          </a:lnRef>
-          <a:fillRef idx="0">
-            <a:schemeClr val="accent1"/>
-          </a:fillRef>
-          <a:effectRef idx="0">
-            <a:schemeClr val="accent1"/>
-          </a:effectRef>
-          <a:fontRef idx="minor">
-            <a:schemeClr val="tx1"/>
-          </a:fontRef>
-        </p:style>
-      </p:cxnSp>
-      <p:cxnSp>
-        <p:nvCxnSpPr>
           <p:cNvPr id="29" name="Straight Connector 28"/>
           <p:cNvCxnSpPr/>
           <p:nvPr/>
         </p:nvCxnSpPr>
         <p:spPr>
           <a:xfrm flipH="1" flipV="1">
-            <a:off x="3440236" y="1308247"/>
+            <a:off x="3347979" y="1324357"/>
             <a:ext cx="2738" cy="350040"/>
-          </a:xfrm>
-          <a:prstGeom prst="line">
-            <a:avLst/>
-          </a:prstGeom>
-          <a:ln>
-            <a:solidFill>
-              <a:schemeClr val="tx1"/>
-            </a:solidFill>
-          </a:ln>
-        </p:spPr>
-        <p:style>
-          <a:lnRef idx="1">
-            <a:schemeClr val="accent1"/>
-          </a:lnRef>
-          <a:fillRef idx="0">
-            <a:schemeClr val="accent1"/>
-          </a:fillRef>
-          <a:effectRef idx="0">
-            <a:schemeClr val="accent1"/>
-          </a:effectRef>
-          <a:fontRef idx="minor">
-            <a:schemeClr val="tx1"/>
-          </a:fontRef>
-        </p:style>
-      </p:cxnSp>
-      <p:cxnSp>
-        <p:nvCxnSpPr>
-          <p:cNvPr id="30" name="Straight Connector 29"/>
-          <p:cNvCxnSpPr/>
-          <p:nvPr/>
-        </p:nvCxnSpPr>
-        <p:spPr>
-          <a:xfrm flipH="1" flipV="1">
-            <a:off x="2285925" y="4920129"/>
-            <a:ext cx="1369" cy="465593"/>
-          </a:xfrm>
-          <a:prstGeom prst="line">
-            <a:avLst/>
-          </a:prstGeom>
-          <a:ln>
-            <a:solidFill>
-              <a:schemeClr val="tx1"/>
-            </a:solidFill>
-          </a:ln>
-        </p:spPr>
-        <p:style>
-          <a:lnRef idx="1">
-            <a:schemeClr val="accent1"/>
-          </a:lnRef>
-          <a:fillRef idx="0">
-            <a:schemeClr val="accent1"/>
-          </a:fillRef>
-          <a:effectRef idx="0">
-            <a:schemeClr val="accent1"/>
-          </a:effectRef>
-          <a:fontRef idx="minor">
-            <a:schemeClr val="tx1"/>
-          </a:fontRef>
-        </p:style>
-      </p:cxnSp>
-      <p:cxnSp>
-        <p:nvCxnSpPr>
-          <p:cNvPr id="51" name="Straight Connector 50"/>
-          <p:cNvCxnSpPr/>
-          <p:nvPr/>
-        </p:nvCxnSpPr>
-        <p:spPr>
-          <a:xfrm flipH="1" flipV="1">
-            <a:off x="3563239" y="4993801"/>
-            <a:ext cx="1369" cy="465593"/>
           </a:xfrm>
           <a:prstGeom prst="line">
             <a:avLst/>
@@ -16196,9 +15588,9 @@
           <p:nvPr/>
         </p:nvCxnSpPr>
         <p:spPr>
-          <a:xfrm flipH="1" flipV="1">
-            <a:off x="8731559" y="4358017"/>
-            <a:ext cx="1368" cy="834663"/>
+          <a:xfrm flipV="1">
+            <a:off x="5299440" y="4432701"/>
+            <a:ext cx="0" cy="450443"/>
           </a:xfrm>
           <a:prstGeom prst="line">
             <a:avLst/>
@@ -16234,7 +15626,7 @@
         </p:nvSpPr>
         <p:spPr>
           <a:xfrm>
-            <a:off x="8526895" y="5401367"/>
+            <a:off x="5173738" y="4951301"/>
             <a:ext cx="2049280" cy="720755"/>
           </a:xfrm>
           <a:prstGeom prst="rect">
@@ -16427,11 +15819,347 @@
             </a:r>
             <a:r>
               <a:rPr lang="en-US" sz="1100" dirty="0"/>
-              <a:t> date does not need to be specified if a patient is still enrolled in the clinical trial.</a:t>
-            </a:r>
+              <a:t>  date is the date the patient ended or left the specified clinical trial</a:t>
+            </a:r>
+            <a:r>
+              <a:rPr lang="en-US" sz="1100" dirty="0" smtClean="0"/>
+              <a:t>.</a:t>
+            </a:r>
+            <a:endParaRPr lang="en-US" sz="1100" dirty="0"/>
           </a:p>
         </p:txBody>
       </p:sp>
+      <p:cxnSp>
+        <p:nvCxnSpPr>
+          <p:cNvPr id="26" name="Straight Connector 25"/>
+          <p:cNvCxnSpPr/>
+          <p:nvPr/>
+        </p:nvCxnSpPr>
+        <p:spPr>
+          <a:xfrm flipV="1">
+            <a:off x="4509927" y="4432701"/>
+            <a:ext cx="0" cy="450443"/>
+          </a:xfrm>
+          <a:prstGeom prst="line">
+            <a:avLst/>
+          </a:prstGeom>
+          <a:ln>
+            <a:solidFill>
+              <a:schemeClr val="tx1"/>
+            </a:solidFill>
+          </a:ln>
+        </p:spPr>
+        <p:style>
+          <a:lnRef idx="1">
+            <a:schemeClr val="accent1"/>
+          </a:lnRef>
+          <a:fillRef idx="0">
+            <a:schemeClr val="accent1"/>
+          </a:fillRef>
+          <a:effectRef idx="0">
+            <a:schemeClr val="accent1"/>
+          </a:effectRef>
+          <a:fontRef idx="minor">
+            <a:schemeClr val="tx1"/>
+          </a:fontRef>
+        </p:style>
+      </p:cxnSp>
+      <p:sp>
+        <p:nvSpPr>
+          <p:cNvPr id="19" name="Content Placeholder 2"/>
+          <p:cNvSpPr txBox="1">
+            <a:spLocks/>
+          </p:cNvSpPr>
+          <p:nvPr/>
+        </p:nvSpPr>
+        <p:spPr>
+          <a:xfrm>
+            <a:off x="7119696" y="4951301"/>
+            <a:ext cx="2049280" cy="837914"/>
+          </a:xfrm>
+          <a:prstGeom prst="rect">
+            <a:avLst/>
+          </a:prstGeom>
+        </p:spPr>
+        <p:txBody>
+          <a:bodyPr vert="horz" lIns="91440" tIns="45720" rIns="91440" bIns="45720" rtlCol="0">
+            <a:noAutofit/>
+          </a:bodyPr>
+          <a:lstStyle>
+            <a:lvl1pPr marL="228600" indent="-228600" algn="l" defTabSz="914400" rtl="0" eaLnBrk="1" latinLnBrk="0" hangingPunct="1">
+              <a:lnSpc>
+                <a:spcPct val="90000"/>
+              </a:lnSpc>
+              <a:spcBef>
+                <a:spcPts val="1000"/>
+              </a:spcBef>
+              <a:buFont typeface="Arial" panose="020B0604020202020204" pitchFamily="34" charset="0"/>
+              <a:buChar char="•"/>
+              <a:defRPr sz="2800" kern="1200">
+                <a:solidFill>
+                  <a:schemeClr val="tx1"/>
+                </a:solidFill>
+                <a:latin typeface="+mn-lt"/>
+                <a:ea typeface="+mn-ea"/>
+                <a:cs typeface="+mn-cs"/>
+              </a:defRPr>
+            </a:lvl1pPr>
+            <a:lvl2pPr marL="685800" indent="-228600" algn="l" defTabSz="914400" rtl="0" eaLnBrk="1" latinLnBrk="0" hangingPunct="1">
+              <a:lnSpc>
+                <a:spcPct val="90000"/>
+              </a:lnSpc>
+              <a:spcBef>
+                <a:spcPts val="500"/>
+              </a:spcBef>
+              <a:buFont typeface="Arial" panose="020B0604020202020204" pitchFamily="34" charset="0"/>
+              <a:buChar char="•"/>
+              <a:defRPr sz="2400" kern="1200">
+                <a:solidFill>
+                  <a:schemeClr val="tx1"/>
+                </a:solidFill>
+                <a:latin typeface="+mn-lt"/>
+                <a:ea typeface="+mn-ea"/>
+                <a:cs typeface="+mn-cs"/>
+              </a:defRPr>
+            </a:lvl2pPr>
+            <a:lvl3pPr marL="1143000" indent="-228600" algn="l" defTabSz="914400" rtl="0" eaLnBrk="1" latinLnBrk="0" hangingPunct="1">
+              <a:lnSpc>
+                <a:spcPct val="90000"/>
+              </a:lnSpc>
+              <a:spcBef>
+                <a:spcPts val="500"/>
+              </a:spcBef>
+              <a:buFont typeface="Arial" panose="020B0604020202020204" pitchFamily="34" charset="0"/>
+              <a:buChar char="•"/>
+              <a:defRPr sz="2000" kern="1200">
+                <a:solidFill>
+                  <a:schemeClr val="tx1"/>
+                </a:solidFill>
+                <a:latin typeface="+mn-lt"/>
+                <a:ea typeface="+mn-ea"/>
+                <a:cs typeface="+mn-cs"/>
+              </a:defRPr>
+            </a:lvl3pPr>
+            <a:lvl4pPr marL="1600200" indent="-228600" algn="l" defTabSz="914400" rtl="0" eaLnBrk="1" latinLnBrk="0" hangingPunct="1">
+              <a:lnSpc>
+                <a:spcPct val="90000"/>
+              </a:lnSpc>
+              <a:spcBef>
+                <a:spcPts val="500"/>
+              </a:spcBef>
+              <a:buFont typeface="Arial" panose="020B0604020202020204" pitchFamily="34" charset="0"/>
+              <a:buChar char="•"/>
+              <a:defRPr sz="1800" kern="1200">
+                <a:solidFill>
+                  <a:schemeClr val="tx1"/>
+                </a:solidFill>
+                <a:latin typeface="+mn-lt"/>
+                <a:ea typeface="+mn-ea"/>
+                <a:cs typeface="+mn-cs"/>
+              </a:defRPr>
+            </a:lvl4pPr>
+            <a:lvl5pPr marL="2057400" indent="-228600" algn="l" defTabSz="914400" rtl="0" eaLnBrk="1" latinLnBrk="0" hangingPunct="1">
+              <a:lnSpc>
+                <a:spcPct val="90000"/>
+              </a:lnSpc>
+              <a:spcBef>
+                <a:spcPts val="500"/>
+              </a:spcBef>
+              <a:buFont typeface="Arial" panose="020B0604020202020204" pitchFamily="34" charset="0"/>
+              <a:buChar char="•"/>
+              <a:defRPr sz="1800" kern="1200">
+                <a:solidFill>
+                  <a:schemeClr val="tx1"/>
+                </a:solidFill>
+                <a:latin typeface="+mn-lt"/>
+                <a:ea typeface="+mn-ea"/>
+                <a:cs typeface="+mn-cs"/>
+              </a:defRPr>
+            </a:lvl5pPr>
+            <a:lvl6pPr marL="2514600" indent="-228600" algn="l" defTabSz="914400" rtl="0" eaLnBrk="1" latinLnBrk="0" hangingPunct="1">
+              <a:lnSpc>
+                <a:spcPct val="90000"/>
+              </a:lnSpc>
+              <a:spcBef>
+                <a:spcPts val="500"/>
+              </a:spcBef>
+              <a:buFont typeface="Arial" panose="020B0604020202020204" pitchFamily="34" charset="0"/>
+              <a:buChar char="•"/>
+              <a:defRPr sz="1800" kern="1200">
+                <a:solidFill>
+                  <a:schemeClr val="tx1"/>
+                </a:solidFill>
+                <a:latin typeface="+mn-lt"/>
+                <a:ea typeface="+mn-ea"/>
+                <a:cs typeface="+mn-cs"/>
+              </a:defRPr>
+            </a:lvl6pPr>
+            <a:lvl7pPr marL="2971800" indent="-228600" algn="l" defTabSz="914400" rtl="0" eaLnBrk="1" latinLnBrk="0" hangingPunct="1">
+              <a:lnSpc>
+                <a:spcPct val="90000"/>
+              </a:lnSpc>
+              <a:spcBef>
+                <a:spcPts val="500"/>
+              </a:spcBef>
+              <a:buFont typeface="Arial" panose="020B0604020202020204" pitchFamily="34" charset="0"/>
+              <a:buChar char="•"/>
+              <a:defRPr sz="1800" kern="1200">
+                <a:solidFill>
+                  <a:schemeClr val="tx1"/>
+                </a:solidFill>
+                <a:latin typeface="+mn-lt"/>
+                <a:ea typeface="+mn-ea"/>
+                <a:cs typeface="+mn-cs"/>
+              </a:defRPr>
+            </a:lvl7pPr>
+            <a:lvl8pPr marL="3429000" indent="-228600" algn="l" defTabSz="914400" rtl="0" eaLnBrk="1" latinLnBrk="0" hangingPunct="1">
+              <a:lnSpc>
+                <a:spcPct val="90000"/>
+              </a:lnSpc>
+              <a:spcBef>
+                <a:spcPts val="500"/>
+              </a:spcBef>
+              <a:buFont typeface="Arial" panose="020B0604020202020204" pitchFamily="34" charset="0"/>
+              <a:buChar char="•"/>
+              <a:defRPr sz="1800" kern="1200">
+                <a:solidFill>
+                  <a:schemeClr val="tx1"/>
+                </a:solidFill>
+                <a:latin typeface="+mn-lt"/>
+                <a:ea typeface="+mn-ea"/>
+                <a:cs typeface="+mn-cs"/>
+              </a:defRPr>
+            </a:lvl8pPr>
+            <a:lvl9pPr marL="3886200" indent="-228600" algn="l" defTabSz="914400" rtl="0" eaLnBrk="1" latinLnBrk="0" hangingPunct="1">
+              <a:lnSpc>
+                <a:spcPct val="90000"/>
+              </a:lnSpc>
+              <a:spcBef>
+                <a:spcPts val="500"/>
+              </a:spcBef>
+              <a:buFont typeface="Arial" panose="020B0604020202020204" pitchFamily="34" charset="0"/>
+              <a:buChar char="•"/>
+              <a:defRPr sz="1800" kern="1200">
+                <a:solidFill>
+                  <a:schemeClr val="tx1"/>
+                </a:solidFill>
+                <a:latin typeface="+mn-lt"/>
+                <a:ea typeface="+mn-ea"/>
+                <a:cs typeface="+mn-cs"/>
+              </a:defRPr>
+            </a:lvl9pPr>
+          </a:lstStyle>
+          <a:p>
+            <a:pPr marL="0" indent="0">
+              <a:buNone/>
+            </a:pPr>
+            <a:r>
+              <a:rPr lang="en-US" sz="1100" dirty="0" smtClean="0"/>
+              <a:t>Either </a:t>
+            </a:r>
+            <a:r>
+              <a:rPr lang="en-US" sz="1100" dirty="0">
+                <a:highlight>
+                  <a:srgbClr val="CCECFF"/>
+                </a:highlight>
+              </a:rPr>
+              <a:t>#</a:t>
+            </a:r>
+            <a:r>
+              <a:rPr lang="en-US" sz="1100" dirty="0" smtClean="0">
+                <a:highlight>
+                  <a:srgbClr val="CCECFF"/>
+                </a:highlight>
+              </a:rPr>
+              <a:t>enrolled </a:t>
+            </a:r>
+            <a:r>
+              <a:rPr lang="en-US" sz="1100" dirty="0">
+                <a:highlight>
+                  <a:srgbClr val="CCECFF"/>
+                </a:highlight>
+              </a:rPr>
+              <a:t>on</a:t>
+            </a:r>
+            <a:r>
+              <a:rPr lang="en-US" sz="1100" dirty="0" smtClean="0"/>
+              <a:t> or </a:t>
+            </a:r>
+            <a:r>
+              <a:rPr lang="en-US" sz="1100" dirty="0" smtClean="0">
+                <a:highlight>
+                  <a:srgbClr val="CCECFF"/>
+                </a:highlight>
+              </a:rPr>
+              <a:t>#ended on</a:t>
+            </a:r>
+            <a:r>
+              <a:rPr lang="en-US" sz="1100" dirty="0" smtClean="0"/>
+              <a:t>  date can be specified. Both </a:t>
+            </a:r>
+            <a:r>
+              <a:rPr lang="en-US" sz="1100" smtClean="0"/>
+              <a:t>dates </a:t>
+            </a:r>
+            <a:r>
+              <a:rPr lang="en-US" sz="1100" smtClean="0"/>
+              <a:t>cannot </a:t>
+            </a:r>
+            <a:r>
+              <a:rPr lang="en-US" sz="1100" dirty="0" smtClean="0"/>
+              <a:t>be specified within the same </a:t>
+            </a:r>
+            <a:r>
+              <a:rPr lang="en-US" sz="1100" dirty="0" smtClean="0">
+                <a:highlight>
+                  <a:srgbClr val="CCECFF"/>
+                </a:highlight>
+              </a:rPr>
+              <a:t>#clinical trial</a:t>
+            </a:r>
+            <a:r>
+              <a:rPr lang="en-US" sz="1100" dirty="0" smtClean="0"/>
+              <a:t> structured phrase.</a:t>
+            </a:r>
+            <a:endParaRPr lang="en-US" sz="1100" dirty="0"/>
+          </a:p>
+        </p:txBody>
+      </p:sp>
+      <p:cxnSp>
+        <p:nvCxnSpPr>
+          <p:cNvPr id="20" name="Straight Connector 19"/>
+          <p:cNvCxnSpPr/>
+          <p:nvPr/>
+        </p:nvCxnSpPr>
+        <p:spPr>
+          <a:xfrm flipV="1">
+            <a:off x="7224621" y="4432701"/>
+            <a:ext cx="0" cy="450443"/>
+          </a:xfrm>
+          <a:prstGeom prst="line">
+            <a:avLst/>
+          </a:prstGeom>
+          <a:ln>
+            <a:solidFill>
+              <a:schemeClr val="tx1"/>
+            </a:solidFill>
+          </a:ln>
+        </p:spPr>
+        <p:style>
+          <a:lnRef idx="1">
+            <a:schemeClr val="accent1"/>
+          </a:lnRef>
+          <a:fillRef idx="0">
+            <a:schemeClr val="accent1"/>
+          </a:fillRef>
+          <a:effectRef idx="0">
+            <a:schemeClr val="accent1"/>
+          </a:effectRef>
+          <a:fontRef idx="minor">
+            <a:schemeClr val="tx1"/>
+          </a:fontRef>
+        </p:style>
+      </p:cxnSp>
     </p:spTree>
     <p:extLst>
       <p:ext uri="{BB962C8B-B14F-4D97-AF65-F5344CB8AC3E}">
@@ -18667,7 +18395,7 @@
           <p:cNvPr id="27" name="Straight Connector 26">
             <a:extLst>
               <a:ext uri="{FF2B5EF4-FFF2-40B4-BE49-F238E27FC236}">
-                <a16:creationId xmlns:a16="http://schemas.microsoft.com/office/drawing/2014/main" id="{F081D646-8E70-4571-833F-95121A6EED88}"/>
+                <a16:creationId xmlns:a16="http://schemas.microsoft.com/office/drawing/2014/main" xmlns="" id="{F081D646-8E70-4571-833F-95121A6EED88}"/>
               </a:ext>
             </a:extLst>
           </p:cNvPr>
@@ -18710,7 +18438,7 @@
           <p:cNvPr id="33" name="Straight Connector 32">
             <a:extLst>
               <a:ext uri="{FF2B5EF4-FFF2-40B4-BE49-F238E27FC236}">
-                <a16:creationId xmlns:a16="http://schemas.microsoft.com/office/drawing/2014/main" id="{2C709E46-1A75-4F73-9179-2035ABA4163C}"/>
+                <a16:creationId xmlns:a16="http://schemas.microsoft.com/office/drawing/2014/main" xmlns="" id="{2C709E46-1A75-4F73-9179-2035ABA4163C}"/>
               </a:ext>
             </a:extLst>
           </p:cNvPr>

</xml_diff>

<commit_message>
aligned gray headings on left
</commit_message>
<xml_diff>
--- a/docs/Structured Phrase Format Descriptions.pptx
+++ b/docs/Structured Phrase Format Descriptions.pptx
@@ -3798,12 +3798,12 @@
         </p:nvSpPr>
         <p:spPr>
           <a:xfrm>
-            <a:off x="839818" y="203063"/>
+            <a:off x="839818" y="197715"/>
             <a:ext cx="1184678" cy="518746"/>
           </a:xfrm>
         </p:spPr>
         <p:txBody>
-          <a:bodyPr>
+          <a:bodyPr anchor="ctr">
             <a:normAutofit/>
           </a:bodyPr>
           <a:lstStyle/>
@@ -3828,7 +3828,7 @@
         </p:nvSpPr>
         <p:spPr>
           <a:xfrm>
-            <a:off x="2119745" y="192367"/>
+            <a:off x="2119745" y="197715"/>
             <a:ext cx="9753600" cy="518746"/>
           </a:xfrm>
           <a:prstGeom prst="rect">
@@ -3836,7 +3836,7 @@
           </a:prstGeom>
         </p:spPr>
         <p:txBody>
-          <a:bodyPr vert="horz" lIns="91440" tIns="45720" rIns="91440" bIns="45720" rtlCol="0">
+          <a:bodyPr vert="horz" lIns="91440" tIns="45720" rIns="91440" bIns="45720" rtlCol="0" anchor="ctr">
             <a:noAutofit/>
           </a:bodyPr>
           <a:lstStyle>
@@ -4011,13 +4011,6 @@
               <a:rPr lang="en-US" sz="1100" dirty="0"/>
               <a:t>Side effects to treatment, important for effective evaluation of disease and treatment, based on the Common Terminology Criteria for Adverse Events (CTCAE). Based on the evaluation of the patient or patient reported symptoms, did the patient have a Grade III or Grade IV toxicity.</a:t>
             </a:r>
-          </a:p>
-          <a:p>
-            <a:pPr marL="0" indent="0">
-              <a:buFont typeface="Arial" panose="020B0604020202020204" pitchFamily="34" charset="0"/>
-              <a:buNone/>
-            </a:pPr>
-            <a:endParaRPr lang="en-US" sz="1100" dirty="0"/>
           </a:p>
         </p:txBody>
       </p:sp>
@@ -4851,7 +4844,7 @@
             </a:lvl9pPr>
           </a:lstStyle>
           <a:p>
-            <a:pPr marL="0" indent="0">
+            <a:pPr marL="0" indent="0" algn="r">
               <a:buFont typeface="Arial" panose="020B0604020202020204" pitchFamily="34" charset="0"/>
               <a:buNone/>
             </a:pPr>
@@ -5054,7 +5047,7 @@
             </a:lvl9pPr>
           </a:lstStyle>
           <a:p>
-            <a:pPr marL="0" indent="0">
+            <a:pPr marL="0" indent="0" algn="r">
               <a:buFont typeface="Arial" panose="020B0604020202020204" pitchFamily="34" charset="0"/>
               <a:buNone/>
             </a:pPr>
@@ -5267,7 +5260,7 @@
             </a:lvl9pPr>
           </a:lstStyle>
           <a:p>
-            <a:pPr marL="0" indent="0">
+            <a:pPr marL="0" indent="0" algn="r">
               <a:buFont typeface="Arial" panose="020B0604020202020204" pitchFamily="34" charset="0"/>
               <a:buNone/>
             </a:pPr>
@@ -7073,12 +7066,12 @@
         </p:nvSpPr>
         <p:spPr>
           <a:xfrm>
-            <a:off x="0" y="203063"/>
+            <a:off x="0" y="197715"/>
             <a:ext cx="2023607" cy="518746"/>
           </a:xfrm>
         </p:spPr>
         <p:txBody>
-          <a:bodyPr>
+          <a:bodyPr anchor="ctr">
             <a:noAutofit/>
           </a:bodyPr>
           <a:lstStyle/>
@@ -7103,7 +7096,7 @@
         </p:nvSpPr>
         <p:spPr>
           <a:xfrm>
-            <a:off x="2119745" y="192367"/>
+            <a:off x="2119745" y="197715"/>
             <a:ext cx="9753600" cy="518746"/>
           </a:xfrm>
           <a:prstGeom prst="rect">
@@ -7111,7 +7104,7 @@
           </a:prstGeom>
         </p:spPr>
         <p:txBody>
-          <a:bodyPr vert="horz" lIns="91440" tIns="45720" rIns="91440" bIns="45720" rtlCol="0">
+          <a:bodyPr vert="horz" lIns="91440" tIns="45720" rIns="91440" bIns="45720" rtlCol="0" anchor="ctr">
             <a:noAutofit/>
           </a:bodyPr>
           <a:lstStyle>
@@ -9676,7 +9669,7 @@
             </a:lvl9pPr>
           </a:lstStyle>
           <a:p>
-            <a:pPr marL="0" indent="0">
+            <a:pPr marL="0" indent="0" algn="r">
               <a:buFont typeface="Arial" panose="020B0604020202020204" pitchFamily="34" charset="0"/>
               <a:buNone/>
             </a:pPr>
@@ -9885,7 +9878,7 @@
             </a:lvl9pPr>
           </a:lstStyle>
           <a:p>
-            <a:pPr marL="0" indent="0">
+            <a:pPr marL="0" indent="0" algn="r">
               <a:buFont typeface="Arial" panose="020B0604020202020204" pitchFamily="34" charset="0"/>
               <a:buNone/>
             </a:pPr>
@@ -10104,7 +10097,7 @@
             </a:lvl9pPr>
           </a:lstStyle>
           <a:p>
-            <a:pPr marL="0" indent="0">
+            <a:pPr marL="0" indent="0" algn="r">
               <a:buFont typeface="Arial" panose="020B0604020202020204" pitchFamily="34" charset="0"/>
               <a:buNone/>
             </a:pPr>
@@ -10168,7 +10161,7 @@
           </a:xfrm>
         </p:spPr>
         <p:txBody>
-          <a:bodyPr>
+          <a:bodyPr anchor="ctr">
             <a:normAutofit/>
           </a:bodyPr>
           <a:lstStyle/>
@@ -10201,7 +10194,7 @@
           </a:prstGeom>
         </p:spPr>
         <p:txBody>
-          <a:bodyPr vert="horz" lIns="91440" tIns="45720" rIns="91440" bIns="45720" rtlCol="0">
+          <a:bodyPr vert="horz" lIns="91440" tIns="45720" rIns="91440" bIns="45720" rtlCol="0" anchor="ctr">
             <a:noAutofit/>
           </a:bodyPr>
           <a:lstStyle>
@@ -12751,7 +12744,7 @@
             </a:lvl9pPr>
           </a:lstStyle>
           <a:p>
-            <a:pPr marL="0" indent="0">
+            <a:pPr marL="0" indent="0" algn="r">
               <a:buFont typeface="Arial" panose="020B0604020202020204" pitchFamily="34" charset="0"/>
               <a:buNone/>
             </a:pPr>
@@ -12960,7 +12953,7 @@
             </a:lvl9pPr>
           </a:lstStyle>
           <a:p>
-            <a:pPr marL="0" indent="0">
+            <a:pPr marL="0" indent="0" algn="r">
               <a:buFont typeface="Arial" panose="020B0604020202020204" pitchFamily="34" charset="0"/>
               <a:buNone/>
             </a:pPr>
@@ -13179,7 +13172,7 @@
             </a:lvl9pPr>
           </a:lstStyle>
           <a:p>
-            <a:pPr marL="0" indent="0">
+            <a:pPr marL="0" indent="0" algn="r">
               <a:buFont typeface="Arial" panose="020B0604020202020204" pitchFamily="34" charset="0"/>
               <a:buNone/>
             </a:pPr>
@@ -13238,12 +13231,12 @@
         </p:nvSpPr>
         <p:spPr>
           <a:xfrm>
-            <a:off x="261917" y="181801"/>
+            <a:off x="261917" y="204702"/>
             <a:ext cx="1856348" cy="518746"/>
           </a:xfrm>
         </p:spPr>
         <p:txBody>
-          <a:bodyPr>
+          <a:bodyPr anchor="ctr">
             <a:normAutofit fontScale="92500"/>
           </a:bodyPr>
           <a:lstStyle/>
@@ -13268,7 +13261,7 @@
         </p:nvSpPr>
         <p:spPr>
           <a:xfrm>
-            <a:off x="2118265" y="227603"/>
+            <a:off x="2118265" y="204702"/>
             <a:ext cx="8984371" cy="518746"/>
           </a:xfrm>
           <a:prstGeom prst="rect">
@@ -13276,7 +13269,7 @@
           </a:prstGeom>
         </p:spPr>
         <p:txBody>
-          <a:bodyPr vert="horz" lIns="91440" tIns="45720" rIns="91440" bIns="45720" rtlCol="0">
+          <a:bodyPr vert="horz" lIns="91440" tIns="45720" rIns="91440" bIns="45720" rtlCol="0" anchor="ctr">
             <a:noAutofit/>
           </a:bodyPr>
           <a:lstStyle>
@@ -15649,7 +15642,7 @@
             </a:lvl9pPr>
           </a:lstStyle>
           <a:p>
-            <a:pPr marL="0" indent="0">
+            <a:pPr marL="0" indent="0" algn="r">
               <a:buFont typeface="Arial" panose="020B0604020202020204" pitchFamily="34" charset="0"/>
               <a:buNone/>
             </a:pPr>
@@ -15858,7 +15851,7 @@
             </a:lvl9pPr>
           </a:lstStyle>
           <a:p>
-            <a:pPr marL="0" indent="0">
+            <a:pPr marL="0" indent="0" algn="r">
               <a:buFont typeface="Arial" panose="020B0604020202020204" pitchFamily="34" charset="0"/>
               <a:buNone/>
             </a:pPr>
@@ -16077,7 +16070,7 @@
             </a:lvl9pPr>
           </a:lstStyle>
           <a:p>
-            <a:pPr marL="0" indent="0">
+            <a:pPr marL="0" indent="0" algn="r">
               <a:buFont typeface="Arial" panose="020B0604020202020204" pitchFamily="34" charset="0"/>
               <a:buNone/>
             </a:pPr>
@@ -16136,12 +16129,12 @@
         </p:nvSpPr>
         <p:spPr>
           <a:xfrm>
-            <a:off x="545301" y="203063"/>
+            <a:off x="545301" y="197715"/>
             <a:ext cx="1479195" cy="518746"/>
           </a:xfrm>
         </p:spPr>
         <p:txBody>
-          <a:bodyPr>
+          <a:bodyPr anchor="ctr">
             <a:noAutofit/>
           </a:bodyPr>
           <a:lstStyle/>
@@ -16166,7 +16159,7 @@
         </p:nvSpPr>
         <p:spPr>
           <a:xfrm>
-            <a:off x="2119745" y="192367"/>
+            <a:off x="2119745" y="197715"/>
             <a:ext cx="9753600" cy="518746"/>
           </a:xfrm>
           <a:prstGeom prst="rect">
@@ -16174,7 +16167,7 @@
           </a:prstGeom>
         </p:spPr>
         <p:txBody>
-          <a:bodyPr vert="horz" lIns="91440" tIns="45720" rIns="91440" bIns="45720" rtlCol="0">
+          <a:bodyPr vert="horz" lIns="91440" tIns="45720" rIns="91440" bIns="45720" rtlCol="0" anchor="ctr">
             <a:noAutofit/>
           </a:bodyPr>
           <a:lstStyle>
@@ -17930,7 +17923,7 @@
             </a:lvl9pPr>
           </a:lstStyle>
           <a:p>
-            <a:pPr marL="0" indent="0">
+            <a:pPr marL="0" indent="0" algn="r">
               <a:buFont typeface="Arial" panose="020B0604020202020204" pitchFamily="34" charset="0"/>
               <a:buNone/>
             </a:pPr>
@@ -18139,7 +18132,7 @@
             </a:lvl9pPr>
           </a:lstStyle>
           <a:p>
-            <a:pPr marL="0" indent="0">
+            <a:pPr marL="0" indent="0" algn="r">
               <a:buFont typeface="Arial" panose="020B0604020202020204" pitchFamily="34" charset="0"/>
               <a:buNone/>
             </a:pPr>
@@ -18358,7 +18351,7 @@
             </a:lvl9pPr>
           </a:lstStyle>
           <a:p>
-            <a:pPr marL="0" indent="0">
+            <a:pPr marL="0" indent="0" algn="r">
               <a:buFont typeface="Arial" panose="020B0604020202020204" pitchFamily="34" charset="0"/>
               <a:buNone/>
             </a:pPr>

</xml_diff>

<commit_message>
Updated cheat sheets for enrollment and unenrolled. Updated note parser test to correctly use enrollment. Fixed UI tests to use new enrollment hashtag for clinical trials enrollment
</commit_message>
<xml_diff>
--- a/docs/Structured Phrase Format Descriptions.pptx
+++ b/docs/Structured Phrase Format Descriptions.pptx
@@ -17474,7 +17474,7 @@
             </a:r>
             <a:r>
               <a:rPr lang="en-US" sz="1100" dirty="0"/>
-              <a:t> dates can be specified in any order.   </a:t>
+              <a:t> date can be specified in any order.   </a:t>
             </a:r>
           </a:p>
         </p:txBody>
@@ -18711,7 +18711,7 @@
             </a:pPr>
             <a:r>
               <a:rPr lang="en-US" sz="2000" dirty="0"/>
-              <a:t>Patient in </a:t>
+              <a:t>Patient </a:t>
             </a:r>
             <a:r>
               <a:rPr lang="en-US" sz="2000" dirty="0">
@@ -18719,11 +18719,11 @@
                   <a:srgbClr val="CCECFF"/>
                 </a:highlight>
               </a:rPr>
-              <a:t>#clinical trial</a:t>
+              <a:t>#unenrolled</a:t>
             </a:r>
             <a:r>
               <a:rPr lang="en-US" sz="2000" dirty="0"/>
-              <a:t> </a:t>
+              <a:t> from </a:t>
             </a:r>
             <a:r>
               <a:rPr lang="en-US" sz="2000" dirty="0">
@@ -18743,7 +18743,7 @@
                   <a:srgbClr val="CCECFF"/>
                 </a:highlight>
               </a:rPr>
-              <a:t>#enrolled on</a:t>
+              <a:t>#on</a:t>
             </a:r>
             <a:r>
               <a:rPr lang="en-US" sz="2000" dirty="0"/>
@@ -18779,7 +18779,7 @@
         </p:nvSpPr>
         <p:spPr>
           <a:xfrm>
-            <a:off x="3260779" y="1751799"/>
+            <a:off x="2919957" y="1751799"/>
             <a:ext cx="1398288" cy="518746"/>
           </a:xfrm>
           <a:prstGeom prst="rect">
@@ -18968,7 +18968,7 @@
                   <a:srgbClr val="CCECFF"/>
                 </a:highlight>
               </a:rPr>
-              <a:t>#clinical trial</a:t>
+              <a:t>#unenrolled</a:t>
             </a:r>
             <a:r>
               <a:rPr lang="en-US" sz="1100" dirty="0"/>
@@ -18987,7 +18987,7 @@
         </p:nvSpPr>
         <p:spPr>
           <a:xfrm>
-            <a:off x="4659067" y="1727671"/>
+            <a:off x="4841947" y="1727671"/>
             <a:ext cx="1280746" cy="481445"/>
           </a:xfrm>
           <a:prstGeom prst="rect">
@@ -19188,7 +19188,7 @@
         </p:nvSpPr>
         <p:spPr>
           <a:xfrm>
-            <a:off x="6098837" y="1677395"/>
+            <a:off x="6281716" y="1677395"/>
             <a:ext cx="1280746" cy="1827272"/>
           </a:xfrm>
           <a:prstGeom prst="rect">
@@ -19377,11 +19377,11 @@
                   <a:srgbClr val="CCECFF"/>
                 </a:highlight>
               </a:rPr>
-              <a:t>#enrolled on</a:t>
+              <a:t># on</a:t>
             </a:r>
             <a:r>
               <a:rPr lang="en-US" sz="1100" dirty="0"/>
-              <a:t> date is the date the patient was enrolled in the specified clinical trial.</a:t>
+              <a:t> date is the date the patient was unenrolled from the specified clinical trial.</a:t>
             </a:r>
             <a:endParaRPr lang="pt-BR" sz="1100" dirty="0">
               <a:highlight>
@@ -19582,15 +19582,7 @@
             </a:pPr>
             <a:r>
               <a:rPr lang="de-DE" sz="1600" dirty="0"/>
-              <a:t>The </a:t>
-            </a:r>
-            <a:r>
-              <a:rPr lang="de-DE" sz="1600" dirty="0" err="1"/>
-              <a:t>patient</a:t>
-            </a:r>
-            <a:r>
-              <a:rPr lang="de-DE" sz="1600" dirty="0"/>
-              <a:t> in </a:t>
+              <a:t>The patient </a:t>
             </a:r>
             <a:r>
               <a:rPr lang="en-US" sz="1600" dirty="0">
@@ -19598,7 +19590,7 @@
                   <a:srgbClr val="CCECFF"/>
                 </a:highlight>
               </a:rPr>
-              <a:t>#clinical trial</a:t>
+              <a:t>#unenrolled</a:t>
             </a:r>
             <a:r>
               <a:rPr lang="en-US" sz="1600" dirty="0"/>
@@ -19622,7 +19614,7 @@
                   <a:srgbClr val="CCECFF"/>
                 </a:highlight>
               </a:rPr>
-              <a:t>#ended on</a:t>
+              <a:t>#on</a:t>
             </a:r>
             <a:r>
               <a:rPr lang="de-DE" sz="1600" dirty="0"/>
@@ -19653,7 +19645,7 @@
         </p:nvSpPr>
         <p:spPr>
           <a:xfrm>
-            <a:off x="2888974" y="4928255"/>
+            <a:off x="3088479" y="4928255"/>
             <a:ext cx="2049280" cy="720755"/>
           </a:xfrm>
           <a:prstGeom prst="rect">
@@ -19834,7 +19826,7 @@
             </a:pPr>
             <a:r>
               <a:rPr lang="en-US" sz="1100" dirty="0"/>
-              <a:t>Trial name, </a:t>
+              <a:t>Trial name, and </a:t>
             </a:r>
             <a:r>
               <a:rPr lang="en-US" sz="1100" dirty="0">
@@ -19842,23 +19834,11 @@
                   <a:srgbClr val="CCECFF"/>
                 </a:highlight>
               </a:rPr>
-              <a:t>#enrolled on</a:t>
+              <a:t>#on</a:t>
             </a:r>
             <a:r>
               <a:rPr lang="en-US" sz="1100" dirty="0"/>
-              <a:t>, and </a:t>
-            </a:r>
-            <a:r>
-              <a:rPr lang="en-US" sz="1100" dirty="0">
-                <a:highlight>
-                  <a:srgbClr val="CCECFF"/>
-                </a:highlight>
-              </a:rPr>
-              <a:t>#ended on</a:t>
-            </a:r>
-            <a:r>
-              <a:rPr lang="en-US" sz="1100" dirty="0"/>
-              <a:t> dates can be specified in any order.   </a:t>
+              <a:t> date can be specified in any order.   </a:t>
             </a:r>
           </a:p>
         </p:txBody>
@@ -19871,7 +19851,7 @@
         </p:nvCxnSpPr>
         <p:spPr>
           <a:xfrm flipH="1" flipV="1">
-            <a:off x="4700155" y="1292217"/>
+            <a:off x="4883035" y="1292217"/>
             <a:ext cx="2738" cy="350040"/>
           </a:xfrm>
           <a:prstGeom prst="line">
@@ -19906,7 +19886,7 @@
         </p:nvCxnSpPr>
         <p:spPr>
           <a:xfrm flipH="1" flipV="1">
-            <a:off x="6198378" y="1294405"/>
+            <a:off x="6381257" y="1294405"/>
             <a:ext cx="2738" cy="350040"/>
           </a:xfrm>
           <a:prstGeom prst="line">
@@ -19943,7 +19923,7 @@
         </p:nvCxnSpPr>
         <p:spPr>
           <a:xfrm flipH="1" flipV="1">
-            <a:off x="3347979" y="1324357"/>
+            <a:off x="3007157" y="1324357"/>
             <a:ext cx="2738" cy="350040"/>
           </a:xfrm>
           <a:prstGeom prst="line">
@@ -19972,531 +19952,13 @@
       </p:cxnSp>
       <p:cxnSp>
         <p:nvCxnSpPr>
-          <p:cNvPr id="21" name="Straight Connector 20"/>
-          <p:cNvCxnSpPr/>
-          <p:nvPr/>
-        </p:nvCxnSpPr>
-        <p:spPr>
-          <a:xfrm flipV="1">
-            <a:off x="5299440" y="4432701"/>
-            <a:ext cx="0" cy="450443"/>
-          </a:xfrm>
-          <a:prstGeom prst="line">
-            <a:avLst/>
-          </a:prstGeom>
-          <a:ln>
-            <a:solidFill>
-              <a:schemeClr val="tx1"/>
-            </a:solidFill>
-          </a:ln>
-        </p:spPr>
-        <p:style>
-          <a:lnRef idx="1">
-            <a:schemeClr val="accent1"/>
-          </a:lnRef>
-          <a:fillRef idx="0">
-            <a:schemeClr val="accent1"/>
-          </a:fillRef>
-          <a:effectRef idx="0">
-            <a:schemeClr val="accent1"/>
-          </a:effectRef>
-          <a:fontRef idx="minor">
-            <a:schemeClr val="tx1"/>
-          </a:fontRef>
-        </p:style>
-      </p:cxnSp>
-      <p:sp>
-        <p:nvSpPr>
-          <p:cNvPr id="25" name="Content Placeholder 2"/>
-          <p:cNvSpPr txBox="1">
-            <a:spLocks/>
-          </p:cNvSpPr>
-          <p:nvPr/>
-        </p:nvSpPr>
-        <p:spPr>
-          <a:xfrm>
-            <a:off x="5173738" y="4951301"/>
-            <a:ext cx="2049280" cy="720755"/>
-          </a:xfrm>
-          <a:prstGeom prst="rect">
-            <a:avLst/>
-          </a:prstGeom>
-        </p:spPr>
-        <p:txBody>
-          <a:bodyPr vert="horz" lIns="91440" tIns="45720" rIns="91440" bIns="45720" rtlCol="0">
-            <a:noAutofit/>
-          </a:bodyPr>
-          <a:lstStyle>
-            <a:lvl1pPr marL="228600" indent="-228600" algn="l" defTabSz="914400" rtl="0" eaLnBrk="1" latinLnBrk="0" hangingPunct="1">
-              <a:lnSpc>
-                <a:spcPct val="90000"/>
-              </a:lnSpc>
-              <a:spcBef>
-                <a:spcPts val="1000"/>
-              </a:spcBef>
-              <a:buFont typeface="Arial" panose="020B0604020202020204" pitchFamily="34" charset="0"/>
-              <a:buChar char="•"/>
-              <a:defRPr sz="2800" kern="1200">
-                <a:solidFill>
-                  <a:schemeClr val="tx1"/>
-                </a:solidFill>
-                <a:latin typeface="+mn-lt"/>
-                <a:ea typeface="+mn-ea"/>
-                <a:cs typeface="+mn-cs"/>
-              </a:defRPr>
-            </a:lvl1pPr>
-            <a:lvl2pPr marL="685800" indent="-228600" algn="l" defTabSz="914400" rtl="0" eaLnBrk="1" latinLnBrk="0" hangingPunct="1">
-              <a:lnSpc>
-                <a:spcPct val="90000"/>
-              </a:lnSpc>
-              <a:spcBef>
-                <a:spcPts val="500"/>
-              </a:spcBef>
-              <a:buFont typeface="Arial" panose="020B0604020202020204" pitchFamily="34" charset="0"/>
-              <a:buChar char="•"/>
-              <a:defRPr sz="2400" kern="1200">
-                <a:solidFill>
-                  <a:schemeClr val="tx1"/>
-                </a:solidFill>
-                <a:latin typeface="+mn-lt"/>
-                <a:ea typeface="+mn-ea"/>
-                <a:cs typeface="+mn-cs"/>
-              </a:defRPr>
-            </a:lvl2pPr>
-            <a:lvl3pPr marL="1143000" indent="-228600" algn="l" defTabSz="914400" rtl="0" eaLnBrk="1" latinLnBrk="0" hangingPunct="1">
-              <a:lnSpc>
-                <a:spcPct val="90000"/>
-              </a:lnSpc>
-              <a:spcBef>
-                <a:spcPts val="500"/>
-              </a:spcBef>
-              <a:buFont typeface="Arial" panose="020B0604020202020204" pitchFamily="34" charset="0"/>
-              <a:buChar char="•"/>
-              <a:defRPr sz="2000" kern="1200">
-                <a:solidFill>
-                  <a:schemeClr val="tx1"/>
-                </a:solidFill>
-                <a:latin typeface="+mn-lt"/>
-                <a:ea typeface="+mn-ea"/>
-                <a:cs typeface="+mn-cs"/>
-              </a:defRPr>
-            </a:lvl3pPr>
-            <a:lvl4pPr marL="1600200" indent="-228600" algn="l" defTabSz="914400" rtl="0" eaLnBrk="1" latinLnBrk="0" hangingPunct="1">
-              <a:lnSpc>
-                <a:spcPct val="90000"/>
-              </a:lnSpc>
-              <a:spcBef>
-                <a:spcPts val="500"/>
-              </a:spcBef>
-              <a:buFont typeface="Arial" panose="020B0604020202020204" pitchFamily="34" charset="0"/>
-              <a:buChar char="•"/>
-              <a:defRPr sz="1800" kern="1200">
-                <a:solidFill>
-                  <a:schemeClr val="tx1"/>
-                </a:solidFill>
-                <a:latin typeface="+mn-lt"/>
-                <a:ea typeface="+mn-ea"/>
-                <a:cs typeface="+mn-cs"/>
-              </a:defRPr>
-            </a:lvl4pPr>
-            <a:lvl5pPr marL="2057400" indent="-228600" algn="l" defTabSz="914400" rtl="0" eaLnBrk="1" latinLnBrk="0" hangingPunct="1">
-              <a:lnSpc>
-                <a:spcPct val="90000"/>
-              </a:lnSpc>
-              <a:spcBef>
-                <a:spcPts val="500"/>
-              </a:spcBef>
-              <a:buFont typeface="Arial" panose="020B0604020202020204" pitchFamily="34" charset="0"/>
-              <a:buChar char="•"/>
-              <a:defRPr sz="1800" kern="1200">
-                <a:solidFill>
-                  <a:schemeClr val="tx1"/>
-                </a:solidFill>
-                <a:latin typeface="+mn-lt"/>
-                <a:ea typeface="+mn-ea"/>
-                <a:cs typeface="+mn-cs"/>
-              </a:defRPr>
-            </a:lvl5pPr>
-            <a:lvl6pPr marL="2514600" indent="-228600" algn="l" defTabSz="914400" rtl="0" eaLnBrk="1" latinLnBrk="0" hangingPunct="1">
-              <a:lnSpc>
-                <a:spcPct val="90000"/>
-              </a:lnSpc>
-              <a:spcBef>
-                <a:spcPts val="500"/>
-              </a:spcBef>
-              <a:buFont typeface="Arial" panose="020B0604020202020204" pitchFamily="34" charset="0"/>
-              <a:buChar char="•"/>
-              <a:defRPr sz="1800" kern="1200">
-                <a:solidFill>
-                  <a:schemeClr val="tx1"/>
-                </a:solidFill>
-                <a:latin typeface="+mn-lt"/>
-                <a:ea typeface="+mn-ea"/>
-                <a:cs typeface="+mn-cs"/>
-              </a:defRPr>
-            </a:lvl6pPr>
-            <a:lvl7pPr marL="2971800" indent="-228600" algn="l" defTabSz="914400" rtl="0" eaLnBrk="1" latinLnBrk="0" hangingPunct="1">
-              <a:lnSpc>
-                <a:spcPct val="90000"/>
-              </a:lnSpc>
-              <a:spcBef>
-                <a:spcPts val="500"/>
-              </a:spcBef>
-              <a:buFont typeface="Arial" panose="020B0604020202020204" pitchFamily="34" charset="0"/>
-              <a:buChar char="•"/>
-              <a:defRPr sz="1800" kern="1200">
-                <a:solidFill>
-                  <a:schemeClr val="tx1"/>
-                </a:solidFill>
-                <a:latin typeface="+mn-lt"/>
-                <a:ea typeface="+mn-ea"/>
-                <a:cs typeface="+mn-cs"/>
-              </a:defRPr>
-            </a:lvl7pPr>
-            <a:lvl8pPr marL="3429000" indent="-228600" algn="l" defTabSz="914400" rtl="0" eaLnBrk="1" latinLnBrk="0" hangingPunct="1">
-              <a:lnSpc>
-                <a:spcPct val="90000"/>
-              </a:lnSpc>
-              <a:spcBef>
-                <a:spcPts val="500"/>
-              </a:spcBef>
-              <a:buFont typeface="Arial" panose="020B0604020202020204" pitchFamily="34" charset="0"/>
-              <a:buChar char="•"/>
-              <a:defRPr sz="1800" kern="1200">
-                <a:solidFill>
-                  <a:schemeClr val="tx1"/>
-                </a:solidFill>
-                <a:latin typeface="+mn-lt"/>
-                <a:ea typeface="+mn-ea"/>
-                <a:cs typeface="+mn-cs"/>
-              </a:defRPr>
-            </a:lvl8pPr>
-            <a:lvl9pPr marL="3886200" indent="-228600" algn="l" defTabSz="914400" rtl="0" eaLnBrk="1" latinLnBrk="0" hangingPunct="1">
-              <a:lnSpc>
-                <a:spcPct val="90000"/>
-              </a:lnSpc>
-              <a:spcBef>
-                <a:spcPts val="500"/>
-              </a:spcBef>
-              <a:buFont typeface="Arial" panose="020B0604020202020204" pitchFamily="34" charset="0"/>
-              <a:buChar char="•"/>
-              <a:defRPr sz="1800" kern="1200">
-                <a:solidFill>
-                  <a:schemeClr val="tx1"/>
-                </a:solidFill>
-                <a:latin typeface="+mn-lt"/>
-                <a:ea typeface="+mn-ea"/>
-                <a:cs typeface="+mn-cs"/>
-              </a:defRPr>
-            </a:lvl9pPr>
-          </a:lstStyle>
-          <a:p>
-            <a:pPr marL="0" indent="0">
-              <a:buNone/>
-            </a:pPr>
-            <a:r>
-              <a:rPr lang="en-US" sz="1100" dirty="0"/>
-              <a:t>The </a:t>
-            </a:r>
-            <a:r>
-              <a:rPr lang="en-US" sz="1100" dirty="0">
-                <a:highlight>
-                  <a:srgbClr val="CCECFF"/>
-                </a:highlight>
-              </a:rPr>
-              <a:t>#ended on</a:t>
-            </a:r>
-            <a:r>
-              <a:rPr lang="en-US" sz="1100" dirty="0"/>
-              <a:t>  date is the date the patient ended or left the specified clinical trial.</a:t>
-            </a:r>
-          </a:p>
-        </p:txBody>
-      </p:sp>
-      <p:cxnSp>
-        <p:nvCxnSpPr>
           <p:cNvPr id="26" name="Straight Connector 25"/>
           <p:cNvCxnSpPr/>
           <p:nvPr/>
         </p:nvCxnSpPr>
         <p:spPr>
           <a:xfrm flipV="1">
-            <a:off x="4509927" y="4432701"/>
-            <a:ext cx="0" cy="450443"/>
-          </a:xfrm>
-          <a:prstGeom prst="line">
-            <a:avLst/>
-          </a:prstGeom>
-          <a:ln>
-            <a:solidFill>
-              <a:schemeClr val="tx1"/>
-            </a:solidFill>
-          </a:ln>
-        </p:spPr>
-        <p:style>
-          <a:lnRef idx="1">
-            <a:schemeClr val="accent1"/>
-          </a:lnRef>
-          <a:fillRef idx="0">
-            <a:schemeClr val="accent1"/>
-          </a:fillRef>
-          <a:effectRef idx="0">
-            <a:schemeClr val="accent1"/>
-          </a:effectRef>
-          <a:fontRef idx="minor">
-            <a:schemeClr val="tx1"/>
-          </a:fontRef>
-        </p:style>
-      </p:cxnSp>
-      <p:sp>
-        <p:nvSpPr>
-          <p:cNvPr id="19" name="Content Placeholder 2"/>
-          <p:cNvSpPr txBox="1">
-            <a:spLocks/>
-          </p:cNvSpPr>
-          <p:nvPr/>
-        </p:nvSpPr>
-        <p:spPr>
-          <a:xfrm>
-            <a:off x="7119696" y="4951301"/>
-            <a:ext cx="2049280" cy="837914"/>
-          </a:xfrm>
-          <a:prstGeom prst="rect">
-            <a:avLst/>
-          </a:prstGeom>
-        </p:spPr>
-        <p:txBody>
-          <a:bodyPr vert="horz" lIns="91440" tIns="45720" rIns="91440" bIns="45720" rtlCol="0">
-            <a:noAutofit/>
-          </a:bodyPr>
-          <a:lstStyle>
-            <a:lvl1pPr marL="228600" indent="-228600" algn="l" defTabSz="914400" rtl="0" eaLnBrk="1" latinLnBrk="0" hangingPunct="1">
-              <a:lnSpc>
-                <a:spcPct val="90000"/>
-              </a:lnSpc>
-              <a:spcBef>
-                <a:spcPts val="1000"/>
-              </a:spcBef>
-              <a:buFont typeface="Arial" panose="020B0604020202020204" pitchFamily="34" charset="0"/>
-              <a:buChar char="•"/>
-              <a:defRPr sz="2800" kern="1200">
-                <a:solidFill>
-                  <a:schemeClr val="tx1"/>
-                </a:solidFill>
-                <a:latin typeface="+mn-lt"/>
-                <a:ea typeface="+mn-ea"/>
-                <a:cs typeface="+mn-cs"/>
-              </a:defRPr>
-            </a:lvl1pPr>
-            <a:lvl2pPr marL="685800" indent="-228600" algn="l" defTabSz="914400" rtl="0" eaLnBrk="1" latinLnBrk="0" hangingPunct="1">
-              <a:lnSpc>
-                <a:spcPct val="90000"/>
-              </a:lnSpc>
-              <a:spcBef>
-                <a:spcPts val="500"/>
-              </a:spcBef>
-              <a:buFont typeface="Arial" panose="020B0604020202020204" pitchFamily="34" charset="0"/>
-              <a:buChar char="•"/>
-              <a:defRPr sz="2400" kern="1200">
-                <a:solidFill>
-                  <a:schemeClr val="tx1"/>
-                </a:solidFill>
-                <a:latin typeface="+mn-lt"/>
-                <a:ea typeface="+mn-ea"/>
-                <a:cs typeface="+mn-cs"/>
-              </a:defRPr>
-            </a:lvl2pPr>
-            <a:lvl3pPr marL="1143000" indent="-228600" algn="l" defTabSz="914400" rtl="0" eaLnBrk="1" latinLnBrk="0" hangingPunct="1">
-              <a:lnSpc>
-                <a:spcPct val="90000"/>
-              </a:lnSpc>
-              <a:spcBef>
-                <a:spcPts val="500"/>
-              </a:spcBef>
-              <a:buFont typeface="Arial" panose="020B0604020202020204" pitchFamily="34" charset="0"/>
-              <a:buChar char="•"/>
-              <a:defRPr sz="2000" kern="1200">
-                <a:solidFill>
-                  <a:schemeClr val="tx1"/>
-                </a:solidFill>
-                <a:latin typeface="+mn-lt"/>
-                <a:ea typeface="+mn-ea"/>
-                <a:cs typeface="+mn-cs"/>
-              </a:defRPr>
-            </a:lvl3pPr>
-            <a:lvl4pPr marL="1600200" indent="-228600" algn="l" defTabSz="914400" rtl="0" eaLnBrk="1" latinLnBrk="0" hangingPunct="1">
-              <a:lnSpc>
-                <a:spcPct val="90000"/>
-              </a:lnSpc>
-              <a:spcBef>
-                <a:spcPts val="500"/>
-              </a:spcBef>
-              <a:buFont typeface="Arial" panose="020B0604020202020204" pitchFamily="34" charset="0"/>
-              <a:buChar char="•"/>
-              <a:defRPr sz="1800" kern="1200">
-                <a:solidFill>
-                  <a:schemeClr val="tx1"/>
-                </a:solidFill>
-                <a:latin typeface="+mn-lt"/>
-                <a:ea typeface="+mn-ea"/>
-                <a:cs typeface="+mn-cs"/>
-              </a:defRPr>
-            </a:lvl4pPr>
-            <a:lvl5pPr marL="2057400" indent="-228600" algn="l" defTabSz="914400" rtl="0" eaLnBrk="1" latinLnBrk="0" hangingPunct="1">
-              <a:lnSpc>
-                <a:spcPct val="90000"/>
-              </a:lnSpc>
-              <a:spcBef>
-                <a:spcPts val="500"/>
-              </a:spcBef>
-              <a:buFont typeface="Arial" panose="020B0604020202020204" pitchFamily="34" charset="0"/>
-              <a:buChar char="•"/>
-              <a:defRPr sz="1800" kern="1200">
-                <a:solidFill>
-                  <a:schemeClr val="tx1"/>
-                </a:solidFill>
-                <a:latin typeface="+mn-lt"/>
-                <a:ea typeface="+mn-ea"/>
-                <a:cs typeface="+mn-cs"/>
-              </a:defRPr>
-            </a:lvl5pPr>
-            <a:lvl6pPr marL="2514600" indent="-228600" algn="l" defTabSz="914400" rtl="0" eaLnBrk="1" latinLnBrk="0" hangingPunct="1">
-              <a:lnSpc>
-                <a:spcPct val="90000"/>
-              </a:lnSpc>
-              <a:spcBef>
-                <a:spcPts val="500"/>
-              </a:spcBef>
-              <a:buFont typeface="Arial" panose="020B0604020202020204" pitchFamily="34" charset="0"/>
-              <a:buChar char="•"/>
-              <a:defRPr sz="1800" kern="1200">
-                <a:solidFill>
-                  <a:schemeClr val="tx1"/>
-                </a:solidFill>
-                <a:latin typeface="+mn-lt"/>
-                <a:ea typeface="+mn-ea"/>
-                <a:cs typeface="+mn-cs"/>
-              </a:defRPr>
-            </a:lvl6pPr>
-            <a:lvl7pPr marL="2971800" indent="-228600" algn="l" defTabSz="914400" rtl="0" eaLnBrk="1" latinLnBrk="0" hangingPunct="1">
-              <a:lnSpc>
-                <a:spcPct val="90000"/>
-              </a:lnSpc>
-              <a:spcBef>
-                <a:spcPts val="500"/>
-              </a:spcBef>
-              <a:buFont typeface="Arial" panose="020B0604020202020204" pitchFamily="34" charset="0"/>
-              <a:buChar char="•"/>
-              <a:defRPr sz="1800" kern="1200">
-                <a:solidFill>
-                  <a:schemeClr val="tx1"/>
-                </a:solidFill>
-                <a:latin typeface="+mn-lt"/>
-                <a:ea typeface="+mn-ea"/>
-                <a:cs typeface="+mn-cs"/>
-              </a:defRPr>
-            </a:lvl7pPr>
-            <a:lvl8pPr marL="3429000" indent="-228600" algn="l" defTabSz="914400" rtl="0" eaLnBrk="1" latinLnBrk="0" hangingPunct="1">
-              <a:lnSpc>
-                <a:spcPct val="90000"/>
-              </a:lnSpc>
-              <a:spcBef>
-                <a:spcPts val="500"/>
-              </a:spcBef>
-              <a:buFont typeface="Arial" panose="020B0604020202020204" pitchFamily="34" charset="0"/>
-              <a:buChar char="•"/>
-              <a:defRPr sz="1800" kern="1200">
-                <a:solidFill>
-                  <a:schemeClr val="tx1"/>
-                </a:solidFill>
-                <a:latin typeface="+mn-lt"/>
-                <a:ea typeface="+mn-ea"/>
-                <a:cs typeface="+mn-cs"/>
-              </a:defRPr>
-            </a:lvl8pPr>
-            <a:lvl9pPr marL="3886200" indent="-228600" algn="l" defTabSz="914400" rtl="0" eaLnBrk="1" latinLnBrk="0" hangingPunct="1">
-              <a:lnSpc>
-                <a:spcPct val="90000"/>
-              </a:lnSpc>
-              <a:spcBef>
-                <a:spcPts val="500"/>
-              </a:spcBef>
-              <a:buFont typeface="Arial" panose="020B0604020202020204" pitchFamily="34" charset="0"/>
-              <a:buChar char="•"/>
-              <a:defRPr sz="1800" kern="1200">
-                <a:solidFill>
-                  <a:schemeClr val="tx1"/>
-                </a:solidFill>
-                <a:latin typeface="+mn-lt"/>
-                <a:ea typeface="+mn-ea"/>
-                <a:cs typeface="+mn-cs"/>
-              </a:defRPr>
-            </a:lvl9pPr>
-          </a:lstStyle>
-          <a:p>
-            <a:pPr marL="0" indent="0">
-              <a:buNone/>
-            </a:pPr>
-            <a:r>
-              <a:rPr lang="en-US" sz="1100" dirty="0"/>
-              <a:t>Either </a:t>
-            </a:r>
-            <a:r>
-              <a:rPr lang="en-US" sz="1100" dirty="0">
-                <a:highlight>
-                  <a:srgbClr val="CCECFF"/>
-                </a:highlight>
-              </a:rPr>
-              <a:t>#enrolled on</a:t>
-            </a:r>
-            <a:r>
-              <a:rPr lang="en-US" sz="1100" dirty="0"/>
-              <a:t> or </a:t>
-            </a:r>
-            <a:r>
-              <a:rPr lang="en-US" sz="1100" dirty="0">
-                <a:highlight>
-                  <a:srgbClr val="CCECFF"/>
-                </a:highlight>
-              </a:rPr>
-              <a:t>#ended on</a:t>
-            </a:r>
-            <a:r>
-              <a:rPr lang="en-US" sz="1100" dirty="0"/>
-              <a:t>  date can be specified. Both </a:t>
-            </a:r>
-            <a:r>
-              <a:rPr lang="en-US" sz="1100"/>
-              <a:t>dates cannot </a:t>
-            </a:r>
-            <a:r>
-              <a:rPr lang="en-US" sz="1100" dirty="0"/>
-              <a:t>be specified within the same </a:t>
-            </a:r>
-            <a:r>
-              <a:rPr lang="en-US" sz="1100" dirty="0">
-                <a:highlight>
-                  <a:srgbClr val="CCECFF"/>
-                </a:highlight>
-              </a:rPr>
-              <a:t>#clinical trial</a:t>
-            </a:r>
-            <a:r>
-              <a:rPr lang="en-US" sz="1100" dirty="0"/>
-              <a:t> structured phrase.</a:t>
-            </a:r>
-          </a:p>
-        </p:txBody>
-      </p:sp>
-      <p:cxnSp>
-        <p:nvCxnSpPr>
-          <p:cNvPr id="20" name="Straight Connector 19"/>
-          <p:cNvCxnSpPr/>
-          <p:nvPr/>
-        </p:nvCxnSpPr>
-        <p:spPr>
-          <a:xfrm flipV="1">
-            <a:off x="7224621" y="4432701"/>
+            <a:off x="3179891" y="4477812"/>
             <a:ext cx="0" cy="450443"/>
           </a:xfrm>
           <a:prstGeom prst="line">

</xml_diff>

<commit_message>
Updated cheat sheets (removed #on). Added cheat sheet for unenrolled and added form for hit in slim mode (currently just using the enrollment form). Fixed Shortcuts.json so no longer need #on for enrollment. Fixed broken tests for enrollment
</commit_message>
<xml_diff>
--- a/docs/Structured Phrase Format Descriptions.pptx
+++ b/docs/Structured Phrase Format Descriptions.pptx
@@ -210,7 +210,7 @@
           <a:p>
             <a:fld id="{21E832DA-B4D8-4D11-8E14-97F9DC272DA8}" type="datetimeFigureOut">
               <a:rPr lang="en-US" smtClean="0"/>
-              <a:t>2/15/2018</a:t>
+              <a:t>2/16/2018</a:t>
             </a:fld>
             <a:endParaRPr lang="en-US"/>
           </a:p>
@@ -1362,7 +1362,7 @@
           <a:p>
             <a:fld id="{0EB9FD00-C173-4304-AF07-4E0E5F6E2284}" type="datetimeFigureOut">
               <a:rPr lang="en-US" smtClean="0"/>
-              <a:t>2/15/2018</a:t>
+              <a:t>2/16/2018</a:t>
             </a:fld>
             <a:endParaRPr lang="en-US"/>
           </a:p>
@@ -1530,7 +1530,7 @@
           <a:p>
             <a:fld id="{0EB9FD00-C173-4304-AF07-4E0E5F6E2284}" type="datetimeFigureOut">
               <a:rPr lang="en-US" smtClean="0"/>
-              <a:t>2/15/2018</a:t>
+              <a:t>2/16/2018</a:t>
             </a:fld>
             <a:endParaRPr lang="en-US"/>
           </a:p>
@@ -1708,7 +1708,7 @@
           <a:p>
             <a:fld id="{0EB9FD00-C173-4304-AF07-4E0E5F6E2284}" type="datetimeFigureOut">
               <a:rPr lang="en-US" smtClean="0"/>
-              <a:t>2/15/2018</a:t>
+              <a:t>2/16/2018</a:t>
             </a:fld>
             <a:endParaRPr lang="en-US"/>
           </a:p>
@@ -1876,7 +1876,7 @@
           <a:p>
             <a:fld id="{0EB9FD00-C173-4304-AF07-4E0E5F6E2284}" type="datetimeFigureOut">
               <a:rPr lang="en-US" smtClean="0"/>
-              <a:t>2/15/2018</a:t>
+              <a:t>2/16/2018</a:t>
             </a:fld>
             <a:endParaRPr lang="en-US"/>
           </a:p>
@@ -2121,7 +2121,7 @@
           <a:p>
             <a:fld id="{0EB9FD00-C173-4304-AF07-4E0E5F6E2284}" type="datetimeFigureOut">
               <a:rPr lang="en-US" smtClean="0"/>
-              <a:t>2/15/2018</a:t>
+              <a:t>2/16/2018</a:t>
             </a:fld>
             <a:endParaRPr lang="en-US"/>
           </a:p>
@@ -2350,7 +2350,7 @@
           <a:p>
             <a:fld id="{0EB9FD00-C173-4304-AF07-4E0E5F6E2284}" type="datetimeFigureOut">
               <a:rPr lang="en-US" smtClean="0"/>
-              <a:t>2/15/2018</a:t>
+              <a:t>2/16/2018</a:t>
             </a:fld>
             <a:endParaRPr lang="en-US"/>
           </a:p>
@@ -2714,7 +2714,7 @@
           <a:p>
             <a:fld id="{0EB9FD00-C173-4304-AF07-4E0E5F6E2284}" type="datetimeFigureOut">
               <a:rPr lang="en-US" smtClean="0"/>
-              <a:t>2/15/2018</a:t>
+              <a:t>2/16/2018</a:t>
             </a:fld>
             <a:endParaRPr lang="en-US"/>
           </a:p>
@@ -2831,7 +2831,7 @@
           <a:p>
             <a:fld id="{0EB9FD00-C173-4304-AF07-4E0E5F6E2284}" type="datetimeFigureOut">
               <a:rPr lang="en-US" smtClean="0"/>
-              <a:t>2/15/2018</a:t>
+              <a:t>2/16/2018</a:t>
             </a:fld>
             <a:endParaRPr lang="en-US"/>
           </a:p>
@@ -2926,7 +2926,7 @@
           <a:p>
             <a:fld id="{0EB9FD00-C173-4304-AF07-4E0E5F6E2284}" type="datetimeFigureOut">
               <a:rPr lang="en-US" smtClean="0"/>
-              <a:t>2/15/2018</a:t>
+              <a:t>2/16/2018</a:t>
             </a:fld>
             <a:endParaRPr lang="en-US"/>
           </a:p>
@@ -3201,7 +3201,7 @@
           <a:p>
             <a:fld id="{0EB9FD00-C173-4304-AF07-4E0E5F6E2284}" type="datetimeFigureOut">
               <a:rPr lang="en-US" smtClean="0"/>
-              <a:t>2/15/2018</a:t>
+              <a:t>2/16/2018</a:t>
             </a:fld>
             <a:endParaRPr lang="en-US"/>
           </a:p>
@@ -3453,7 +3453,7 @@
           <a:p>
             <a:fld id="{0EB9FD00-C173-4304-AF07-4E0E5F6E2284}" type="datetimeFigureOut">
               <a:rPr lang="en-US" smtClean="0"/>
-              <a:t>2/15/2018</a:t>
+              <a:t>2/16/2018</a:t>
             </a:fld>
             <a:endParaRPr lang="en-US"/>
           </a:p>
@@ -3664,7 +3664,7 @@
           <a:p>
             <a:fld id="{0EB9FD00-C173-4304-AF07-4E0E5F6E2284}" type="datetimeFigureOut">
               <a:rPr lang="en-US" smtClean="0"/>
-              <a:t>2/15/2018</a:t>
+              <a:t>2/16/2018</a:t>
             </a:fld>
             <a:endParaRPr lang="en-US"/>
           </a:p>
@@ -16379,18 +16379,6 @@
                   <a:srgbClr val="CCECFF"/>
                 </a:highlight>
               </a:rPr>
-              <a:t>#on</a:t>
-            </a:r>
-            <a:r>
-              <a:rPr lang="en-US" sz="2000" dirty="0"/>
-              <a:t> </a:t>
-            </a:r>
-            <a:r>
-              <a:rPr lang="en-US" sz="2000" dirty="0">
-                <a:highlight>
-                  <a:srgbClr val="CCECFF"/>
-                </a:highlight>
-              </a:rPr>
               <a:t>#01/01/2017</a:t>
             </a:r>
             <a:r>
@@ -17013,11 +17001,11 @@
                   <a:srgbClr val="CCECFF"/>
                 </a:highlight>
               </a:rPr>
-              <a:t>#on</a:t>
+              <a:t>#enrollment date</a:t>
             </a:r>
             <a:r>
               <a:rPr lang="en-US" sz="1100" dirty="0"/>
-              <a:t> date is the date the patient was enrolled in the specified clinical trial.</a:t>
+              <a:t> is the date the patient was enrolled in the specified clinical trial.</a:t>
             </a:r>
             <a:endParaRPr lang="pt-BR" sz="1100" dirty="0">
               <a:highlight>
@@ -17250,18 +17238,6 @@
                   <a:srgbClr val="CCECFF"/>
                 </a:highlight>
               </a:rPr>
-              <a:t>#on</a:t>
-            </a:r>
-            <a:r>
-              <a:rPr lang="de-DE" sz="1600" dirty="0"/>
-              <a:t> </a:t>
-            </a:r>
-            <a:r>
-              <a:rPr lang="en-US" sz="1600" dirty="0">
-                <a:highlight>
-                  <a:srgbClr val="CCECFF"/>
-                </a:highlight>
-              </a:rPr>
               <a:t>#01/01/2017</a:t>
             </a:r>
             <a:r>
@@ -17470,11 +17446,11 @@
                   <a:srgbClr val="CCECFF"/>
                 </a:highlight>
               </a:rPr>
-              <a:t>#on</a:t>
+              <a:t>#enrollment date</a:t>
             </a:r>
             <a:r>
               <a:rPr lang="en-US" sz="1100" dirty="0"/>
-              <a:t> date can be specified in any order.   </a:t>
+              <a:t> can be specified in any order.   </a:t>
             </a:r>
           </a:p>
         </p:txBody>
@@ -18743,18 +18719,6 @@
                   <a:srgbClr val="CCECFF"/>
                 </a:highlight>
               </a:rPr>
-              <a:t>#on</a:t>
-            </a:r>
-            <a:r>
-              <a:rPr lang="en-US" sz="2000" dirty="0"/>
-              <a:t> </a:t>
-            </a:r>
-            <a:r>
-              <a:rPr lang="en-US" sz="2000" dirty="0">
-                <a:highlight>
-                  <a:srgbClr val="CCECFF"/>
-                </a:highlight>
-              </a:rPr>
               <a:t>#01/01/2017</a:t>
             </a:r>
             <a:r>
@@ -18987,7 +18951,7 @@
         </p:nvSpPr>
         <p:spPr>
           <a:xfrm>
-            <a:off x="4841947" y="1727671"/>
+            <a:off x="4771611" y="1727671"/>
             <a:ext cx="1280746" cy="481445"/>
           </a:xfrm>
           <a:prstGeom prst="rect">
@@ -19377,11 +19341,11 @@
                   <a:srgbClr val="CCECFF"/>
                 </a:highlight>
               </a:rPr>
-              <a:t># on</a:t>
+              <a:t>#end date</a:t>
             </a:r>
             <a:r>
               <a:rPr lang="en-US" sz="1100" dirty="0"/>
-              <a:t> date is the date the patient was unenrolled from the specified clinical trial.</a:t>
+              <a:t> is the date the patient was unenrolled from the specified clinical trial.</a:t>
             </a:r>
             <a:endParaRPr lang="pt-BR" sz="1100" dirty="0">
               <a:highlight>
@@ -19614,18 +19578,6 @@
                   <a:srgbClr val="CCECFF"/>
                 </a:highlight>
               </a:rPr>
-              <a:t>#on</a:t>
-            </a:r>
-            <a:r>
-              <a:rPr lang="de-DE" sz="1600" dirty="0"/>
-              <a:t> </a:t>
-            </a:r>
-            <a:r>
-              <a:rPr lang="en-US" sz="1600" dirty="0">
-                <a:highlight>
-                  <a:srgbClr val="CCECFF"/>
-                </a:highlight>
-              </a:rPr>
               <a:t>#10/10/2017</a:t>
             </a:r>
             <a:r>
@@ -19834,11 +19786,11 @@
                   <a:srgbClr val="CCECFF"/>
                 </a:highlight>
               </a:rPr>
-              <a:t>#on</a:t>
+              <a:t>#end date</a:t>
             </a:r>
             <a:r>
               <a:rPr lang="en-US" sz="1100" dirty="0"/>
-              <a:t> date can be specified in any order.   </a:t>
+              <a:t> can be specified in any order.   </a:t>
             </a:r>
           </a:p>
         </p:txBody>

</xml_diff>

<commit_message>
Updated toxicity slide in shortcut documentation.
</commit_message>
<xml_diff>
--- a/docs/Structured Phrase Format Descriptions.pptx
+++ b/docs/Structured Phrase Format Descriptions.pptx
@@ -124,10 +124,6 @@
 </p:presentation>
 </file>
 
-<file path=ppt/revisionInfo.xml><?xml version="1.0" encoding="utf-8"?>
-<p1510:revInfo xmlns:a="http://schemas.openxmlformats.org/drawingml/2006/main" xmlns:r="http://schemas.openxmlformats.org/officeDocument/2006/relationships" xmlns:p1510="http://schemas.microsoft.com/office/powerpoint/2015/10/main"/>
-</file>
-
 <file path=ppt/notesMasters/notesMaster1.xml><?xml version="1.0" encoding="utf-8"?>
 <p:notesMaster xmlns:a="http://schemas.openxmlformats.org/drawingml/2006/main" xmlns:r="http://schemas.openxmlformats.org/officeDocument/2006/relationships" xmlns:p="http://schemas.openxmlformats.org/presentationml/2006/main">
   <p:cSld>
@@ -210,7 +206,7 @@
           <a:p>
             <a:fld id="{21E832DA-B4D8-4D11-8E14-97F9DC272DA8}" type="datetimeFigureOut">
               <a:rPr lang="en-US" smtClean="0"/>
-              <a:t>2/16/2018</a:t>
+              <a:t>8/1/18</a:t>
             </a:fld>
             <a:endParaRPr lang="en-US"/>
           </a:p>
@@ -1362,7 +1358,7 @@
           <a:p>
             <a:fld id="{0EB9FD00-C173-4304-AF07-4E0E5F6E2284}" type="datetimeFigureOut">
               <a:rPr lang="en-US" smtClean="0"/>
-              <a:t>2/16/2018</a:t>
+              <a:t>8/1/18</a:t>
             </a:fld>
             <a:endParaRPr lang="en-US"/>
           </a:p>
@@ -1530,7 +1526,7 @@
           <a:p>
             <a:fld id="{0EB9FD00-C173-4304-AF07-4E0E5F6E2284}" type="datetimeFigureOut">
               <a:rPr lang="en-US" smtClean="0"/>
-              <a:t>2/16/2018</a:t>
+              <a:t>8/1/18</a:t>
             </a:fld>
             <a:endParaRPr lang="en-US"/>
           </a:p>
@@ -1708,7 +1704,7 @@
           <a:p>
             <a:fld id="{0EB9FD00-C173-4304-AF07-4E0E5F6E2284}" type="datetimeFigureOut">
               <a:rPr lang="en-US" smtClean="0"/>
-              <a:t>2/16/2018</a:t>
+              <a:t>8/1/18</a:t>
             </a:fld>
             <a:endParaRPr lang="en-US"/>
           </a:p>
@@ -1876,7 +1872,7 @@
           <a:p>
             <a:fld id="{0EB9FD00-C173-4304-AF07-4E0E5F6E2284}" type="datetimeFigureOut">
               <a:rPr lang="en-US" smtClean="0"/>
-              <a:t>2/16/2018</a:t>
+              <a:t>8/1/18</a:t>
             </a:fld>
             <a:endParaRPr lang="en-US"/>
           </a:p>
@@ -2121,7 +2117,7 @@
           <a:p>
             <a:fld id="{0EB9FD00-C173-4304-AF07-4E0E5F6E2284}" type="datetimeFigureOut">
               <a:rPr lang="en-US" smtClean="0"/>
-              <a:t>2/16/2018</a:t>
+              <a:t>8/1/18</a:t>
             </a:fld>
             <a:endParaRPr lang="en-US"/>
           </a:p>
@@ -2350,7 +2346,7 @@
           <a:p>
             <a:fld id="{0EB9FD00-C173-4304-AF07-4E0E5F6E2284}" type="datetimeFigureOut">
               <a:rPr lang="en-US" smtClean="0"/>
-              <a:t>2/16/2018</a:t>
+              <a:t>8/1/18</a:t>
             </a:fld>
             <a:endParaRPr lang="en-US"/>
           </a:p>
@@ -2714,7 +2710,7 @@
           <a:p>
             <a:fld id="{0EB9FD00-C173-4304-AF07-4E0E5F6E2284}" type="datetimeFigureOut">
               <a:rPr lang="en-US" smtClean="0"/>
-              <a:t>2/16/2018</a:t>
+              <a:t>8/1/18</a:t>
             </a:fld>
             <a:endParaRPr lang="en-US"/>
           </a:p>
@@ -2831,7 +2827,7 @@
           <a:p>
             <a:fld id="{0EB9FD00-C173-4304-AF07-4E0E5F6E2284}" type="datetimeFigureOut">
               <a:rPr lang="en-US" smtClean="0"/>
-              <a:t>2/16/2018</a:t>
+              <a:t>8/1/18</a:t>
             </a:fld>
             <a:endParaRPr lang="en-US"/>
           </a:p>
@@ -2926,7 +2922,7 @@
           <a:p>
             <a:fld id="{0EB9FD00-C173-4304-AF07-4E0E5F6E2284}" type="datetimeFigureOut">
               <a:rPr lang="en-US" smtClean="0"/>
-              <a:t>2/16/2018</a:t>
+              <a:t>8/1/18</a:t>
             </a:fld>
             <a:endParaRPr lang="en-US"/>
           </a:p>
@@ -3201,7 +3197,7 @@
           <a:p>
             <a:fld id="{0EB9FD00-C173-4304-AF07-4E0E5F6E2284}" type="datetimeFigureOut">
               <a:rPr lang="en-US" smtClean="0"/>
-              <a:t>2/16/2018</a:t>
+              <a:t>8/1/18</a:t>
             </a:fld>
             <a:endParaRPr lang="en-US"/>
           </a:p>
@@ -3453,7 +3449,7 @@
           <a:p>
             <a:fld id="{0EB9FD00-C173-4304-AF07-4E0E5F6E2284}" type="datetimeFigureOut">
               <a:rPr lang="en-US" smtClean="0"/>
-              <a:t>2/16/2018</a:t>
+              <a:t>8/1/18</a:t>
             </a:fld>
             <a:endParaRPr lang="en-US"/>
           </a:p>
@@ -3664,7 +3660,7 @@
           <a:p>
             <a:fld id="{0EB9FD00-C173-4304-AF07-4E0E5F6E2284}" type="datetimeFigureOut">
               <a:rPr lang="en-US" smtClean="0"/>
-              <a:t>2/16/2018</a:t>
+              <a:t>8/1/18</a:t>
             </a:fld>
             <a:endParaRPr lang="en-US"/>
           </a:p>
@@ -6537,7 +6533,7 @@
         </p:nvSpPr>
         <p:spPr>
           <a:xfrm>
-            <a:off x="2119745" y="197715"/>
+            <a:off x="2118265" y="197715"/>
             <a:ext cx="9753600" cy="518746"/>
           </a:xfrm>
           <a:prstGeom prst="rect">
@@ -6742,7 +6738,7 @@
         </p:spPr>
         <p:txBody>
           <a:bodyPr vert="horz" lIns="91440" tIns="45720" rIns="91440" bIns="45720" rtlCol="0">
-            <a:normAutofit/>
+            <a:noAutofit/>
           </a:bodyPr>
           <a:lstStyle>
             <a:lvl1pPr marL="228600" indent="-228600" algn="l" defTabSz="914400" rtl="0" eaLnBrk="1" latinLnBrk="0" hangingPunct="1">
@@ -6958,7 +6954,19 @@
             </a:r>
             <a:r>
               <a:rPr lang="en-US" sz="2000" dirty="0"/>
-              <a:t>. </a:t>
+              <a:t>  and </a:t>
+            </a:r>
+            <a:r>
+              <a:rPr lang="en-US" sz="2000" dirty="0">
+                <a:highlight>
+                  <a:srgbClr val="CCECFF"/>
+                </a:highlight>
+              </a:rPr>
+              <a:t>&lt;medication&gt;</a:t>
+            </a:r>
+            <a:r>
+              <a:rPr lang="en-US" sz="2000" dirty="0"/>
+              <a:t>  </a:t>
             </a:r>
           </a:p>
         </p:txBody>
@@ -6973,7 +6981,7 @@
         </p:nvSpPr>
         <p:spPr>
           <a:xfrm>
-            <a:off x="6345195" y="5288268"/>
+            <a:off x="6345195" y="5588310"/>
             <a:ext cx="1811610" cy="518746"/>
           </a:xfrm>
           <a:prstGeom prst="rect">
@@ -7169,7 +7177,7 @@
         </p:nvSpPr>
         <p:spPr>
           <a:xfrm>
-            <a:off x="2118265" y="5308672"/>
+            <a:off x="2118265" y="5608714"/>
             <a:ext cx="1444974" cy="490931"/>
           </a:xfrm>
           <a:prstGeom prst="rect">
@@ -9012,7 +9020,7 @@
         </p:spPr>
         <p:txBody>
           <a:bodyPr vert="horz" lIns="91440" tIns="45720" rIns="91440" bIns="45720" rtlCol="0">
-            <a:normAutofit/>
+            <a:normAutofit lnSpcReduction="10000"/>
           </a:bodyPr>
           <a:lstStyle>
             <a:lvl1pPr marL="228600" indent="-228600" algn="l" defTabSz="914400" rtl="0" eaLnBrk="1" latinLnBrk="0" hangingPunct="1">
@@ -9229,6 +9237,63 @@
                 </a:highlight>
               </a:rPr>
               <a:t>#treatment</a:t>
+            </a:r>
+            <a:r>
+              <a:rPr lang="en-US" sz="1600" dirty="0"/>
+              <a:t>.</a:t>
+            </a:r>
+          </a:p>
+          <a:p>
+            <a:pPr marL="0" indent="0">
+              <a:buNone/>
+            </a:pPr>
+            <a:r>
+              <a:rPr lang="en-US" sz="1600" dirty="0"/>
+              <a:t>Patient reported </a:t>
+            </a:r>
+            <a:r>
+              <a:rPr lang="en-US" sz="1600" dirty="0">
+                <a:highlight>
+                  <a:srgbClr val="CCECFF"/>
+                </a:highlight>
+              </a:rPr>
+              <a:t>#toxicity</a:t>
+            </a:r>
+            <a:r>
+              <a:rPr lang="en-US" sz="1600" dirty="0"/>
+              <a:t> </a:t>
+            </a:r>
+            <a:r>
+              <a:rPr lang="en-US" sz="1600" dirty="0">
+                <a:highlight>
+                  <a:srgbClr val="CCECFF"/>
+                </a:highlight>
+              </a:rPr>
+              <a:t>#grade 1</a:t>
+            </a:r>
+            <a:r>
+              <a:rPr lang="en-US" sz="1600" dirty="0"/>
+              <a:t> </a:t>
+            </a:r>
+            <a:r>
+              <a:rPr lang="en-US" sz="1600" dirty="0">
+                <a:highlight>
+                  <a:srgbClr val="CCECFF"/>
+                </a:highlight>
+              </a:rPr>
+              <a:t>#nausea</a:t>
+            </a:r>
+            <a:r>
+              <a:rPr lang="en-US" sz="1600" dirty="0"/>
+              <a:t> attributed to </a:t>
+            </a:r>
+            <a:r>
+              <a:rPr lang="en-US" sz="1600" dirty="0" err="1">
+                <a:highlight>
+                  <a:srgbClr val="CCECFF"/>
+                </a:highlight>
+              </a:rPr>
+              <a:t>PACLitaxel</a:t>
             </a:r>
             <a:r>
               <a:rPr lang="en-US" sz="1600" dirty="0"/>
@@ -9300,7 +9365,7 @@
         </p:nvSpPr>
         <p:spPr>
           <a:xfrm>
-            <a:off x="3563239" y="5307015"/>
+            <a:off x="3563239" y="5607057"/>
             <a:ext cx="2049280" cy="720755"/>
           </a:xfrm>
           <a:prstGeom prst="rect">
@@ -9596,13 +9661,15 @@
       <p:cxnSp>
         <p:nvCxnSpPr>
           <p:cNvPr id="29" name="Straight Connector 28"/>
-          <p:cNvCxnSpPr/>
+          <p:cNvCxnSpPr>
+            <a:cxnSpLocks/>
+          </p:cNvCxnSpPr>
           <p:nvPr/>
         </p:nvCxnSpPr>
         <p:spPr>
-          <a:xfrm flipH="1" flipV="1">
-            <a:off x="2247537" y="1308247"/>
-            <a:ext cx="2738" cy="350040"/>
+          <a:xfrm flipV="1">
+            <a:off x="2381208" y="1143535"/>
+            <a:ext cx="0" cy="577092"/>
           </a:xfrm>
           <a:prstGeom prst="line">
             <a:avLst/>
@@ -9636,7 +9703,7 @@
         </p:nvCxnSpPr>
         <p:spPr>
           <a:xfrm flipH="1" flipV="1">
-            <a:off x="2246168" y="4773460"/>
+            <a:off x="2246168" y="5073502"/>
             <a:ext cx="1369" cy="465593"/>
           </a:xfrm>
           <a:prstGeom prst="line">
@@ -9671,7 +9738,7 @@
         </p:nvCxnSpPr>
         <p:spPr>
           <a:xfrm flipH="1" flipV="1">
-            <a:off x="3677492" y="4773459"/>
+            <a:off x="3677492" y="5073501"/>
             <a:ext cx="1369" cy="465593"/>
           </a:xfrm>
           <a:prstGeom prst="line">
@@ -9706,8 +9773,515 @@
         </p:nvCxnSpPr>
         <p:spPr>
           <a:xfrm flipH="1" flipV="1">
-            <a:off x="6482477" y="4773459"/>
+            <a:off x="6482477" y="5073501"/>
             <a:ext cx="1369" cy="465593"/>
+          </a:xfrm>
+          <a:prstGeom prst="line">
+            <a:avLst/>
+          </a:prstGeom>
+          <a:ln>
+            <a:solidFill>
+              <a:schemeClr val="tx1"/>
+            </a:solidFill>
+          </a:ln>
+        </p:spPr>
+        <p:style>
+          <a:lnRef idx="1">
+            <a:schemeClr val="accent1"/>
+          </a:lnRef>
+          <a:fillRef idx="0">
+            <a:schemeClr val="accent1"/>
+          </a:fillRef>
+          <a:effectRef idx="0">
+            <a:schemeClr val="accent1"/>
+          </a:effectRef>
+          <a:fontRef idx="minor">
+            <a:schemeClr val="tx1"/>
+          </a:fontRef>
+        </p:style>
+      </p:cxnSp>
+      <p:sp>
+        <p:nvSpPr>
+          <p:cNvPr id="25" name="Content Placeholder 2">
+            <a:extLst>
+              <a:ext uri="{FF2B5EF4-FFF2-40B4-BE49-F238E27FC236}">
+                <a16:creationId xmlns:a16="http://schemas.microsoft.com/office/drawing/2014/main" id="{8DE92207-1168-1842-BCE7-6ED0EB0F43B2}"/>
+              </a:ext>
+            </a:extLst>
+          </p:cNvPr>
+          <p:cNvSpPr txBox="1">
+            <a:spLocks/>
+          </p:cNvSpPr>
+          <p:nvPr/>
+        </p:nvSpPr>
+        <p:spPr>
+          <a:xfrm>
+            <a:off x="3268125" y="2294041"/>
+            <a:ext cx="1280746" cy="944814"/>
+          </a:xfrm>
+          <a:prstGeom prst="rect">
+            <a:avLst/>
+          </a:prstGeom>
+        </p:spPr>
+        <p:txBody>
+          <a:bodyPr vert="horz" lIns="91440" tIns="45720" rIns="91440" bIns="45720" rtlCol="0">
+            <a:noAutofit/>
+          </a:bodyPr>
+          <a:lstStyle>
+            <a:lvl1pPr marL="228600" indent="-228600" algn="l" defTabSz="914400" rtl="0" eaLnBrk="1" latinLnBrk="0" hangingPunct="1">
+              <a:lnSpc>
+                <a:spcPct val="90000"/>
+              </a:lnSpc>
+              <a:spcBef>
+                <a:spcPts val="1000"/>
+              </a:spcBef>
+              <a:buFont typeface="Arial" panose="020B0604020202020204" pitchFamily="34" charset="0"/>
+              <a:buChar char="•"/>
+              <a:defRPr sz="2800" kern="1200">
+                <a:solidFill>
+                  <a:schemeClr val="tx1"/>
+                </a:solidFill>
+                <a:latin typeface="+mn-lt"/>
+                <a:ea typeface="+mn-ea"/>
+                <a:cs typeface="+mn-cs"/>
+              </a:defRPr>
+            </a:lvl1pPr>
+            <a:lvl2pPr marL="685800" indent="-228600" algn="l" defTabSz="914400" rtl="0" eaLnBrk="1" latinLnBrk="0" hangingPunct="1">
+              <a:lnSpc>
+                <a:spcPct val="90000"/>
+              </a:lnSpc>
+              <a:spcBef>
+                <a:spcPts val="500"/>
+              </a:spcBef>
+              <a:buFont typeface="Arial" panose="020B0604020202020204" pitchFamily="34" charset="0"/>
+              <a:buChar char="•"/>
+              <a:defRPr sz="2400" kern="1200">
+                <a:solidFill>
+                  <a:schemeClr val="tx1"/>
+                </a:solidFill>
+                <a:latin typeface="+mn-lt"/>
+                <a:ea typeface="+mn-ea"/>
+                <a:cs typeface="+mn-cs"/>
+              </a:defRPr>
+            </a:lvl2pPr>
+            <a:lvl3pPr marL="1143000" indent="-228600" algn="l" defTabSz="914400" rtl="0" eaLnBrk="1" latinLnBrk="0" hangingPunct="1">
+              <a:lnSpc>
+                <a:spcPct val="90000"/>
+              </a:lnSpc>
+              <a:spcBef>
+                <a:spcPts val="500"/>
+              </a:spcBef>
+              <a:buFont typeface="Arial" panose="020B0604020202020204" pitchFamily="34" charset="0"/>
+              <a:buChar char="•"/>
+              <a:defRPr sz="2000" kern="1200">
+                <a:solidFill>
+                  <a:schemeClr val="tx1"/>
+                </a:solidFill>
+                <a:latin typeface="+mn-lt"/>
+                <a:ea typeface="+mn-ea"/>
+                <a:cs typeface="+mn-cs"/>
+              </a:defRPr>
+            </a:lvl3pPr>
+            <a:lvl4pPr marL="1600200" indent="-228600" algn="l" defTabSz="914400" rtl="0" eaLnBrk="1" latinLnBrk="0" hangingPunct="1">
+              <a:lnSpc>
+                <a:spcPct val="90000"/>
+              </a:lnSpc>
+              <a:spcBef>
+                <a:spcPts val="500"/>
+              </a:spcBef>
+              <a:buFont typeface="Arial" panose="020B0604020202020204" pitchFamily="34" charset="0"/>
+              <a:buChar char="•"/>
+              <a:defRPr sz="1800" kern="1200">
+                <a:solidFill>
+                  <a:schemeClr val="tx1"/>
+                </a:solidFill>
+                <a:latin typeface="+mn-lt"/>
+                <a:ea typeface="+mn-ea"/>
+                <a:cs typeface="+mn-cs"/>
+              </a:defRPr>
+            </a:lvl4pPr>
+            <a:lvl5pPr marL="2057400" indent="-228600" algn="l" defTabSz="914400" rtl="0" eaLnBrk="1" latinLnBrk="0" hangingPunct="1">
+              <a:lnSpc>
+                <a:spcPct val="90000"/>
+              </a:lnSpc>
+              <a:spcBef>
+                <a:spcPts val="500"/>
+              </a:spcBef>
+              <a:buFont typeface="Arial" panose="020B0604020202020204" pitchFamily="34" charset="0"/>
+              <a:buChar char="•"/>
+              <a:defRPr sz="1800" kern="1200">
+                <a:solidFill>
+                  <a:schemeClr val="tx1"/>
+                </a:solidFill>
+                <a:latin typeface="+mn-lt"/>
+                <a:ea typeface="+mn-ea"/>
+                <a:cs typeface="+mn-cs"/>
+              </a:defRPr>
+            </a:lvl5pPr>
+            <a:lvl6pPr marL="2514600" indent="-228600" algn="l" defTabSz="914400" rtl="0" eaLnBrk="1" latinLnBrk="0" hangingPunct="1">
+              <a:lnSpc>
+                <a:spcPct val="90000"/>
+              </a:lnSpc>
+              <a:spcBef>
+                <a:spcPts val="500"/>
+              </a:spcBef>
+              <a:buFont typeface="Arial" panose="020B0604020202020204" pitchFamily="34" charset="0"/>
+              <a:buChar char="•"/>
+              <a:defRPr sz="1800" kern="1200">
+                <a:solidFill>
+                  <a:schemeClr val="tx1"/>
+                </a:solidFill>
+                <a:latin typeface="+mn-lt"/>
+                <a:ea typeface="+mn-ea"/>
+                <a:cs typeface="+mn-cs"/>
+              </a:defRPr>
+            </a:lvl6pPr>
+            <a:lvl7pPr marL="2971800" indent="-228600" algn="l" defTabSz="914400" rtl="0" eaLnBrk="1" latinLnBrk="0" hangingPunct="1">
+              <a:lnSpc>
+                <a:spcPct val="90000"/>
+              </a:lnSpc>
+              <a:spcBef>
+                <a:spcPts val="500"/>
+              </a:spcBef>
+              <a:buFont typeface="Arial" panose="020B0604020202020204" pitchFamily="34" charset="0"/>
+              <a:buChar char="•"/>
+              <a:defRPr sz="1800" kern="1200">
+                <a:solidFill>
+                  <a:schemeClr val="tx1"/>
+                </a:solidFill>
+                <a:latin typeface="+mn-lt"/>
+                <a:ea typeface="+mn-ea"/>
+                <a:cs typeface="+mn-cs"/>
+              </a:defRPr>
+            </a:lvl7pPr>
+            <a:lvl8pPr marL="3429000" indent="-228600" algn="l" defTabSz="914400" rtl="0" eaLnBrk="1" latinLnBrk="0" hangingPunct="1">
+              <a:lnSpc>
+                <a:spcPct val="90000"/>
+              </a:lnSpc>
+              <a:spcBef>
+                <a:spcPts val="500"/>
+              </a:spcBef>
+              <a:buFont typeface="Arial" panose="020B0604020202020204" pitchFamily="34" charset="0"/>
+              <a:buChar char="•"/>
+              <a:defRPr sz="1800" kern="1200">
+                <a:solidFill>
+                  <a:schemeClr val="tx1"/>
+                </a:solidFill>
+                <a:latin typeface="+mn-lt"/>
+                <a:ea typeface="+mn-ea"/>
+                <a:cs typeface="+mn-cs"/>
+              </a:defRPr>
+            </a:lvl8pPr>
+            <a:lvl9pPr marL="3886200" indent="-228600" algn="l" defTabSz="914400" rtl="0" eaLnBrk="1" latinLnBrk="0" hangingPunct="1">
+              <a:lnSpc>
+                <a:spcPct val="90000"/>
+              </a:lnSpc>
+              <a:spcBef>
+                <a:spcPts val="500"/>
+              </a:spcBef>
+              <a:buFont typeface="Arial" panose="020B0604020202020204" pitchFamily="34" charset="0"/>
+              <a:buChar char="•"/>
+              <a:defRPr sz="1800" kern="1200">
+                <a:solidFill>
+                  <a:schemeClr val="tx1"/>
+                </a:solidFill>
+                <a:latin typeface="+mn-lt"/>
+                <a:ea typeface="+mn-ea"/>
+                <a:cs typeface="+mn-cs"/>
+              </a:defRPr>
+            </a:lvl9pPr>
+          </a:lstStyle>
+          <a:p>
+            <a:pPr marL="0" indent="0">
+              <a:buNone/>
+            </a:pPr>
+            <a:r>
+              <a:rPr lang="en-US" sz="1100" dirty="0"/>
+              <a:t>5. After </a:t>
+            </a:r>
+            <a:r>
+              <a:rPr lang="en-US" sz="1100" dirty="0">
+                <a:highlight>
+                  <a:srgbClr val="CCECFF"/>
+                </a:highlight>
+              </a:rPr>
+              <a:t>#toxicity</a:t>
+            </a:r>
+            <a:r>
+              <a:rPr lang="en-US" sz="1100" dirty="0"/>
+              <a:t>, one active medication can be added to indicate an attribution.</a:t>
+            </a:r>
+            <a:endParaRPr lang="en-US" sz="1100" dirty="0">
+              <a:highlight>
+                <a:srgbClr val="CCECFF"/>
+              </a:highlight>
+            </a:endParaRPr>
+          </a:p>
+        </p:txBody>
+      </p:sp>
+      <p:cxnSp>
+        <p:nvCxnSpPr>
+          <p:cNvPr id="26" name="Straight Connector 25">
+            <a:extLst>
+              <a:ext uri="{FF2B5EF4-FFF2-40B4-BE49-F238E27FC236}">
+                <a16:creationId xmlns:a16="http://schemas.microsoft.com/office/drawing/2014/main" id="{4001E78A-7E66-CF4E-BCCB-C25CC45520D8}"/>
+              </a:ext>
+            </a:extLst>
+          </p:cNvPr>
+          <p:cNvCxnSpPr>
+            <a:cxnSpLocks/>
+          </p:cNvCxnSpPr>
+          <p:nvPr/>
+        </p:nvCxnSpPr>
+        <p:spPr>
+          <a:xfrm flipV="1">
+            <a:off x="3403953" y="1550758"/>
+            <a:ext cx="0" cy="703786"/>
+          </a:xfrm>
+          <a:prstGeom prst="line">
+            <a:avLst/>
+          </a:prstGeom>
+          <a:ln>
+            <a:solidFill>
+              <a:schemeClr val="tx1"/>
+            </a:solidFill>
+          </a:ln>
+        </p:spPr>
+        <p:style>
+          <a:lnRef idx="1">
+            <a:schemeClr val="accent1"/>
+          </a:lnRef>
+          <a:fillRef idx="0">
+            <a:schemeClr val="accent1"/>
+          </a:fillRef>
+          <a:effectRef idx="0">
+            <a:schemeClr val="accent1"/>
+          </a:effectRef>
+          <a:fontRef idx="minor">
+            <a:schemeClr val="tx1"/>
+          </a:fontRef>
+        </p:style>
+      </p:cxnSp>
+      <p:sp>
+        <p:nvSpPr>
+          <p:cNvPr id="31" name="Content Placeholder 2">
+            <a:extLst>
+              <a:ext uri="{FF2B5EF4-FFF2-40B4-BE49-F238E27FC236}">
+                <a16:creationId xmlns:a16="http://schemas.microsoft.com/office/drawing/2014/main" id="{EFF18D06-5E4D-CA46-821D-26093BFB13AD}"/>
+              </a:ext>
+            </a:extLst>
+          </p:cNvPr>
+          <p:cNvSpPr txBox="1">
+            <a:spLocks/>
+          </p:cNvSpPr>
+          <p:nvPr/>
+        </p:nvSpPr>
+        <p:spPr>
+          <a:xfrm>
+            <a:off x="7475852" y="5020348"/>
+            <a:ext cx="1811610" cy="518746"/>
+          </a:xfrm>
+          <a:prstGeom prst="rect">
+            <a:avLst/>
+          </a:prstGeom>
+        </p:spPr>
+        <p:txBody>
+          <a:bodyPr vert="horz" lIns="91440" tIns="45720" rIns="91440" bIns="45720" rtlCol="0">
+            <a:noAutofit/>
+          </a:bodyPr>
+          <a:lstStyle>
+            <a:lvl1pPr marL="228600" indent="-228600" algn="l" defTabSz="914400" rtl="0" eaLnBrk="1" latinLnBrk="0" hangingPunct="1">
+              <a:lnSpc>
+                <a:spcPct val="90000"/>
+              </a:lnSpc>
+              <a:spcBef>
+                <a:spcPts val="1000"/>
+              </a:spcBef>
+              <a:buFont typeface="Arial" panose="020B0604020202020204" pitchFamily="34" charset="0"/>
+              <a:buChar char="•"/>
+              <a:defRPr sz="2800" kern="1200">
+                <a:solidFill>
+                  <a:schemeClr val="tx1"/>
+                </a:solidFill>
+                <a:latin typeface="+mn-lt"/>
+                <a:ea typeface="+mn-ea"/>
+                <a:cs typeface="+mn-cs"/>
+              </a:defRPr>
+            </a:lvl1pPr>
+            <a:lvl2pPr marL="685800" indent="-228600" algn="l" defTabSz="914400" rtl="0" eaLnBrk="1" latinLnBrk="0" hangingPunct="1">
+              <a:lnSpc>
+                <a:spcPct val="90000"/>
+              </a:lnSpc>
+              <a:spcBef>
+                <a:spcPts val="500"/>
+              </a:spcBef>
+              <a:buFont typeface="Arial" panose="020B0604020202020204" pitchFamily="34" charset="0"/>
+              <a:buChar char="•"/>
+              <a:defRPr sz="2400" kern="1200">
+                <a:solidFill>
+                  <a:schemeClr val="tx1"/>
+                </a:solidFill>
+                <a:latin typeface="+mn-lt"/>
+                <a:ea typeface="+mn-ea"/>
+                <a:cs typeface="+mn-cs"/>
+              </a:defRPr>
+            </a:lvl2pPr>
+            <a:lvl3pPr marL="1143000" indent="-228600" algn="l" defTabSz="914400" rtl="0" eaLnBrk="1" latinLnBrk="0" hangingPunct="1">
+              <a:lnSpc>
+                <a:spcPct val="90000"/>
+              </a:lnSpc>
+              <a:spcBef>
+                <a:spcPts val="500"/>
+              </a:spcBef>
+              <a:buFont typeface="Arial" panose="020B0604020202020204" pitchFamily="34" charset="0"/>
+              <a:buChar char="•"/>
+              <a:defRPr sz="2000" kern="1200">
+                <a:solidFill>
+                  <a:schemeClr val="tx1"/>
+                </a:solidFill>
+                <a:latin typeface="+mn-lt"/>
+                <a:ea typeface="+mn-ea"/>
+                <a:cs typeface="+mn-cs"/>
+              </a:defRPr>
+            </a:lvl3pPr>
+            <a:lvl4pPr marL="1600200" indent="-228600" algn="l" defTabSz="914400" rtl="0" eaLnBrk="1" latinLnBrk="0" hangingPunct="1">
+              <a:lnSpc>
+                <a:spcPct val="90000"/>
+              </a:lnSpc>
+              <a:spcBef>
+                <a:spcPts val="500"/>
+              </a:spcBef>
+              <a:buFont typeface="Arial" panose="020B0604020202020204" pitchFamily="34" charset="0"/>
+              <a:buChar char="•"/>
+              <a:defRPr sz="1800" kern="1200">
+                <a:solidFill>
+                  <a:schemeClr val="tx1"/>
+                </a:solidFill>
+                <a:latin typeface="+mn-lt"/>
+                <a:ea typeface="+mn-ea"/>
+                <a:cs typeface="+mn-cs"/>
+              </a:defRPr>
+            </a:lvl4pPr>
+            <a:lvl5pPr marL="2057400" indent="-228600" algn="l" defTabSz="914400" rtl="0" eaLnBrk="1" latinLnBrk="0" hangingPunct="1">
+              <a:lnSpc>
+                <a:spcPct val="90000"/>
+              </a:lnSpc>
+              <a:spcBef>
+                <a:spcPts val="500"/>
+              </a:spcBef>
+              <a:buFont typeface="Arial" panose="020B0604020202020204" pitchFamily="34" charset="0"/>
+              <a:buChar char="•"/>
+              <a:defRPr sz="1800" kern="1200">
+                <a:solidFill>
+                  <a:schemeClr val="tx1"/>
+                </a:solidFill>
+                <a:latin typeface="+mn-lt"/>
+                <a:ea typeface="+mn-ea"/>
+                <a:cs typeface="+mn-cs"/>
+              </a:defRPr>
+            </a:lvl5pPr>
+            <a:lvl6pPr marL="2514600" indent="-228600" algn="l" defTabSz="914400" rtl="0" eaLnBrk="1" latinLnBrk="0" hangingPunct="1">
+              <a:lnSpc>
+                <a:spcPct val="90000"/>
+              </a:lnSpc>
+              <a:spcBef>
+                <a:spcPts val="500"/>
+              </a:spcBef>
+              <a:buFont typeface="Arial" panose="020B0604020202020204" pitchFamily="34" charset="0"/>
+              <a:buChar char="•"/>
+              <a:defRPr sz="1800" kern="1200">
+                <a:solidFill>
+                  <a:schemeClr val="tx1"/>
+                </a:solidFill>
+                <a:latin typeface="+mn-lt"/>
+                <a:ea typeface="+mn-ea"/>
+                <a:cs typeface="+mn-cs"/>
+              </a:defRPr>
+            </a:lvl6pPr>
+            <a:lvl7pPr marL="2971800" indent="-228600" algn="l" defTabSz="914400" rtl="0" eaLnBrk="1" latinLnBrk="0" hangingPunct="1">
+              <a:lnSpc>
+                <a:spcPct val="90000"/>
+              </a:lnSpc>
+              <a:spcBef>
+                <a:spcPts val="500"/>
+              </a:spcBef>
+              <a:buFont typeface="Arial" panose="020B0604020202020204" pitchFamily="34" charset="0"/>
+              <a:buChar char="•"/>
+              <a:defRPr sz="1800" kern="1200">
+                <a:solidFill>
+                  <a:schemeClr val="tx1"/>
+                </a:solidFill>
+                <a:latin typeface="+mn-lt"/>
+                <a:ea typeface="+mn-ea"/>
+                <a:cs typeface="+mn-cs"/>
+              </a:defRPr>
+            </a:lvl7pPr>
+            <a:lvl8pPr marL="3429000" indent="-228600" algn="l" defTabSz="914400" rtl="0" eaLnBrk="1" latinLnBrk="0" hangingPunct="1">
+              <a:lnSpc>
+                <a:spcPct val="90000"/>
+              </a:lnSpc>
+              <a:spcBef>
+                <a:spcPts val="500"/>
+              </a:spcBef>
+              <a:buFont typeface="Arial" panose="020B0604020202020204" pitchFamily="34" charset="0"/>
+              <a:buChar char="•"/>
+              <a:defRPr sz="1800" kern="1200">
+                <a:solidFill>
+                  <a:schemeClr val="tx1"/>
+                </a:solidFill>
+                <a:latin typeface="+mn-lt"/>
+                <a:ea typeface="+mn-ea"/>
+                <a:cs typeface="+mn-cs"/>
+              </a:defRPr>
+            </a:lvl8pPr>
+            <a:lvl9pPr marL="3886200" indent="-228600" algn="l" defTabSz="914400" rtl="0" eaLnBrk="1" latinLnBrk="0" hangingPunct="1">
+              <a:lnSpc>
+                <a:spcPct val="90000"/>
+              </a:lnSpc>
+              <a:spcBef>
+                <a:spcPts val="500"/>
+              </a:spcBef>
+              <a:buFont typeface="Arial" panose="020B0604020202020204" pitchFamily="34" charset="0"/>
+              <a:buChar char="•"/>
+              <a:defRPr sz="1800" kern="1200">
+                <a:solidFill>
+                  <a:schemeClr val="tx1"/>
+                </a:solidFill>
+                <a:latin typeface="+mn-lt"/>
+                <a:ea typeface="+mn-ea"/>
+                <a:cs typeface="+mn-cs"/>
+              </a:defRPr>
+            </a:lvl9pPr>
+          </a:lstStyle>
+          <a:p>
+            <a:pPr marL="0" indent="0">
+              <a:buNone/>
+            </a:pPr>
+            <a:r>
+              <a:rPr lang="en-US" sz="1100" dirty="0"/>
+              <a:t>An active medication on the patient’s record can be added.</a:t>
+            </a:r>
+          </a:p>
+        </p:txBody>
+      </p:sp>
+      <p:cxnSp>
+        <p:nvCxnSpPr>
+          <p:cNvPr id="32" name="Straight Connector 31">
+            <a:extLst>
+              <a:ext uri="{FF2B5EF4-FFF2-40B4-BE49-F238E27FC236}">
+                <a16:creationId xmlns:a16="http://schemas.microsoft.com/office/drawing/2014/main" id="{27853FA8-8961-084D-BC84-9308E5DB02D3}"/>
+              </a:ext>
+            </a:extLst>
+          </p:cNvPr>
+          <p:cNvCxnSpPr>
+            <a:cxnSpLocks/>
+          </p:cNvCxnSpPr>
+          <p:nvPr/>
+        </p:nvCxnSpPr>
+        <p:spPr>
+          <a:xfrm flipV="1">
+            <a:off x="7614502" y="4742312"/>
+            <a:ext cx="1" cy="294760"/>
           </a:xfrm>
           <a:prstGeom prst="line">
             <a:avLst/>

</xml_diff>

<commit_message>
Updated pptx and pdfs
</commit_message>
<xml_diff>
--- a/docs/Structured Phrase Format Descriptions.pptx
+++ b/docs/Structured Phrase Format Descriptions.pptx
@@ -206,7 +206,7 @@
           <a:p>
             <a:fld id="{21E832DA-B4D8-4D11-8E14-97F9DC272DA8}" type="datetimeFigureOut">
               <a:rPr lang="en-US" smtClean="0"/>
-              <a:t>8/1/18</a:t>
+              <a:t>7/8/2019</a:t>
             </a:fld>
             <a:endParaRPr lang="en-US"/>
           </a:p>
@@ -1358,7 +1358,7 @@
           <a:p>
             <a:fld id="{0EB9FD00-C173-4304-AF07-4E0E5F6E2284}" type="datetimeFigureOut">
               <a:rPr lang="en-US" smtClean="0"/>
-              <a:t>8/1/18</a:t>
+              <a:t>7/8/2019</a:t>
             </a:fld>
             <a:endParaRPr lang="en-US"/>
           </a:p>
@@ -1526,7 +1526,7 @@
           <a:p>
             <a:fld id="{0EB9FD00-C173-4304-AF07-4E0E5F6E2284}" type="datetimeFigureOut">
               <a:rPr lang="en-US" smtClean="0"/>
-              <a:t>8/1/18</a:t>
+              <a:t>7/8/2019</a:t>
             </a:fld>
             <a:endParaRPr lang="en-US"/>
           </a:p>
@@ -1704,7 +1704,7 @@
           <a:p>
             <a:fld id="{0EB9FD00-C173-4304-AF07-4E0E5F6E2284}" type="datetimeFigureOut">
               <a:rPr lang="en-US" smtClean="0"/>
-              <a:t>8/1/18</a:t>
+              <a:t>7/8/2019</a:t>
             </a:fld>
             <a:endParaRPr lang="en-US"/>
           </a:p>
@@ -1872,7 +1872,7 @@
           <a:p>
             <a:fld id="{0EB9FD00-C173-4304-AF07-4E0E5F6E2284}" type="datetimeFigureOut">
               <a:rPr lang="en-US" smtClean="0"/>
-              <a:t>8/1/18</a:t>
+              <a:t>7/8/2019</a:t>
             </a:fld>
             <a:endParaRPr lang="en-US"/>
           </a:p>
@@ -2117,7 +2117,7 @@
           <a:p>
             <a:fld id="{0EB9FD00-C173-4304-AF07-4E0E5F6E2284}" type="datetimeFigureOut">
               <a:rPr lang="en-US" smtClean="0"/>
-              <a:t>8/1/18</a:t>
+              <a:t>7/8/2019</a:t>
             </a:fld>
             <a:endParaRPr lang="en-US"/>
           </a:p>
@@ -2346,7 +2346,7 @@
           <a:p>
             <a:fld id="{0EB9FD00-C173-4304-AF07-4E0E5F6E2284}" type="datetimeFigureOut">
               <a:rPr lang="en-US" smtClean="0"/>
-              <a:t>8/1/18</a:t>
+              <a:t>7/8/2019</a:t>
             </a:fld>
             <a:endParaRPr lang="en-US"/>
           </a:p>
@@ -2710,7 +2710,7 @@
           <a:p>
             <a:fld id="{0EB9FD00-C173-4304-AF07-4E0E5F6E2284}" type="datetimeFigureOut">
               <a:rPr lang="en-US" smtClean="0"/>
-              <a:t>8/1/18</a:t>
+              <a:t>7/8/2019</a:t>
             </a:fld>
             <a:endParaRPr lang="en-US"/>
           </a:p>
@@ -2827,7 +2827,7 @@
           <a:p>
             <a:fld id="{0EB9FD00-C173-4304-AF07-4E0E5F6E2284}" type="datetimeFigureOut">
               <a:rPr lang="en-US" smtClean="0"/>
-              <a:t>8/1/18</a:t>
+              <a:t>7/8/2019</a:t>
             </a:fld>
             <a:endParaRPr lang="en-US"/>
           </a:p>
@@ -2922,7 +2922,7 @@
           <a:p>
             <a:fld id="{0EB9FD00-C173-4304-AF07-4E0E5F6E2284}" type="datetimeFigureOut">
               <a:rPr lang="en-US" smtClean="0"/>
-              <a:t>8/1/18</a:t>
+              <a:t>7/8/2019</a:t>
             </a:fld>
             <a:endParaRPr lang="en-US"/>
           </a:p>
@@ -3197,7 +3197,7 @@
           <a:p>
             <a:fld id="{0EB9FD00-C173-4304-AF07-4E0E5F6E2284}" type="datetimeFigureOut">
               <a:rPr lang="en-US" smtClean="0"/>
-              <a:t>8/1/18</a:t>
+              <a:t>7/8/2019</a:t>
             </a:fld>
             <a:endParaRPr lang="en-US"/>
           </a:p>
@@ -3449,7 +3449,7 @@
           <a:p>
             <a:fld id="{0EB9FD00-C173-4304-AF07-4E0E5F6E2284}" type="datetimeFigureOut">
               <a:rPr lang="en-US" smtClean="0"/>
-              <a:t>8/1/18</a:t>
+              <a:t>7/8/2019</a:t>
             </a:fld>
             <a:endParaRPr lang="en-US"/>
           </a:p>
@@ -3660,7 +3660,7 @@
           <a:p>
             <a:fld id="{0EB9FD00-C173-4304-AF07-4E0E5F6E2284}" type="datetimeFigureOut">
               <a:rPr lang="en-US" smtClean="0"/>
-              <a:t>8/1/18</a:t>
+              <a:t>7/8/2019</a:t>
             </a:fld>
             <a:endParaRPr lang="en-US"/>
           </a:p>
@@ -15446,7 +15446,7 @@
         </p:spPr>
         <p:txBody>
           <a:bodyPr vert="horz" lIns="91440" tIns="45720" rIns="91440" bIns="45720" rtlCol="0">
-            <a:normAutofit fontScale="40000" lnSpcReduction="20000"/>
+            <a:normAutofit/>
           </a:bodyPr>
           <a:lstStyle>
             <a:lvl1pPr marL="228600" indent="-228600" algn="l" defTabSz="914400" rtl="0" eaLnBrk="1" latinLnBrk="0" hangingPunct="1">
@@ -15617,8 +15617,8 @@
               <a:buNone/>
             </a:pPr>
             <a:r>
-              <a:rPr lang="en-US" dirty="0"/>
-              <a:t>T, N, and M can be speciﬁed in any order. These values are deﬁned by American Joint Committee on Cancer (AJCC) 7th edition.</a:t>
+              <a:rPr lang="en-US" sz="1100" dirty="0"/>
+              <a:t>T, N, and M can be speciﬁed in any order. </a:t>
             </a:r>
           </a:p>
         </p:txBody>

</xml_diff>